<commit_message>
Updated supported browsers, and element location in slide deck
</commit_message>
<xml_diff>
--- a/WebDriver/Slides.pptx
+++ b/WebDriver/Slides.pptx
@@ -1,18 +1,28 @@
 
 <file path=ppt/presentation.xml><?xml version="1.0" encoding="utf-8"?>
-<p:presentation xmlns:a="http://schemas.openxmlformats.org/drawingml/2006/main" xmlns:r="http://schemas.openxmlformats.org/officeDocument/2006/relationships" xmlns:p="http://schemas.openxmlformats.org/presentationml/2006/main" removePersonalInfoOnSave="1" saveSubsetFonts="1">
+<p:presentation xmlns:a="http://schemas.openxmlformats.org/drawingml/2006/main" xmlns:r="http://schemas.openxmlformats.org/officeDocument/2006/relationships" xmlns:p="http://schemas.openxmlformats.org/presentationml/2006/main" showSpecialPlsOnTitleSld="0" removePersonalInfoOnSave="1" saveSubsetFonts="1">
   <p:sldMasterIdLst>
     <p:sldMasterId id="2147483696" r:id="rId2"/>
   </p:sldMasterIdLst>
   <p:notesMasterIdLst>
-    <p:notesMasterId r:id="rId8"/>
+    <p:notesMasterId r:id="rId15"/>
   </p:notesMasterIdLst>
+  <p:handoutMasterIdLst>
+    <p:handoutMasterId r:id="rId16"/>
+  </p:handoutMasterIdLst>
   <p:sldIdLst>
     <p:sldId id="256" r:id="rId3"/>
     <p:sldId id="257" r:id="rId4"/>
     <p:sldId id="258" r:id="rId5"/>
-    <p:sldId id="259" r:id="rId6"/>
-    <p:sldId id="260" r:id="rId7"/>
+    <p:sldId id="261" r:id="rId6"/>
+    <p:sldId id="262" r:id="rId7"/>
+    <p:sldId id="264" r:id="rId8"/>
+    <p:sldId id="265" r:id="rId9"/>
+    <p:sldId id="266" r:id="rId10"/>
+    <p:sldId id="259" r:id="rId11"/>
+    <p:sldId id="267" r:id="rId12"/>
+    <p:sldId id="263" r:id="rId13"/>
+    <p:sldId id="260" r:id="rId14"/>
   </p:sldIdLst>
   <p:sldSz cx="9144000" cy="6858000" type="screen4x3"/>
   <p:notesSz cx="6858000" cy="9144000"/>
@@ -114,6 +124,172 @@
 </p:presentation>
 </file>
 
+<file path=ppt/handoutMasters/handoutMaster1.xml><?xml version="1.0" encoding="utf-8"?>
+<p:handoutMaster xmlns:a="http://schemas.openxmlformats.org/drawingml/2006/main" xmlns:r="http://schemas.openxmlformats.org/officeDocument/2006/relationships" xmlns:p="http://schemas.openxmlformats.org/presentationml/2006/main">
+  <p:cSld>
+    <p:bg>
+      <p:bgRef idx="1001">
+        <a:schemeClr val="bg1"/>
+      </p:bgRef>
+    </p:bg>
+    <p:spTree>
+      <p:nvGrpSpPr>
+        <p:cNvPr id="1" name=""/>
+        <p:cNvGrpSpPr/>
+        <p:nvPr/>
+      </p:nvGrpSpPr>
+      <p:grpSpPr>
+        <a:xfrm>
+          <a:off x="0" y="0"/>
+          <a:ext cx="0" cy="0"/>
+          <a:chOff x="0" y="0"/>
+          <a:chExt cx="0" cy="0"/>
+        </a:xfrm>
+      </p:grpSpPr>
+      <p:sp>
+        <p:nvSpPr>
+          <p:cNvPr id="2" name="Header Placeholder 1"/>
+          <p:cNvSpPr>
+            <a:spLocks noGrp="1"/>
+          </p:cNvSpPr>
+          <p:nvPr>
+            <p:ph type="hdr" sz="quarter"/>
+          </p:nvPr>
+        </p:nvSpPr>
+        <p:spPr>
+          <a:xfrm>
+            <a:off x="0" y="0"/>
+            <a:ext cx="2971800" cy="457200"/>
+          </a:xfrm>
+          <a:prstGeom prst="rect">
+            <a:avLst/>
+          </a:prstGeom>
+        </p:spPr>
+        <p:txBody>
+          <a:bodyPr vert="horz" lIns="91440" tIns="45720" rIns="91440" bIns="45720" rtlCol="0"/>
+          <a:lstStyle>
+            <a:lvl1pPr algn="l">
+              <a:defRPr sz="1200"/>
+            </a:lvl1pPr>
+          </a:lstStyle>
+          <a:p>
+            <a:endParaRPr lang="en-US"/>
+          </a:p>
+        </p:txBody>
+      </p:sp>
+      <p:sp>
+        <p:nvSpPr>
+          <p:cNvPr id="3" name="Date Placeholder 2"/>
+          <p:cNvSpPr>
+            <a:spLocks noGrp="1"/>
+          </p:cNvSpPr>
+          <p:nvPr>
+            <p:ph type="dt" sz="quarter" idx="1"/>
+          </p:nvPr>
+        </p:nvSpPr>
+        <p:spPr>
+          <a:xfrm>
+            <a:off x="3884613" y="0"/>
+            <a:ext cx="2971800" cy="457200"/>
+          </a:xfrm>
+          <a:prstGeom prst="rect">
+            <a:avLst/>
+          </a:prstGeom>
+        </p:spPr>
+        <p:txBody>
+          <a:bodyPr vert="horz" lIns="91440" tIns="45720" rIns="91440" bIns="45720" rtlCol="0"/>
+          <a:lstStyle>
+            <a:lvl1pPr algn="r">
+              <a:defRPr sz="1200"/>
+            </a:lvl1pPr>
+          </a:lstStyle>
+          <a:p>
+            <a:fld id="{B40A9E6F-6737-0744-A10B-6F064135DB2B}" type="datetimeFigureOut">
+              <a:rPr lang="en-US" smtClean="0"/>
+              <a:t>2/4/14</a:t>
+            </a:fld>
+            <a:endParaRPr lang="en-US"/>
+          </a:p>
+        </p:txBody>
+      </p:sp>
+      <p:sp>
+        <p:nvSpPr>
+          <p:cNvPr id="4" name="Footer Placeholder 3"/>
+          <p:cNvSpPr>
+            <a:spLocks noGrp="1"/>
+          </p:cNvSpPr>
+          <p:nvPr>
+            <p:ph type="ftr" sz="quarter" idx="2"/>
+          </p:nvPr>
+        </p:nvSpPr>
+        <p:spPr>
+          <a:xfrm>
+            <a:off x="0" y="8685213"/>
+            <a:ext cx="2971800" cy="457200"/>
+          </a:xfrm>
+          <a:prstGeom prst="rect">
+            <a:avLst/>
+          </a:prstGeom>
+        </p:spPr>
+        <p:txBody>
+          <a:bodyPr vert="horz" lIns="91440" tIns="45720" rIns="91440" bIns="45720" rtlCol="0" anchor="b"/>
+          <a:lstStyle>
+            <a:lvl1pPr algn="l">
+              <a:defRPr sz="1200"/>
+            </a:lvl1pPr>
+          </a:lstStyle>
+          <a:p>
+            <a:endParaRPr lang="en-US"/>
+          </a:p>
+        </p:txBody>
+      </p:sp>
+      <p:sp>
+        <p:nvSpPr>
+          <p:cNvPr id="5" name="Slide Number Placeholder 4"/>
+          <p:cNvSpPr>
+            <a:spLocks noGrp="1"/>
+          </p:cNvSpPr>
+          <p:nvPr>
+            <p:ph type="sldNum" sz="quarter" idx="3"/>
+          </p:nvPr>
+        </p:nvSpPr>
+        <p:spPr>
+          <a:xfrm>
+            <a:off x="3884613" y="8685213"/>
+            <a:ext cx="2971800" cy="457200"/>
+          </a:xfrm>
+          <a:prstGeom prst="rect">
+            <a:avLst/>
+          </a:prstGeom>
+        </p:spPr>
+        <p:txBody>
+          <a:bodyPr vert="horz" lIns="91440" tIns="45720" rIns="91440" bIns="45720" rtlCol="0" anchor="b"/>
+          <a:lstStyle>
+            <a:lvl1pPr algn="r">
+              <a:defRPr sz="1200"/>
+            </a:lvl1pPr>
+          </a:lstStyle>
+          <a:p>
+            <a:fld id="{2523A0B9-B445-8144-B83C-AE9B8218D7CF}" type="slidenum">
+              <a:rPr lang="en-US" smtClean="0"/>
+              <a:t>‹#›</a:t>
+            </a:fld>
+            <a:endParaRPr lang="en-US"/>
+          </a:p>
+        </p:txBody>
+      </p:sp>
+    </p:spTree>
+    <p:extLst>
+      <p:ext uri="{BB962C8B-B14F-4D97-AF65-F5344CB8AC3E}">
+        <p14:creationId xmlns:p14="http://schemas.microsoft.com/office/powerpoint/2010/main" val="2406588578"/>
+      </p:ext>
+    </p:extLst>
+  </p:cSld>
+  <p:clrMap bg1="lt1" tx1="dk1" bg2="lt2" tx2="dk2" accent1="accent1" accent2="accent2" accent3="accent3" accent4="accent4" accent5="accent5" accent6="accent6" hlink="hlink" folHlink="folHlink"/>
+  <p:hf hdr="0" ftr="0" dt="0"/>
+</p:handoutMaster>
+</file>
+
 <file path=ppt/notesMasters/notesMaster1.xml><?xml version="1.0" encoding="utf-8"?>
 <p:notesMaster xmlns:a="http://schemas.openxmlformats.org/drawingml/2006/main" xmlns:r="http://schemas.openxmlformats.org/officeDocument/2006/relationships" xmlns:p="http://schemas.openxmlformats.org/presentationml/2006/main">
   <p:cSld>
@@ -196,7 +372,7 @@
           <a:p>
             <a:fld id="{3618A891-9467-4CC7-A491-0A34A0A97538}" type="datetimeFigureOut">
               <a:rPr lang="en-US" smtClean="0"/>
-              <a:t>2/3/14</a:t>
+              <a:t>2/4/14</a:t>
             </a:fld>
             <a:endParaRPr lang="en-US"/>
           </a:p>
@@ -371,6 +547,7 @@
     </p:extLst>
   </p:cSld>
   <p:clrMap bg1="lt1" tx1="dk1" bg2="lt2" tx2="dk2" accent1="accent1" accent2="accent2" accent3="accent3" accent4="accent4" accent5="accent5" accent6="accent6" hlink="hlink" folHlink="folHlink"/>
+  <p:hf hdr="0" ftr="0" dt="0"/>
   <p:notesStyle>
     <a:lvl1pPr marL="0" algn="l" defTabSz="914400" rtl="0" eaLnBrk="1" latinLnBrk="0" hangingPunct="1">
       <a:defRPr sz="1200" kern="1200">
@@ -820,11 +997,10 @@
           <a:bodyPr/>
           <a:lstStyle/>
           <a:p>
-            <a:fld id="{EE625E72-7062-4D8E-BA99-F07B9DD1F028}" type="datetimeFigureOut">
-              <a:rPr lang="en-US" smtClean="0"/>
-              <a:pPr/>
-              <a:t>2/3/14</a:t>
-            </a:fld>
+            <a:r>
+              <a:rPr lang="en-US" smtClean="0"/>
+              <a:t>Feb. 7. 2014</a:t>
+            </a:r>
             <a:endParaRPr lang="en-US"/>
           </a:p>
         </p:txBody>
@@ -844,6 +1020,10 @@
           <a:bodyPr/>
           <a:lstStyle/>
           <a:p>
+            <a:r>
+              <a:rPr lang="en-US" smtClean="0"/>
+              <a:t>Matt Smith - WebDriver &amp; Selenium</a:t>
+            </a:r>
             <a:endParaRPr lang="en-US"/>
           </a:p>
         </p:txBody>
@@ -1104,6 +1284,675 @@
 </file>
 
 <file path=ppt/slideLayouts/slideLayout10.xml><?xml version="1.0" encoding="utf-8"?>
+<p:sldLayout xmlns:a="http://schemas.openxmlformats.org/drawingml/2006/main" xmlns:r="http://schemas.openxmlformats.org/officeDocument/2006/relationships" xmlns:p="http://schemas.openxmlformats.org/presentationml/2006/main" showMasterSp="0" type="picTx" preserve="1">
+  <p:cSld name="Picture with Caption">
+    <p:spTree>
+      <p:nvGrpSpPr>
+        <p:cNvPr id="1" name=""/>
+        <p:cNvGrpSpPr/>
+        <p:nvPr/>
+      </p:nvGrpSpPr>
+      <p:grpSpPr>
+        <a:xfrm>
+          <a:off x="0" y="0"/>
+          <a:ext cx="0" cy="0"/>
+          <a:chOff x="0" y="0"/>
+          <a:chExt cx="0" cy="0"/>
+        </a:xfrm>
+      </p:grpSpPr>
+      <p:sp>
+        <p:nvSpPr>
+          <p:cNvPr id="21" name="Straight Connector 20"/>
+          <p:cNvSpPr>
+            <a:spLocks noChangeShapeType="1"/>
+          </p:cNvSpPr>
+          <p:nvPr/>
+        </p:nvSpPr>
+        <p:spPr bwMode="auto">
+          <a:xfrm>
+            <a:off x="152400" y="533400"/>
+            <a:ext cx="8833104" cy="0"/>
+          </a:xfrm>
+          <a:prstGeom prst="line">
+            <a:avLst/>
+          </a:prstGeom>
+          <a:noFill/>
+          <a:ln w="11430" cap="flat" cmpd="sng" algn="ctr">
+            <a:solidFill>
+              <a:schemeClr val="accent3">
+                <a:shade val="75000"/>
+              </a:schemeClr>
+            </a:solidFill>
+            <a:prstDash val="sysDash"/>
+            <a:round/>
+            <a:headEnd type="none" w="med" len="med"/>
+            <a:tailEnd type="none" w="med" len="med"/>
+          </a:ln>
+          <a:effectLst/>
+        </p:spPr>
+        <p:txBody>
+          <a:bodyPr vert="horz" wrap="none" lIns="91440" tIns="45720" rIns="91440" bIns="45720" anchor="ctr" compatLnSpc="1"/>
+          <a:lstStyle/>
+          <a:p>
+            <a:endParaRPr kumimoji="0" lang="en-US"/>
+          </a:p>
+        </p:txBody>
+      </p:sp>
+      <p:sp>
+        <p:nvSpPr>
+          <p:cNvPr id="19" name="Rectangle 18"/>
+          <p:cNvSpPr>
+            <a:spLocks noChangeArrowheads="1"/>
+          </p:cNvSpPr>
+          <p:nvPr/>
+        </p:nvSpPr>
+        <p:spPr bwMode="white">
+          <a:xfrm>
+            <a:off x="0" y="6705600"/>
+            <a:ext cx="9144000" cy="152400"/>
+          </a:xfrm>
+          <a:prstGeom prst="rect">
+            <a:avLst/>
+          </a:prstGeom>
+          <a:solidFill>
+            <a:srgbClr val="FFFFFF"/>
+          </a:solidFill>
+          <a:ln w="9525" cap="flat" cmpd="sng" algn="ctr">
+            <a:noFill/>
+            <a:prstDash val="solid"/>
+            <a:miter lim="800000"/>
+            <a:headEnd type="none" w="med" len="med"/>
+            <a:tailEnd type="none" w="med" len="med"/>
+          </a:ln>
+          <a:effectLst/>
+        </p:spPr>
+        <p:txBody>
+          <a:bodyPr vert="horz" wrap="none" lIns="91440" tIns="45720" rIns="91440" bIns="45720" anchor="ctr" compatLnSpc="1"/>
+          <a:lstStyle/>
+          <a:p>
+            <a:endParaRPr kumimoji="0" lang="en-US"/>
+          </a:p>
+        </p:txBody>
+      </p:sp>
+      <p:sp>
+        <p:nvSpPr>
+          <p:cNvPr id="16" name="Rectangle 15"/>
+          <p:cNvSpPr>
+            <a:spLocks noChangeArrowheads="1"/>
+          </p:cNvSpPr>
+          <p:nvPr/>
+        </p:nvSpPr>
+        <p:spPr bwMode="white">
+          <a:xfrm>
+            <a:off x="8991600" y="0"/>
+            <a:ext cx="152400" cy="6858000"/>
+          </a:xfrm>
+          <a:prstGeom prst="rect">
+            <a:avLst/>
+          </a:prstGeom>
+          <a:solidFill>
+            <a:srgbClr val="FFFFFF"/>
+          </a:solidFill>
+          <a:ln w="9525" cap="flat" cmpd="sng" algn="ctr">
+            <a:noFill/>
+            <a:prstDash val="solid"/>
+            <a:miter lim="800000"/>
+            <a:headEnd type="none" w="med" len="med"/>
+            <a:tailEnd type="none" w="med" len="med"/>
+          </a:ln>
+          <a:effectLst/>
+        </p:spPr>
+        <p:txBody>
+          <a:bodyPr vert="horz" wrap="none" lIns="91440" tIns="45720" rIns="91440" bIns="45720" anchor="ctr" compatLnSpc="1"/>
+          <a:lstStyle/>
+          <a:p>
+            <a:endParaRPr kumimoji="0" lang="en-US"/>
+          </a:p>
+        </p:txBody>
+      </p:sp>
+      <p:sp>
+        <p:nvSpPr>
+          <p:cNvPr id="17" name="Rectangle 16"/>
+          <p:cNvSpPr>
+            <a:spLocks noChangeArrowheads="1"/>
+          </p:cNvSpPr>
+          <p:nvPr/>
+        </p:nvSpPr>
+        <p:spPr bwMode="white">
+          <a:xfrm>
+            <a:off x="0" y="0"/>
+            <a:ext cx="9144000" cy="152400"/>
+          </a:xfrm>
+          <a:prstGeom prst="rect">
+            <a:avLst/>
+          </a:prstGeom>
+          <a:solidFill>
+            <a:srgbClr val="FFFFFF"/>
+          </a:solidFill>
+          <a:ln w="9525" cap="flat" cmpd="sng" algn="ctr">
+            <a:noFill/>
+            <a:prstDash val="solid"/>
+            <a:miter lim="800000"/>
+            <a:headEnd type="none" w="med" len="med"/>
+            <a:tailEnd type="none" w="med" len="med"/>
+          </a:ln>
+          <a:effectLst/>
+        </p:spPr>
+        <p:txBody>
+          <a:bodyPr vert="horz" wrap="none" lIns="91440" tIns="45720" rIns="91440" bIns="45720" anchor="ctr" compatLnSpc="1"/>
+          <a:lstStyle/>
+          <a:p>
+            <a:endParaRPr kumimoji="0" lang="en-US"/>
+          </a:p>
+        </p:txBody>
+      </p:sp>
+      <p:sp>
+        <p:nvSpPr>
+          <p:cNvPr id="18" name="Rectangle 17"/>
+          <p:cNvSpPr>
+            <a:spLocks noChangeArrowheads="1"/>
+          </p:cNvSpPr>
+          <p:nvPr/>
+        </p:nvSpPr>
+        <p:spPr bwMode="white">
+          <a:xfrm>
+            <a:off x="0" y="0"/>
+            <a:ext cx="152400" cy="6858000"/>
+          </a:xfrm>
+          <a:prstGeom prst="rect">
+            <a:avLst/>
+          </a:prstGeom>
+          <a:solidFill>
+            <a:srgbClr val="FFFFFF"/>
+          </a:solidFill>
+          <a:ln w="9525" cap="flat" cmpd="sng" algn="ctr">
+            <a:noFill/>
+            <a:prstDash val="solid"/>
+            <a:miter lim="800000"/>
+            <a:headEnd type="none" w="med" len="med"/>
+            <a:tailEnd type="none" w="med" len="med"/>
+          </a:ln>
+          <a:effectLst/>
+        </p:spPr>
+        <p:txBody>
+          <a:bodyPr vert="horz" wrap="none" lIns="91440" tIns="45720" rIns="91440" bIns="45720" anchor="ctr" compatLnSpc="1"/>
+          <a:lstStyle/>
+          <a:p>
+            <a:endParaRPr kumimoji="0" lang="en-US" dirty="0"/>
+          </a:p>
+        </p:txBody>
+      </p:sp>
+      <p:sp>
+        <p:nvSpPr>
+          <p:cNvPr id="20" name="Rectangle 19"/>
+          <p:cNvSpPr>
+            <a:spLocks noChangeArrowheads="1"/>
+          </p:cNvSpPr>
+          <p:nvPr/>
+        </p:nvSpPr>
+        <p:spPr bwMode="auto">
+          <a:xfrm>
+            <a:off x="152400" y="152400"/>
+            <a:ext cx="8833104" cy="301752"/>
+          </a:xfrm>
+          <a:prstGeom prst="rect">
+            <a:avLst/>
+          </a:prstGeom>
+          <a:solidFill>
+            <a:schemeClr val="accent3"/>
+          </a:solidFill>
+          <a:ln w="9525" cap="flat" cmpd="sng" algn="ctr">
+            <a:noFill/>
+            <a:prstDash val="solid"/>
+            <a:miter lim="800000"/>
+            <a:headEnd type="none" w="med" len="med"/>
+            <a:tailEnd type="none" w="med" len="med"/>
+          </a:ln>
+          <a:effectLst/>
+        </p:spPr>
+        <p:txBody>
+          <a:bodyPr vert="horz" wrap="none" lIns="91440" tIns="45720" rIns="91440" bIns="45720" anchor="ctr" compatLnSpc="1"/>
+          <a:lstStyle/>
+          <a:p>
+            <a:endParaRPr kumimoji="0" lang="en-US"/>
+          </a:p>
+        </p:txBody>
+      </p:sp>
+      <p:sp>
+        <p:nvSpPr>
+          <p:cNvPr id="8" name="Rectangle 7"/>
+          <p:cNvSpPr/>
+          <p:nvPr/>
+        </p:nvSpPr>
+        <p:spPr>
+          <a:xfrm>
+            <a:off x="152400" y="609600"/>
+            <a:ext cx="2743200" cy="5867400"/>
+          </a:xfrm>
+          <a:prstGeom prst="rect">
+            <a:avLst/>
+          </a:prstGeom>
+          <a:solidFill>
+            <a:schemeClr val="accent2"/>
+          </a:solidFill>
+          <a:ln w="15875" cap="rnd" cmpd="sng" algn="ctr">
+            <a:noFill/>
+            <a:prstDash val="solid"/>
+          </a:ln>
+          <a:effectLst/>
+        </p:spPr>
+        <p:style>
+          <a:lnRef idx="3">
+            <a:schemeClr val="lt1"/>
+          </a:lnRef>
+          <a:fillRef idx="1">
+            <a:schemeClr val="accent1"/>
+          </a:fillRef>
+          <a:effectRef idx="1">
+            <a:schemeClr val="accent1"/>
+          </a:effectRef>
+          <a:fontRef idx="minor">
+            <a:schemeClr val="lt1"/>
+          </a:fontRef>
+        </p:style>
+        <p:txBody>
+          <a:bodyPr anchor="ctr"/>
+          <a:lstStyle/>
+          <a:p>
+            <a:pPr algn="ctr" eaLnBrk="1" latinLnBrk="0" hangingPunct="1"/>
+            <a:endParaRPr kumimoji="0" lang="en-US"/>
+          </a:p>
+        </p:txBody>
+      </p:sp>
+      <p:sp>
+        <p:nvSpPr>
+          <p:cNvPr id="15" name="Rectangle 14"/>
+          <p:cNvSpPr>
+            <a:spLocks noChangeArrowheads="1"/>
+          </p:cNvSpPr>
+          <p:nvPr/>
+        </p:nvSpPr>
+        <p:spPr bwMode="auto">
+          <a:xfrm>
+            <a:off x="152400" y="155448"/>
+            <a:ext cx="8833104" cy="6547104"/>
+          </a:xfrm>
+          <a:prstGeom prst="rect">
+            <a:avLst/>
+          </a:prstGeom>
+          <a:noFill/>
+          <a:ln w="9525" cap="flat" cmpd="sng" algn="ctr">
+            <a:solidFill>
+              <a:schemeClr val="accent3">
+                <a:shade val="75000"/>
+              </a:schemeClr>
+            </a:solidFill>
+            <a:prstDash val="solid"/>
+            <a:miter lim="800000"/>
+            <a:headEnd type="none" w="med" len="med"/>
+            <a:tailEnd type="none" w="med" len="med"/>
+          </a:ln>
+          <a:effectLst/>
+        </p:spPr>
+        <p:txBody>
+          <a:bodyPr vert="horz" wrap="none" lIns="91440" tIns="45720" rIns="91440" bIns="45720" anchor="ctr" compatLnSpc="1"/>
+          <a:lstStyle/>
+          <a:p>
+            <a:endParaRPr kumimoji="0" lang="en-US" dirty="0"/>
+          </a:p>
+        </p:txBody>
+      </p:sp>
+      <p:sp>
+        <p:nvSpPr>
+          <p:cNvPr id="12" name="Oval 11"/>
+          <p:cNvSpPr/>
+          <p:nvPr/>
+        </p:nvSpPr>
+        <p:spPr>
+          <a:xfrm>
+            <a:off x="1295400" y="228600"/>
+            <a:ext cx="609600" cy="609600"/>
+          </a:xfrm>
+          <a:prstGeom prst="ellipse">
+            <a:avLst/>
+          </a:prstGeom>
+          <a:solidFill>
+            <a:srgbClr val="FFFFFF"/>
+          </a:solidFill>
+          <a:ln w="15875" cap="rnd" cmpd="sng" algn="ctr">
+            <a:noFill/>
+            <a:prstDash val="solid"/>
+          </a:ln>
+          <a:effectLst/>
+        </p:spPr>
+        <p:style>
+          <a:lnRef idx="3">
+            <a:schemeClr val="lt1"/>
+          </a:lnRef>
+          <a:fillRef idx="1">
+            <a:schemeClr val="accent1"/>
+          </a:fillRef>
+          <a:effectRef idx="1">
+            <a:schemeClr val="accent1"/>
+          </a:effectRef>
+          <a:fontRef idx="minor">
+            <a:schemeClr val="lt1"/>
+          </a:fontRef>
+        </p:style>
+        <p:txBody>
+          <a:bodyPr anchor="ctr"/>
+          <a:lstStyle/>
+          <a:p>
+            <a:pPr algn="ctr" eaLnBrk="1" latinLnBrk="0" hangingPunct="1"/>
+            <a:endParaRPr kumimoji="0" lang="en-US"/>
+          </a:p>
+        </p:txBody>
+      </p:sp>
+      <p:sp>
+        <p:nvSpPr>
+          <p:cNvPr id="13" name="Oval 12"/>
+          <p:cNvSpPr/>
+          <p:nvPr/>
+        </p:nvSpPr>
+        <p:spPr>
+          <a:xfrm>
+            <a:off x="1389888" y="323088"/>
+            <a:ext cx="420624" cy="420624"/>
+          </a:xfrm>
+          <a:prstGeom prst="ellipse">
+            <a:avLst/>
+          </a:prstGeom>
+          <a:solidFill>
+            <a:srgbClr val="FFFFFF"/>
+          </a:solidFill>
+          <a:ln w="50800" cap="rnd" cmpd="dbl" algn="ctr">
+            <a:solidFill>
+              <a:schemeClr val="accent3">
+                <a:shade val="75000"/>
+              </a:schemeClr>
+            </a:solidFill>
+            <a:prstDash val="solid"/>
+          </a:ln>
+          <a:effectLst/>
+        </p:spPr>
+        <p:style>
+          <a:lnRef idx="3">
+            <a:schemeClr val="lt1"/>
+          </a:lnRef>
+          <a:fillRef idx="1">
+            <a:schemeClr val="accent1"/>
+          </a:fillRef>
+          <a:effectRef idx="1">
+            <a:schemeClr val="accent1"/>
+          </a:effectRef>
+          <a:fontRef idx="minor">
+            <a:schemeClr val="lt1"/>
+          </a:fontRef>
+        </p:style>
+        <p:txBody>
+          <a:bodyPr anchor="ctr"/>
+          <a:lstStyle/>
+          <a:p>
+            <a:pPr algn="ctr" eaLnBrk="1" latinLnBrk="0" hangingPunct="1"/>
+            <a:endParaRPr kumimoji="0" lang="en-US"/>
+          </a:p>
+        </p:txBody>
+      </p:sp>
+      <p:sp>
+        <p:nvSpPr>
+          <p:cNvPr id="7" name="Slide Number Placeholder 6"/>
+          <p:cNvSpPr>
+            <a:spLocks noGrp="1"/>
+          </p:cNvSpPr>
+          <p:nvPr>
+            <p:ph type="sldNum" sz="quarter" idx="12"/>
+          </p:nvPr>
+        </p:nvSpPr>
+        <p:spPr>
+          <a:xfrm>
+            <a:off x="1371600" y="312738"/>
+            <a:ext cx="457200" cy="441325"/>
+          </a:xfrm>
+        </p:spPr>
+        <p:txBody>
+          <a:bodyPr/>
+          <a:lstStyle/>
+          <a:p>
+            <a:fld id="{BE924555-EAFD-4B2F-96F4-A60706EF2138}" type="slidenum">
+              <a:rPr lang="en-US" smtClean="0"/>
+              <a:pPr/>
+              <a:t>‹#›</a:t>
+            </a:fld>
+            <a:endParaRPr lang="en-US"/>
+          </a:p>
+        </p:txBody>
+      </p:sp>
+      <p:sp>
+        <p:nvSpPr>
+          <p:cNvPr id="2" name="Title 1"/>
+          <p:cNvSpPr>
+            <a:spLocks noGrp="1"/>
+          </p:cNvSpPr>
+          <p:nvPr>
+            <p:ph type="title"/>
+          </p:nvPr>
+        </p:nvSpPr>
+        <p:spPr>
+          <a:xfrm>
+            <a:off x="3000375" y="5029200"/>
+            <a:ext cx="5867400" cy="1219200"/>
+          </a:xfrm>
+        </p:spPr>
+        <p:txBody>
+          <a:bodyPr anchor="t">
+            <a:noAutofit/>
+          </a:bodyPr>
+          <a:lstStyle>
+            <a:lvl1pPr algn="l">
+              <a:buNone/>
+              <a:defRPr sz="2400" b="1">
+                <a:solidFill>
+                  <a:schemeClr val="tx2"/>
+                </a:solidFill>
+              </a:defRPr>
+            </a:lvl1pPr>
+          </a:lstStyle>
+          <a:p>
+            <a:r>
+              <a:rPr kumimoji="0" lang="en-US" smtClean="0"/>
+              <a:t>Click to edit Master title style</a:t>
+            </a:r>
+            <a:endParaRPr kumimoji="0" lang="en-US"/>
+          </a:p>
+        </p:txBody>
+      </p:sp>
+      <p:sp>
+        <p:nvSpPr>
+          <p:cNvPr id="3" name="Picture Placeholder 2"/>
+          <p:cNvSpPr>
+            <a:spLocks noGrp="1"/>
+          </p:cNvSpPr>
+          <p:nvPr>
+            <p:ph type="pic" idx="1"/>
+          </p:nvPr>
+        </p:nvSpPr>
+        <p:spPr>
+          <a:xfrm>
+            <a:off x="3000375" y="609600"/>
+            <a:ext cx="5867400" cy="4267200"/>
+          </a:xfrm>
+        </p:spPr>
+        <p:txBody>
+          <a:bodyPr/>
+          <a:lstStyle>
+            <a:lvl1pPr marL="0" indent="0">
+              <a:buNone/>
+              <a:defRPr sz="3200"/>
+            </a:lvl1pPr>
+          </a:lstStyle>
+          <a:p>
+            <a:r>
+              <a:rPr kumimoji="0" lang="en-US" smtClean="0"/>
+              <a:t>Drag picture to placeholder or click icon to add</a:t>
+            </a:r>
+            <a:endParaRPr kumimoji="0" lang="en-US" dirty="0"/>
+          </a:p>
+        </p:txBody>
+      </p:sp>
+      <p:sp>
+        <p:nvSpPr>
+          <p:cNvPr id="4" name="Text Placeholder 3"/>
+          <p:cNvSpPr>
+            <a:spLocks noGrp="1"/>
+          </p:cNvSpPr>
+          <p:nvPr>
+            <p:ph type="body" sz="half" idx="2"/>
+          </p:nvPr>
+        </p:nvSpPr>
+        <p:spPr>
+          <a:xfrm>
+            <a:off x="381000" y="990600"/>
+            <a:ext cx="2438400" cy="5257800"/>
+          </a:xfrm>
+        </p:spPr>
+        <p:txBody>
+          <a:bodyPr/>
+          <a:lstStyle>
+            <a:lvl1pPr marL="0" indent="0">
+              <a:spcAft>
+                <a:spcPts val="1000"/>
+              </a:spcAft>
+              <a:buFontTx/>
+              <a:buNone/>
+              <a:defRPr sz="1600">
+                <a:solidFill>
+                  <a:srgbClr val="FFFFFF"/>
+                </a:solidFill>
+              </a:defRPr>
+            </a:lvl1pPr>
+            <a:lvl2pPr>
+              <a:defRPr sz="1200"/>
+            </a:lvl2pPr>
+            <a:lvl3pPr>
+              <a:defRPr sz="1000"/>
+            </a:lvl3pPr>
+            <a:lvl4pPr>
+              <a:defRPr sz="900"/>
+            </a:lvl4pPr>
+            <a:lvl5pPr>
+              <a:defRPr sz="900"/>
+            </a:lvl5pPr>
+          </a:lstStyle>
+          <a:p>
+            <a:pPr lvl="0" eaLnBrk="1" latinLnBrk="0" hangingPunct="1"/>
+            <a:r>
+              <a:rPr kumimoji="0" lang="en-US" smtClean="0"/>
+              <a:t>Click to edit Master text styles</a:t>
+            </a:r>
+          </a:p>
+        </p:txBody>
+      </p:sp>
+      <p:sp>
+        <p:nvSpPr>
+          <p:cNvPr id="22" name="Rectangle 21"/>
+          <p:cNvSpPr>
+            <a:spLocks noChangeArrowheads="1"/>
+          </p:cNvSpPr>
+          <p:nvPr/>
+        </p:nvSpPr>
+        <p:spPr bwMode="auto">
+          <a:xfrm>
+            <a:off x="149352" y="6388385"/>
+            <a:ext cx="8833104" cy="309563"/>
+          </a:xfrm>
+          <a:prstGeom prst="rect">
+            <a:avLst/>
+          </a:prstGeom>
+          <a:solidFill>
+            <a:schemeClr val="accent3"/>
+          </a:solidFill>
+          <a:ln w="9525" cap="flat" cmpd="sng" algn="ctr">
+            <a:noFill/>
+            <a:prstDash val="solid"/>
+            <a:miter lim="800000"/>
+            <a:headEnd type="none" w="med" len="med"/>
+            <a:tailEnd type="none" w="med" len="med"/>
+          </a:ln>
+          <a:effectLst/>
+        </p:spPr>
+        <p:txBody>
+          <a:bodyPr vert="horz" wrap="none" lIns="91440" tIns="45720" rIns="91440" bIns="45720" anchor="ctr" compatLnSpc="1"/>
+          <a:lstStyle/>
+          <a:p>
+            <a:endParaRPr kumimoji="0" lang="en-US"/>
+          </a:p>
+        </p:txBody>
+      </p:sp>
+      <p:sp>
+        <p:nvSpPr>
+          <p:cNvPr id="5" name="Date Placeholder 4"/>
+          <p:cNvSpPr>
+            <a:spLocks noGrp="1"/>
+          </p:cNvSpPr>
+          <p:nvPr>
+            <p:ph type="dt" sz="half" idx="10"/>
+          </p:nvPr>
+        </p:nvSpPr>
+        <p:spPr>
+          <a:xfrm>
+            <a:off x="5788152" y="6404984"/>
+            <a:ext cx="3044952" cy="365760"/>
+          </a:xfrm>
+        </p:spPr>
+        <p:txBody>
+          <a:bodyPr/>
+          <a:lstStyle/>
+          <a:p>
+            <a:r>
+              <a:rPr lang="en-US" smtClean="0"/>
+              <a:t>Feb. 7. 2014</a:t>
+            </a:r>
+            <a:endParaRPr lang="en-US"/>
+          </a:p>
+        </p:txBody>
+      </p:sp>
+      <p:sp>
+        <p:nvSpPr>
+          <p:cNvPr id="6" name="Footer Placeholder 5"/>
+          <p:cNvSpPr>
+            <a:spLocks noGrp="1"/>
+          </p:cNvSpPr>
+          <p:nvPr>
+            <p:ph type="ftr" sz="quarter" idx="11"/>
+          </p:nvPr>
+        </p:nvSpPr>
+        <p:spPr>
+          <a:xfrm>
+            <a:off x="301752" y="6410848"/>
+            <a:ext cx="3584448" cy="365760"/>
+          </a:xfrm>
+        </p:spPr>
+        <p:txBody>
+          <a:bodyPr/>
+          <a:lstStyle/>
+          <a:p>
+            <a:r>
+              <a:rPr lang="en-US" smtClean="0"/>
+              <a:t>Matt Smith - WebDriver &amp; Selenium</a:t>
+            </a:r>
+            <a:endParaRPr lang="en-US"/>
+          </a:p>
+        </p:txBody>
+      </p:sp>
+    </p:spTree>
+  </p:cSld>
+  <p:clrMapOvr>
+    <a:masterClrMapping/>
+  </p:clrMapOvr>
+</p:sldLayout>
+</file>
+
+<file path=ppt/slideLayouts/slideLayout11.xml><?xml version="1.0" encoding="utf-8"?>
 <p:sldLayout xmlns:a="http://schemas.openxmlformats.org/drawingml/2006/main" xmlns:r="http://schemas.openxmlformats.org/officeDocument/2006/relationships" xmlns:p="http://schemas.openxmlformats.org/presentationml/2006/main" type="vertTx" preserve="1">
   <p:cSld name="Title and Vertical Text">
     <p:spTree>
@@ -1210,11 +2059,10 @@
           <a:bodyPr/>
           <a:lstStyle/>
           <a:p>
-            <a:fld id="{EE625E72-7062-4D8E-BA99-F07B9DD1F028}" type="datetimeFigureOut">
-              <a:rPr lang="en-US" smtClean="0"/>
-              <a:pPr/>
-              <a:t>2/3/14</a:t>
-            </a:fld>
+            <a:r>
+              <a:rPr lang="en-US" smtClean="0"/>
+              <a:t>Feb. 7. 2014</a:t>
+            </a:r>
             <a:endParaRPr lang="en-US"/>
           </a:p>
         </p:txBody>
@@ -1234,6 +2082,10 @@
           <a:bodyPr/>
           <a:lstStyle/>
           <a:p>
+            <a:r>
+              <a:rPr lang="en-US" smtClean="0"/>
+              <a:t>Matt Smith - WebDriver &amp; Selenium</a:t>
+            </a:r>
             <a:endParaRPr lang="en-US"/>
           </a:p>
         </p:txBody>
@@ -1270,7 +2122,7 @@
 </p:sldLayout>
 </file>
 
-<file path=ppt/slideLayouts/slideLayout11.xml><?xml version="1.0" encoding="utf-8"?>
+<file path=ppt/slideLayouts/slideLayout12.xml><?xml version="1.0" encoding="utf-8"?>
 <p:sldLayout xmlns:a="http://schemas.openxmlformats.org/drawingml/2006/main" xmlns:r="http://schemas.openxmlformats.org/officeDocument/2006/relationships" xmlns:p="http://schemas.openxmlformats.org/presentationml/2006/main" showMasterSp="0" type="vertTitleAndTx" preserve="1">
   <p:cSld name="Vertical Title and Text">
     <p:spTree>
@@ -1740,11 +2592,10 @@
           <a:bodyPr/>
           <a:lstStyle/>
           <a:p>
-            <a:fld id="{EE625E72-7062-4D8E-BA99-F07B9DD1F028}" type="datetimeFigureOut">
-              <a:rPr lang="en-US" smtClean="0"/>
-              <a:pPr/>
-              <a:t>2/3/14</a:t>
-            </a:fld>
+            <a:r>
+              <a:rPr lang="en-US" smtClean="0"/>
+              <a:t>Feb. 7. 2014</a:t>
+            </a:r>
             <a:endParaRPr lang="en-US"/>
           </a:p>
         </p:txBody>
@@ -1764,6 +2615,10 @@
           <a:bodyPr/>
           <a:lstStyle/>
           <a:p>
+            <a:r>
+              <a:rPr lang="en-US" smtClean="0"/>
+              <a:t>Matt Smith - WebDriver &amp; Selenium</a:t>
+            </a:r>
             <a:endParaRPr lang="en-US"/>
           </a:p>
         </p:txBody>
@@ -1869,11 +2724,10 @@
           <a:bodyPr/>
           <a:lstStyle/>
           <a:p>
-            <a:fld id="{EE625E72-7062-4D8E-BA99-F07B9DD1F028}" type="datetimeFigureOut">
-              <a:rPr lang="en-US" smtClean="0"/>
-              <a:pPr/>
-              <a:t>2/3/14</a:t>
-            </a:fld>
+            <a:r>
+              <a:rPr lang="en-US" smtClean="0"/>
+              <a:t>Feb. 7. 2014</a:t>
+            </a:r>
             <a:endParaRPr lang="en-US"/>
           </a:p>
         </p:txBody>
@@ -1893,6 +2747,10 @@
           <a:bodyPr/>
           <a:lstStyle/>
           <a:p>
+            <a:r>
+              <a:rPr lang="en-US" smtClean="0"/>
+              <a:t>Matt Smith - WebDriver &amp; Selenium</a:t>
+            </a:r>
             <a:endParaRPr lang="en-US"/>
           </a:p>
         </p:txBody>
@@ -1992,6 +2850,248 @@
 </file>
 
 <file path=ppt/slideLayouts/slideLayout3.xml><?xml version="1.0" encoding="utf-8"?>
+<p:sldLayout xmlns:a="http://schemas.openxmlformats.org/drawingml/2006/main" xmlns:r="http://schemas.openxmlformats.org/officeDocument/2006/relationships" xmlns:p="http://schemas.openxmlformats.org/presentationml/2006/main" type="obj" preserve="1">
+  <p:cSld name="Title and Content Light">
+    <p:bg>
+      <p:bgPr>
+        <a:blipFill>
+          <a:blip r:embed="rId2">
+            <a:alphaModFix amt="30000"/>
+          </a:blip>
+          <a:tile tx="0" ty="0" sx="65000" sy="65000" flip="none" algn="tl"/>
+        </a:blipFill>
+        <a:effectLst/>
+      </p:bgPr>
+    </p:bg>
+    <p:spTree>
+      <p:nvGrpSpPr>
+        <p:cNvPr id="1" name=""/>
+        <p:cNvGrpSpPr/>
+        <p:nvPr/>
+      </p:nvGrpSpPr>
+      <p:grpSpPr>
+        <a:xfrm>
+          <a:off x="0" y="0"/>
+          <a:ext cx="0" cy="0"/>
+          <a:chOff x="0" y="0"/>
+          <a:chExt cx="0" cy="0"/>
+        </a:xfrm>
+      </p:grpSpPr>
+      <p:sp>
+        <p:nvSpPr>
+          <p:cNvPr id="2" name="Title 1"/>
+          <p:cNvSpPr>
+            <a:spLocks noGrp="1"/>
+          </p:cNvSpPr>
+          <p:nvPr>
+            <p:ph type="title"/>
+          </p:nvPr>
+        </p:nvSpPr>
+        <p:spPr/>
+        <p:txBody>
+          <a:bodyPr/>
+          <a:lstStyle>
+            <a:lvl1pPr>
+              <a:defRPr>
+                <a:solidFill>
+                  <a:schemeClr val="accent3">
+                    <a:shade val="75000"/>
+                  </a:schemeClr>
+                </a:solidFill>
+              </a:defRPr>
+            </a:lvl1pPr>
+          </a:lstStyle>
+          <a:p>
+            <a:r>
+              <a:rPr kumimoji="0" lang="en-US" smtClean="0"/>
+              <a:t>Click to edit Master title style</a:t>
+            </a:r>
+            <a:endParaRPr kumimoji="0" lang="en-US"/>
+          </a:p>
+        </p:txBody>
+      </p:sp>
+      <p:sp>
+        <p:nvSpPr>
+          <p:cNvPr id="4" name="Date Placeholder 3"/>
+          <p:cNvSpPr>
+            <a:spLocks noGrp="1"/>
+          </p:cNvSpPr>
+          <p:nvPr>
+            <p:ph type="dt" sz="half" idx="10"/>
+          </p:nvPr>
+        </p:nvSpPr>
+        <p:spPr/>
+        <p:txBody>
+          <a:bodyPr/>
+          <a:lstStyle/>
+          <a:p>
+            <a:r>
+              <a:rPr lang="en-US" smtClean="0"/>
+              <a:t>Feb. 7. 2014</a:t>
+            </a:r>
+            <a:endParaRPr lang="en-US"/>
+          </a:p>
+        </p:txBody>
+      </p:sp>
+      <p:sp>
+        <p:nvSpPr>
+          <p:cNvPr id="5" name="Footer Placeholder 4"/>
+          <p:cNvSpPr>
+            <a:spLocks noGrp="1"/>
+          </p:cNvSpPr>
+          <p:nvPr>
+            <p:ph type="ftr" sz="quarter" idx="11"/>
+          </p:nvPr>
+        </p:nvSpPr>
+        <p:spPr/>
+        <p:txBody>
+          <a:bodyPr/>
+          <a:lstStyle/>
+          <a:p>
+            <a:r>
+              <a:rPr lang="en-US" smtClean="0"/>
+              <a:t>Matt Smith - WebDriver &amp; Selenium</a:t>
+            </a:r>
+            <a:endParaRPr lang="en-US"/>
+          </a:p>
+        </p:txBody>
+      </p:sp>
+      <p:sp>
+        <p:nvSpPr>
+          <p:cNvPr id="6" name="Slide Number Placeholder 5"/>
+          <p:cNvSpPr>
+            <a:spLocks noGrp="1"/>
+          </p:cNvSpPr>
+          <p:nvPr>
+            <p:ph type="sldNum" sz="quarter" idx="12"/>
+          </p:nvPr>
+        </p:nvSpPr>
+        <p:spPr>
+          <a:xfrm>
+            <a:off x="4343400" y="1026372"/>
+            <a:ext cx="457200" cy="441325"/>
+          </a:xfrm>
+        </p:spPr>
+        <p:txBody>
+          <a:bodyPr/>
+          <a:lstStyle/>
+          <a:p>
+            <a:fld id="{BE924555-EAFD-4B2F-96F4-A60706EF2138}" type="slidenum">
+              <a:rPr lang="en-US" smtClean="0"/>
+              <a:pPr/>
+              <a:t>‹#›</a:t>
+            </a:fld>
+            <a:endParaRPr lang="en-US"/>
+          </a:p>
+        </p:txBody>
+      </p:sp>
+      <p:sp>
+        <p:nvSpPr>
+          <p:cNvPr id="8" name="Content Placeholder 7"/>
+          <p:cNvSpPr>
+            <a:spLocks noGrp="1"/>
+          </p:cNvSpPr>
+          <p:nvPr>
+            <p:ph sz="quarter" idx="1"/>
+          </p:nvPr>
+        </p:nvSpPr>
+        <p:spPr>
+          <a:xfrm>
+            <a:off x="301752" y="1527048"/>
+            <a:ext cx="8503920" cy="4572000"/>
+          </a:xfrm>
+        </p:spPr>
+        <p:txBody>
+          <a:bodyPr/>
+          <a:lstStyle>
+            <a:lvl1pPr>
+              <a:defRPr>
+                <a:solidFill>
+                  <a:schemeClr val="bg1"/>
+                </a:solidFill>
+              </a:defRPr>
+            </a:lvl1pPr>
+            <a:lvl2pPr>
+              <a:defRPr>
+                <a:solidFill>
+                  <a:schemeClr val="bg1"/>
+                </a:solidFill>
+              </a:defRPr>
+            </a:lvl2pPr>
+            <a:lvl3pPr>
+              <a:defRPr>
+                <a:solidFill>
+                  <a:schemeClr val="bg1"/>
+                </a:solidFill>
+              </a:defRPr>
+            </a:lvl3pPr>
+            <a:lvl4pPr>
+              <a:defRPr>
+                <a:solidFill>
+                  <a:schemeClr val="bg1"/>
+                </a:solidFill>
+              </a:defRPr>
+            </a:lvl4pPr>
+            <a:lvl5pPr>
+              <a:defRPr>
+                <a:solidFill>
+                  <a:schemeClr val="bg1"/>
+                </a:solidFill>
+              </a:defRPr>
+            </a:lvl5pPr>
+          </a:lstStyle>
+          <a:p>
+            <a:pPr lvl="0" eaLnBrk="1" latinLnBrk="0" hangingPunct="1"/>
+            <a:r>
+              <a:rPr lang="en-US" dirty="0" smtClean="0"/>
+              <a:t>Click to edit Master text styles</a:t>
+            </a:r>
+          </a:p>
+          <a:p>
+            <a:pPr lvl="1" eaLnBrk="1" latinLnBrk="0" hangingPunct="1"/>
+            <a:r>
+              <a:rPr lang="en-US" dirty="0" smtClean="0"/>
+              <a:t>Second level</a:t>
+            </a:r>
+          </a:p>
+          <a:p>
+            <a:pPr lvl="2" eaLnBrk="1" latinLnBrk="0" hangingPunct="1"/>
+            <a:r>
+              <a:rPr lang="en-US" dirty="0" smtClean="0"/>
+              <a:t>Third level</a:t>
+            </a:r>
+          </a:p>
+          <a:p>
+            <a:pPr lvl="3" eaLnBrk="1" latinLnBrk="0" hangingPunct="1"/>
+            <a:r>
+              <a:rPr lang="en-US" dirty="0" smtClean="0"/>
+              <a:t>Fourth level</a:t>
+            </a:r>
+          </a:p>
+          <a:p>
+            <a:pPr lvl="4" eaLnBrk="1" latinLnBrk="0" hangingPunct="1"/>
+            <a:r>
+              <a:rPr lang="en-US" dirty="0" smtClean="0"/>
+              <a:t>Fifth level</a:t>
+            </a:r>
+            <a:endParaRPr kumimoji="0" lang="en-US" dirty="0"/>
+          </a:p>
+        </p:txBody>
+      </p:sp>
+    </p:spTree>
+    <p:extLst>
+      <p:ext uri="{BB962C8B-B14F-4D97-AF65-F5344CB8AC3E}">
+        <p14:creationId xmlns:p14="http://schemas.microsoft.com/office/powerpoint/2010/main" val="1774582843"/>
+      </p:ext>
+    </p:extLst>
+  </p:cSld>
+  <p:clrMapOvr>
+    <a:masterClrMapping/>
+  </p:clrMapOvr>
+</p:sldLayout>
+</file>
+
+<file path=ppt/slideLayouts/slideLayout4.xml><?xml version="1.0" encoding="utf-8"?>
 <p:sldLayout xmlns:a="http://schemas.openxmlformats.org/drawingml/2006/main" xmlns:r="http://schemas.openxmlformats.org/officeDocument/2006/relationships" xmlns:p="http://schemas.openxmlformats.org/presentationml/2006/main" showMasterSp="0" type="secHead" preserve="1">
   <p:cSld name="Section Header">
     <p:spTree>
@@ -2390,6 +3490,10 @@
           <a:bodyPr/>
           <a:lstStyle/>
           <a:p>
+            <a:r>
+              <a:rPr lang="en-US" smtClean="0"/>
+              <a:t>Matt Smith - WebDriver &amp; Selenium</a:t>
+            </a:r>
             <a:endParaRPr lang="en-US"/>
           </a:p>
         </p:txBody>
@@ -2409,11 +3513,10 @@
           <a:bodyPr/>
           <a:lstStyle/>
           <a:p>
-            <a:fld id="{EE625E72-7062-4D8E-BA99-F07B9DD1F028}" type="datetimeFigureOut">
-              <a:rPr lang="en-US" smtClean="0"/>
-              <a:pPr/>
-              <a:t>2/3/14</a:t>
-            </a:fld>
+            <a:r>
+              <a:rPr lang="en-US" smtClean="0"/>
+              <a:t>Feb. 7. 2014</a:t>
+            </a:r>
             <a:endParaRPr lang="en-US"/>
           </a:p>
         </p:txBody>
@@ -2636,7 +3739,7 @@
 </p:sldLayout>
 </file>
 
-<file path=ppt/slideLayouts/slideLayout4.xml><?xml version="1.0" encoding="utf-8"?>
+<file path=ppt/slideLayouts/slideLayout5.xml><?xml version="1.0" encoding="utf-8"?>
 <p:sldLayout xmlns:a="http://schemas.openxmlformats.org/drawingml/2006/main" xmlns:r="http://schemas.openxmlformats.org/officeDocument/2006/relationships" xmlns:p="http://schemas.openxmlformats.org/presentationml/2006/main" type="twoObj" preserve="1">
   <p:cSld name="Two Content">
     <p:spTree>
@@ -2701,11 +3804,10 @@
           <a:bodyPr/>
           <a:lstStyle/>
           <a:p>
-            <a:fld id="{EE625E72-7062-4D8E-BA99-F07B9DD1F028}" type="datetimeFigureOut">
-              <a:rPr lang="en-US" smtClean="0"/>
-              <a:pPr/>
-              <a:t>2/3/14</a:t>
-            </a:fld>
+            <a:r>
+              <a:rPr lang="en-US" smtClean="0"/>
+              <a:t>Feb. 7. 2014</a:t>
+            </a:r>
             <a:endParaRPr lang="en-US"/>
           </a:p>
         </p:txBody>
@@ -2725,6 +3827,10 @@
           <a:bodyPr/>
           <a:lstStyle/>
           <a:p>
+            <a:r>
+              <a:rPr lang="en-US" smtClean="0"/>
+              <a:t>Matt Smith - WebDriver &amp; Selenium</a:t>
+            </a:r>
             <a:endParaRPr lang="en-US"/>
           </a:p>
         </p:txBody>
@@ -2919,7 +4025,7 @@
 </p:sldLayout>
 </file>
 
-<file path=ppt/slideLayouts/slideLayout5.xml><?xml version="1.0" encoding="utf-8"?>
+<file path=ppt/slideLayouts/slideLayout6.xml><?xml version="1.0" encoding="utf-8"?>
 <p:sldLayout xmlns:a="http://schemas.openxmlformats.org/drawingml/2006/main" xmlns:r="http://schemas.openxmlformats.org/officeDocument/2006/relationships" xmlns:p="http://schemas.openxmlformats.org/presentationml/2006/main" showMasterSp="0" type="twoTxTwoObj" preserve="1">
   <p:cSld name="Comparison">
     <p:spTree>
@@ -3357,11 +4463,10 @@
           <a:bodyPr/>
           <a:lstStyle/>
           <a:p>
-            <a:fld id="{EE625E72-7062-4D8E-BA99-F07B9DD1F028}" type="datetimeFigureOut">
-              <a:rPr lang="en-US" smtClean="0"/>
-              <a:pPr/>
-              <a:t>2/3/14</a:t>
-            </a:fld>
+            <a:r>
+              <a:rPr lang="en-US" smtClean="0"/>
+              <a:t>Feb. 7. 2014</a:t>
+            </a:r>
             <a:endParaRPr lang="en-US"/>
           </a:p>
         </p:txBody>
@@ -3386,6 +4491,10 @@
           <a:bodyPr/>
           <a:lstStyle/>
           <a:p>
+            <a:r>
+              <a:rPr lang="en-US" smtClean="0"/>
+              <a:t>Matt Smith - WebDriver &amp; Selenium</a:t>
+            </a:r>
             <a:endParaRPr lang="en-US"/>
           </a:p>
         </p:txBody>
@@ -3740,7 +4849,7 @@
 </p:sldLayout>
 </file>
 
-<file path=ppt/slideLayouts/slideLayout6.xml><?xml version="1.0" encoding="utf-8"?>
+<file path=ppt/slideLayouts/slideLayout7.xml><?xml version="1.0" encoding="utf-8"?>
 <p:sldLayout xmlns:a="http://schemas.openxmlformats.org/drawingml/2006/main" xmlns:r="http://schemas.openxmlformats.org/officeDocument/2006/relationships" xmlns:p="http://schemas.openxmlformats.org/presentationml/2006/main" type="titleOnly" preserve="1">
   <p:cSld name="Title Only">
     <p:spTree>
@@ -3795,11 +4904,10 @@
           <a:bodyPr/>
           <a:lstStyle/>
           <a:p>
-            <a:fld id="{EE625E72-7062-4D8E-BA99-F07B9DD1F028}" type="datetimeFigureOut">
-              <a:rPr lang="en-US" smtClean="0"/>
-              <a:pPr/>
-              <a:t>2/3/14</a:t>
-            </a:fld>
+            <a:r>
+              <a:rPr lang="en-US" smtClean="0"/>
+              <a:t>Feb. 7. 2014</a:t>
+            </a:r>
             <a:endParaRPr lang="en-US"/>
           </a:p>
         </p:txBody>
@@ -3819,6 +4927,10 @@
           <a:bodyPr/>
           <a:lstStyle/>
           <a:p>
+            <a:r>
+              <a:rPr lang="en-US" smtClean="0"/>
+              <a:t>Matt Smith - WebDriver &amp; Selenium</a:t>
+            </a:r>
             <a:endParaRPr lang="en-US"/>
           </a:p>
         </p:txBody>
@@ -3860,7 +4972,7 @@
 </p:sldLayout>
 </file>
 
-<file path=ppt/slideLayouts/slideLayout7.xml><?xml version="1.0" encoding="utf-8"?>
+<file path=ppt/slideLayouts/slideLayout8.xml><?xml version="1.0" encoding="utf-8"?>
 <p:sldLayout xmlns:a="http://schemas.openxmlformats.org/drawingml/2006/main" xmlns:r="http://schemas.openxmlformats.org/officeDocument/2006/relationships" xmlns:p="http://schemas.openxmlformats.org/presentationml/2006/main" showMasterSp="0" type="blank" preserve="1">
   <p:cSld name="Blank">
     <p:spTree>
@@ -4110,11 +5222,10 @@
           <a:bodyPr/>
           <a:lstStyle/>
           <a:p>
-            <a:fld id="{EE625E72-7062-4D8E-BA99-F07B9DD1F028}" type="datetimeFigureOut">
-              <a:rPr lang="en-US" smtClean="0"/>
-              <a:pPr/>
-              <a:t>2/3/14</a:t>
-            </a:fld>
+            <a:r>
+              <a:rPr lang="en-US" smtClean="0"/>
+              <a:t>Feb. 7. 2014</a:t>
+            </a:r>
             <a:endParaRPr lang="en-US"/>
           </a:p>
         </p:txBody>
@@ -4134,6 +5245,10 @@
           <a:bodyPr/>
           <a:lstStyle/>
           <a:p>
+            <a:r>
+              <a:rPr lang="en-US" smtClean="0"/>
+              <a:t>Matt Smith - WebDriver &amp; Selenium</a:t>
+            </a:r>
             <a:endParaRPr lang="en-US"/>
           </a:p>
         </p:txBody>
@@ -4183,7 +5298,7 @@
 </p:sldLayout>
 </file>
 
-<file path=ppt/slideLayouts/slideLayout8.xml><?xml version="1.0" encoding="utf-8"?>
+<file path=ppt/slideLayouts/slideLayout9.xml><?xml version="1.0" encoding="utf-8"?>
 <p:sldLayout xmlns:a="http://schemas.openxmlformats.org/drawingml/2006/main" xmlns:r="http://schemas.openxmlformats.org/officeDocument/2006/relationships" xmlns:p="http://schemas.openxmlformats.org/presentationml/2006/main" showMasterSp="0" type="objTx" preserve="1">
   <p:cSld name="Content with Caption">
     <p:spTree>
@@ -4840,11 +5955,10 @@
           <a:bodyPr/>
           <a:lstStyle/>
           <a:p>
-            <a:fld id="{EE625E72-7062-4D8E-BA99-F07B9DD1F028}" type="datetimeFigureOut">
-              <a:rPr lang="en-US" smtClean="0"/>
-              <a:pPr/>
-              <a:t>2/3/14</a:t>
-            </a:fld>
+            <a:r>
+              <a:rPr lang="en-US" smtClean="0"/>
+              <a:t>Feb. 7. 2014</a:t>
+            </a:r>
             <a:endParaRPr lang="en-US"/>
           </a:p>
         </p:txBody>
@@ -4869,672 +5983,10 @@
           <a:bodyPr/>
           <a:lstStyle/>
           <a:p>
-            <a:endParaRPr lang="en-US"/>
-          </a:p>
-        </p:txBody>
-      </p:sp>
-    </p:spTree>
-  </p:cSld>
-  <p:clrMapOvr>
-    <a:masterClrMapping/>
-  </p:clrMapOvr>
-</p:sldLayout>
-</file>
-
-<file path=ppt/slideLayouts/slideLayout9.xml><?xml version="1.0" encoding="utf-8"?>
-<p:sldLayout xmlns:a="http://schemas.openxmlformats.org/drawingml/2006/main" xmlns:r="http://schemas.openxmlformats.org/officeDocument/2006/relationships" xmlns:p="http://schemas.openxmlformats.org/presentationml/2006/main" showMasterSp="0" type="picTx" preserve="1">
-  <p:cSld name="Picture with Caption">
-    <p:spTree>
-      <p:nvGrpSpPr>
-        <p:cNvPr id="1" name=""/>
-        <p:cNvGrpSpPr/>
-        <p:nvPr/>
-      </p:nvGrpSpPr>
-      <p:grpSpPr>
-        <a:xfrm>
-          <a:off x="0" y="0"/>
-          <a:ext cx="0" cy="0"/>
-          <a:chOff x="0" y="0"/>
-          <a:chExt cx="0" cy="0"/>
-        </a:xfrm>
-      </p:grpSpPr>
-      <p:sp>
-        <p:nvSpPr>
-          <p:cNvPr id="21" name="Straight Connector 20"/>
-          <p:cNvSpPr>
-            <a:spLocks noChangeShapeType="1"/>
-          </p:cNvSpPr>
-          <p:nvPr/>
-        </p:nvSpPr>
-        <p:spPr bwMode="auto">
-          <a:xfrm>
-            <a:off x="152400" y="533400"/>
-            <a:ext cx="8833104" cy="0"/>
-          </a:xfrm>
-          <a:prstGeom prst="line">
-            <a:avLst/>
-          </a:prstGeom>
-          <a:noFill/>
-          <a:ln w="11430" cap="flat" cmpd="sng" algn="ctr">
-            <a:solidFill>
-              <a:schemeClr val="accent3">
-                <a:shade val="75000"/>
-              </a:schemeClr>
-            </a:solidFill>
-            <a:prstDash val="sysDash"/>
-            <a:round/>
-            <a:headEnd type="none" w="med" len="med"/>
-            <a:tailEnd type="none" w="med" len="med"/>
-          </a:ln>
-          <a:effectLst/>
-        </p:spPr>
-        <p:txBody>
-          <a:bodyPr vert="horz" wrap="none" lIns="91440" tIns="45720" rIns="91440" bIns="45720" anchor="ctr" compatLnSpc="1"/>
-          <a:lstStyle/>
-          <a:p>
-            <a:endParaRPr kumimoji="0" lang="en-US"/>
-          </a:p>
-        </p:txBody>
-      </p:sp>
-      <p:sp>
-        <p:nvSpPr>
-          <p:cNvPr id="19" name="Rectangle 18"/>
-          <p:cNvSpPr>
-            <a:spLocks noChangeArrowheads="1"/>
-          </p:cNvSpPr>
-          <p:nvPr/>
-        </p:nvSpPr>
-        <p:spPr bwMode="white">
-          <a:xfrm>
-            <a:off x="0" y="6705600"/>
-            <a:ext cx="9144000" cy="152400"/>
-          </a:xfrm>
-          <a:prstGeom prst="rect">
-            <a:avLst/>
-          </a:prstGeom>
-          <a:solidFill>
-            <a:srgbClr val="FFFFFF"/>
-          </a:solidFill>
-          <a:ln w="9525" cap="flat" cmpd="sng" algn="ctr">
-            <a:noFill/>
-            <a:prstDash val="solid"/>
-            <a:miter lim="800000"/>
-            <a:headEnd type="none" w="med" len="med"/>
-            <a:tailEnd type="none" w="med" len="med"/>
-          </a:ln>
-          <a:effectLst/>
-        </p:spPr>
-        <p:txBody>
-          <a:bodyPr vert="horz" wrap="none" lIns="91440" tIns="45720" rIns="91440" bIns="45720" anchor="ctr" compatLnSpc="1"/>
-          <a:lstStyle/>
-          <a:p>
-            <a:endParaRPr kumimoji="0" lang="en-US"/>
-          </a:p>
-        </p:txBody>
-      </p:sp>
-      <p:sp>
-        <p:nvSpPr>
-          <p:cNvPr id="16" name="Rectangle 15"/>
-          <p:cNvSpPr>
-            <a:spLocks noChangeArrowheads="1"/>
-          </p:cNvSpPr>
-          <p:nvPr/>
-        </p:nvSpPr>
-        <p:spPr bwMode="white">
-          <a:xfrm>
-            <a:off x="8991600" y="0"/>
-            <a:ext cx="152400" cy="6858000"/>
-          </a:xfrm>
-          <a:prstGeom prst="rect">
-            <a:avLst/>
-          </a:prstGeom>
-          <a:solidFill>
-            <a:srgbClr val="FFFFFF"/>
-          </a:solidFill>
-          <a:ln w="9525" cap="flat" cmpd="sng" algn="ctr">
-            <a:noFill/>
-            <a:prstDash val="solid"/>
-            <a:miter lim="800000"/>
-            <a:headEnd type="none" w="med" len="med"/>
-            <a:tailEnd type="none" w="med" len="med"/>
-          </a:ln>
-          <a:effectLst/>
-        </p:spPr>
-        <p:txBody>
-          <a:bodyPr vert="horz" wrap="none" lIns="91440" tIns="45720" rIns="91440" bIns="45720" anchor="ctr" compatLnSpc="1"/>
-          <a:lstStyle/>
-          <a:p>
-            <a:endParaRPr kumimoji="0" lang="en-US"/>
-          </a:p>
-        </p:txBody>
-      </p:sp>
-      <p:sp>
-        <p:nvSpPr>
-          <p:cNvPr id="17" name="Rectangle 16"/>
-          <p:cNvSpPr>
-            <a:spLocks noChangeArrowheads="1"/>
-          </p:cNvSpPr>
-          <p:nvPr/>
-        </p:nvSpPr>
-        <p:spPr bwMode="white">
-          <a:xfrm>
-            <a:off x="0" y="0"/>
-            <a:ext cx="9144000" cy="152400"/>
-          </a:xfrm>
-          <a:prstGeom prst="rect">
-            <a:avLst/>
-          </a:prstGeom>
-          <a:solidFill>
-            <a:srgbClr val="FFFFFF"/>
-          </a:solidFill>
-          <a:ln w="9525" cap="flat" cmpd="sng" algn="ctr">
-            <a:noFill/>
-            <a:prstDash val="solid"/>
-            <a:miter lim="800000"/>
-            <a:headEnd type="none" w="med" len="med"/>
-            <a:tailEnd type="none" w="med" len="med"/>
-          </a:ln>
-          <a:effectLst/>
-        </p:spPr>
-        <p:txBody>
-          <a:bodyPr vert="horz" wrap="none" lIns="91440" tIns="45720" rIns="91440" bIns="45720" anchor="ctr" compatLnSpc="1"/>
-          <a:lstStyle/>
-          <a:p>
-            <a:endParaRPr kumimoji="0" lang="en-US"/>
-          </a:p>
-        </p:txBody>
-      </p:sp>
-      <p:sp>
-        <p:nvSpPr>
-          <p:cNvPr id="18" name="Rectangle 17"/>
-          <p:cNvSpPr>
-            <a:spLocks noChangeArrowheads="1"/>
-          </p:cNvSpPr>
-          <p:nvPr/>
-        </p:nvSpPr>
-        <p:spPr bwMode="white">
-          <a:xfrm>
-            <a:off x="0" y="0"/>
-            <a:ext cx="152400" cy="6858000"/>
-          </a:xfrm>
-          <a:prstGeom prst="rect">
-            <a:avLst/>
-          </a:prstGeom>
-          <a:solidFill>
-            <a:srgbClr val="FFFFFF"/>
-          </a:solidFill>
-          <a:ln w="9525" cap="flat" cmpd="sng" algn="ctr">
-            <a:noFill/>
-            <a:prstDash val="solid"/>
-            <a:miter lim="800000"/>
-            <a:headEnd type="none" w="med" len="med"/>
-            <a:tailEnd type="none" w="med" len="med"/>
-          </a:ln>
-          <a:effectLst/>
-        </p:spPr>
-        <p:txBody>
-          <a:bodyPr vert="horz" wrap="none" lIns="91440" tIns="45720" rIns="91440" bIns="45720" anchor="ctr" compatLnSpc="1"/>
-          <a:lstStyle/>
-          <a:p>
-            <a:endParaRPr kumimoji="0" lang="en-US" dirty="0"/>
-          </a:p>
-        </p:txBody>
-      </p:sp>
-      <p:sp>
-        <p:nvSpPr>
-          <p:cNvPr id="20" name="Rectangle 19"/>
-          <p:cNvSpPr>
-            <a:spLocks noChangeArrowheads="1"/>
-          </p:cNvSpPr>
-          <p:nvPr/>
-        </p:nvSpPr>
-        <p:spPr bwMode="auto">
-          <a:xfrm>
-            <a:off x="152400" y="152400"/>
-            <a:ext cx="8833104" cy="301752"/>
-          </a:xfrm>
-          <a:prstGeom prst="rect">
-            <a:avLst/>
-          </a:prstGeom>
-          <a:solidFill>
-            <a:schemeClr val="accent3"/>
-          </a:solidFill>
-          <a:ln w="9525" cap="flat" cmpd="sng" algn="ctr">
-            <a:noFill/>
-            <a:prstDash val="solid"/>
-            <a:miter lim="800000"/>
-            <a:headEnd type="none" w="med" len="med"/>
-            <a:tailEnd type="none" w="med" len="med"/>
-          </a:ln>
-          <a:effectLst/>
-        </p:spPr>
-        <p:txBody>
-          <a:bodyPr vert="horz" wrap="none" lIns="91440" tIns="45720" rIns="91440" bIns="45720" anchor="ctr" compatLnSpc="1"/>
-          <a:lstStyle/>
-          <a:p>
-            <a:endParaRPr kumimoji="0" lang="en-US"/>
-          </a:p>
-        </p:txBody>
-      </p:sp>
-      <p:sp>
-        <p:nvSpPr>
-          <p:cNvPr id="8" name="Rectangle 7"/>
-          <p:cNvSpPr/>
-          <p:nvPr/>
-        </p:nvSpPr>
-        <p:spPr>
-          <a:xfrm>
-            <a:off x="152400" y="609600"/>
-            <a:ext cx="2743200" cy="5867400"/>
-          </a:xfrm>
-          <a:prstGeom prst="rect">
-            <a:avLst/>
-          </a:prstGeom>
-          <a:solidFill>
-            <a:schemeClr val="accent2"/>
-          </a:solidFill>
-          <a:ln w="15875" cap="rnd" cmpd="sng" algn="ctr">
-            <a:noFill/>
-            <a:prstDash val="solid"/>
-          </a:ln>
-          <a:effectLst/>
-        </p:spPr>
-        <p:style>
-          <a:lnRef idx="3">
-            <a:schemeClr val="lt1"/>
-          </a:lnRef>
-          <a:fillRef idx="1">
-            <a:schemeClr val="accent1"/>
-          </a:fillRef>
-          <a:effectRef idx="1">
-            <a:schemeClr val="accent1"/>
-          </a:effectRef>
-          <a:fontRef idx="minor">
-            <a:schemeClr val="lt1"/>
-          </a:fontRef>
-        </p:style>
-        <p:txBody>
-          <a:bodyPr anchor="ctr"/>
-          <a:lstStyle/>
-          <a:p>
-            <a:pPr algn="ctr" eaLnBrk="1" latinLnBrk="0" hangingPunct="1"/>
-            <a:endParaRPr kumimoji="0" lang="en-US"/>
-          </a:p>
-        </p:txBody>
-      </p:sp>
-      <p:sp>
-        <p:nvSpPr>
-          <p:cNvPr id="15" name="Rectangle 14"/>
-          <p:cNvSpPr>
-            <a:spLocks noChangeArrowheads="1"/>
-          </p:cNvSpPr>
-          <p:nvPr/>
-        </p:nvSpPr>
-        <p:spPr bwMode="auto">
-          <a:xfrm>
-            <a:off x="152400" y="155448"/>
-            <a:ext cx="8833104" cy="6547104"/>
-          </a:xfrm>
-          <a:prstGeom prst="rect">
-            <a:avLst/>
-          </a:prstGeom>
-          <a:noFill/>
-          <a:ln w="9525" cap="flat" cmpd="sng" algn="ctr">
-            <a:solidFill>
-              <a:schemeClr val="accent3">
-                <a:shade val="75000"/>
-              </a:schemeClr>
-            </a:solidFill>
-            <a:prstDash val="solid"/>
-            <a:miter lim="800000"/>
-            <a:headEnd type="none" w="med" len="med"/>
-            <a:tailEnd type="none" w="med" len="med"/>
-          </a:ln>
-          <a:effectLst/>
-        </p:spPr>
-        <p:txBody>
-          <a:bodyPr vert="horz" wrap="none" lIns="91440" tIns="45720" rIns="91440" bIns="45720" anchor="ctr" compatLnSpc="1"/>
-          <a:lstStyle/>
-          <a:p>
-            <a:endParaRPr kumimoji="0" lang="en-US" dirty="0"/>
-          </a:p>
-        </p:txBody>
-      </p:sp>
-      <p:sp>
-        <p:nvSpPr>
-          <p:cNvPr id="12" name="Oval 11"/>
-          <p:cNvSpPr/>
-          <p:nvPr/>
-        </p:nvSpPr>
-        <p:spPr>
-          <a:xfrm>
-            <a:off x="1295400" y="228600"/>
-            <a:ext cx="609600" cy="609600"/>
-          </a:xfrm>
-          <a:prstGeom prst="ellipse">
-            <a:avLst/>
-          </a:prstGeom>
-          <a:solidFill>
-            <a:srgbClr val="FFFFFF"/>
-          </a:solidFill>
-          <a:ln w="15875" cap="rnd" cmpd="sng" algn="ctr">
-            <a:noFill/>
-            <a:prstDash val="solid"/>
-          </a:ln>
-          <a:effectLst/>
-        </p:spPr>
-        <p:style>
-          <a:lnRef idx="3">
-            <a:schemeClr val="lt1"/>
-          </a:lnRef>
-          <a:fillRef idx="1">
-            <a:schemeClr val="accent1"/>
-          </a:fillRef>
-          <a:effectRef idx="1">
-            <a:schemeClr val="accent1"/>
-          </a:effectRef>
-          <a:fontRef idx="minor">
-            <a:schemeClr val="lt1"/>
-          </a:fontRef>
-        </p:style>
-        <p:txBody>
-          <a:bodyPr anchor="ctr"/>
-          <a:lstStyle/>
-          <a:p>
-            <a:pPr algn="ctr" eaLnBrk="1" latinLnBrk="0" hangingPunct="1"/>
-            <a:endParaRPr kumimoji="0" lang="en-US"/>
-          </a:p>
-        </p:txBody>
-      </p:sp>
-      <p:sp>
-        <p:nvSpPr>
-          <p:cNvPr id="13" name="Oval 12"/>
-          <p:cNvSpPr/>
-          <p:nvPr/>
-        </p:nvSpPr>
-        <p:spPr>
-          <a:xfrm>
-            <a:off x="1389888" y="323088"/>
-            <a:ext cx="420624" cy="420624"/>
-          </a:xfrm>
-          <a:prstGeom prst="ellipse">
-            <a:avLst/>
-          </a:prstGeom>
-          <a:solidFill>
-            <a:srgbClr val="FFFFFF"/>
-          </a:solidFill>
-          <a:ln w="50800" cap="rnd" cmpd="dbl" algn="ctr">
-            <a:solidFill>
-              <a:schemeClr val="accent3">
-                <a:shade val="75000"/>
-              </a:schemeClr>
-            </a:solidFill>
-            <a:prstDash val="solid"/>
-          </a:ln>
-          <a:effectLst/>
-        </p:spPr>
-        <p:style>
-          <a:lnRef idx="3">
-            <a:schemeClr val="lt1"/>
-          </a:lnRef>
-          <a:fillRef idx="1">
-            <a:schemeClr val="accent1"/>
-          </a:fillRef>
-          <a:effectRef idx="1">
-            <a:schemeClr val="accent1"/>
-          </a:effectRef>
-          <a:fontRef idx="minor">
-            <a:schemeClr val="lt1"/>
-          </a:fontRef>
-        </p:style>
-        <p:txBody>
-          <a:bodyPr anchor="ctr"/>
-          <a:lstStyle/>
-          <a:p>
-            <a:pPr algn="ctr" eaLnBrk="1" latinLnBrk="0" hangingPunct="1"/>
-            <a:endParaRPr kumimoji="0" lang="en-US"/>
-          </a:p>
-        </p:txBody>
-      </p:sp>
-      <p:sp>
-        <p:nvSpPr>
-          <p:cNvPr id="7" name="Slide Number Placeholder 6"/>
-          <p:cNvSpPr>
-            <a:spLocks noGrp="1"/>
-          </p:cNvSpPr>
-          <p:nvPr>
-            <p:ph type="sldNum" sz="quarter" idx="12"/>
-          </p:nvPr>
-        </p:nvSpPr>
-        <p:spPr>
-          <a:xfrm>
-            <a:off x="1371600" y="312738"/>
-            <a:ext cx="457200" cy="441325"/>
-          </a:xfrm>
-        </p:spPr>
-        <p:txBody>
-          <a:bodyPr/>
-          <a:lstStyle/>
-          <a:p>
-            <a:fld id="{BE924555-EAFD-4B2F-96F4-A60706EF2138}" type="slidenum">
-              <a:rPr lang="en-US" smtClean="0"/>
-              <a:pPr/>
-              <a:t>‹#›</a:t>
-            </a:fld>
-            <a:endParaRPr lang="en-US"/>
-          </a:p>
-        </p:txBody>
-      </p:sp>
-      <p:sp>
-        <p:nvSpPr>
-          <p:cNvPr id="2" name="Title 1"/>
-          <p:cNvSpPr>
-            <a:spLocks noGrp="1"/>
-          </p:cNvSpPr>
-          <p:nvPr>
-            <p:ph type="title"/>
-          </p:nvPr>
-        </p:nvSpPr>
-        <p:spPr>
-          <a:xfrm>
-            <a:off x="3000375" y="5029200"/>
-            <a:ext cx="5867400" cy="1219200"/>
-          </a:xfrm>
-        </p:spPr>
-        <p:txBody>
-          <a:bodyPr anchor="t">
-            <a:noAutofit/>
-          </a:bodyPr>
-          <a:lstStyle>
-            <a:lvl1pPr algn="l">
-              <a:buNone/>
-              <a:defRPr sz="2400" b="1">
-                <a:solidFill>
-                  <a:schemeClr val="tx2"/>
-                </a:solidFill>
-              </a:defRPr>
-            </a:lvl1pPr>
-          </a:lstStyle>
-          <a:p>
-            <a:r>
-              <a:rPr kumimoji="0" lang="en-US" smtClean="0"/>
-              <a:t>Click to edit Master title style</a:t>
-            </a:r>
-            <a:endParaRPr kumimoji="0" lang="en-US"/>
-          </a:p>
-        </p:txBody>
-      </p:sp>
-      <p:sp>
-        <p:nvSpPr>
-          <p:cNvPr id="3" name="Picture Placeholder 2"/>
-          <p:cNvSpPr>
-            <a:spLocks noGrp="1"/>
-          </p:cNvSpPr>
-          <p:nvPr>
-            <p:ph type="pic" idx="1"/>
-          </p:nvPr>
-        </p:nvSpPr>
-        <p:spPr>
-          <a:xfrm>
-            <a:off x="3000375" y="609600"/>
-            <a:ext cx="5867400" cy="4267200"/>
-          </a:xfrm>
-        </p:spPr>
-        <p:txBody>
-          <a:bodyPr/>
-          <a:lstStyle>
-            <a:lvl1pPr marL="0" indent="0">
-              <a:buNone/>
-              <a:defRPr sz="3200"/>
-            </a:lvl1pPr>
-          </a:lstStyle>
-          <a:p>
-            <a:r>
-              <a:rPr kumimoji="0" lang="en-US" smtClean="0"/>
-              <a:t>Drag picture to placeholder or click icon to add</a:t>
-            </a:r>
-            <a:endParaRPr kumimoji="0" lang="en-US" dirty="0"/>
-          </a:p>
-        </p:txBody>
-      </p:sp>
-      <p:sp>
-        <p:nvSpPr>
-          <p:cNvPr id="4" name="Text Placeholder 3"/>
-          <p:cNvSpPr>
-            <a:spLocks noGrp="1"/>
-          </p:cNvSpPr>
-          <p:nvPr>
-            <p:ph type="body" sz="half" idx="2"/>
-          </p:nvPr>
-        </p:nvSpPr>
-        <p:spPr>
-          <a:xfrm>
-            <a:off x="381000" y="990600"/>
-            <a:ext cx="2438400" cy="5257800"/>
-          </a:xfrm>
-        </p:spPr>
-        <p:txBody>
-          <a:bodyPr/>
-          <a:lstStyle>
-            <a:lvl1pPr marL="0" indent="0">
-              <a:spcAft>
-                <a:spcPts val="1000"/>
-              </a:spcAft>
-              <a:buFontTx/>
-              <a:buNone/>
-              <a:defRPr sz="1600">
-                <a:solidFill>
-                  <a:srgbClr val="FFFFFF"/>
-                </a:solidFill>
-              </a:defRPr>
-            </a:lvl1pPr>
-            <a:lvl2pPr>
-              <a:defRPr sz="1200"/>
-            </a:lvl2pPr>
-            <a:lvl3pPr>
-              <a:defRPr sz="1000"/>
-            </a:lvl3pPr>
-            <a:lvl4pPr>
-              <a:defRPr sz="900"/>
-            </a:lvl4pPr>
-            <a:lvl5pPr>
-              <a:defRPr sz="900"/>
-            </a:lvl5pPr>
-          </a:lstStyle>
-          <a:p>
-            <a:pPr lvl="0" eaLnBrk="1" latinLnBrk="0" hangingPunct="1"/>
-            <a:r>
-              <a:rPr kumimoji="0" lang="en-US" smtClean="0"/>
-              <a:t>Click to edit Master text styles</a:t>
-            </a:r>
-          </a:p>
-        </p:txBody>
-      </p:sp>
-      <p:sp>
-        <p:nvSpPr>
-          <p:cNvPr id="22" name="Rectangle 21"/>
-          <p:cNvSpPr>
-            <a:spLocks noChangeArrowheads="1"/>
-          </p:cNvSpPr>
-          <p:nvPr/>
-        </p:nvSpPr>
-        <p:spPr bwMode="auto">
-          <a:xfrm>
-            <a:off x="149352" y="6388385"/>
-            <a:ext cx="8833104" cy="309563"/>
-          </a:xfrm>
-          <a:prstGeom prst="rect">
-            <a:avLst/>
-          </a:prstGeom>
-          <a:solidFill>
-            <a:schemeClr val="accent3"/>
-          </a:solidFill>
-          <a:ln w="9525" cap="flat" cmpd="sng" algn="ctr">
-            <a:noFill/>
-            <a:prstDash val="solid"/>
-            <a:miter lim="800000"/>
-            <a:headEnd type="none" w="med" len="med"/>
-            <a:tailEnd type="none" w="med" len="med"/>
-          </a:ln>
-          <a:effectLst/>
-        </p:spPr>
-        <p:txBody>
-          <a:bodyPr vert="horz" wrap="none" lIns="91440" tIns="45720" rIns="91440" bIns="45720" anchor="ctr" compatLnSpc="1"/>
-          <a:lstStyle/>
-          <a:p>
-            <a:endParaRPr kumimoji="0" lang="en-US"/>
-          </a:p>
-        </p:txBody>
-      </p:sp>
-      <p:sp>
-        <p:nvSpPr>
-          <p:cNvPr id="5" name="Date Placeholder 4"/>
-          <p:cNvSpPr>
-            <a:spLocks noGrp="1"/>
-          </p:cNvSpPr>
-          <p:nvPr>
-            <p:ph type="dt" sz="half" idx="10"/>
-          </p:nvPr>
-        </p:nvSpPr>
-        <p:spPr>
-          <a:xfrm>
-            <a:off x="5788152" y="6404984"/>
-            <a:ext cx="3044952" cy="365760"/>
-          </a:xfrm>
-        </p:spPr>
-        <p:txBody>
-          <a:bodyPr/>
-          <a:lstStyle/>
-          <a:p>
-            <a:fld id="{EE625E72-7062-4D8E-BA99-F07B9DD1F028}" type="datetimeFigureOut">
-              <a:rPr lang="en-US" smtClean="0"/>
-              <a:pPr/>
-              <a:t>2/3/14</a:t>
-            </a:fld>
-            <a:endParaRPr lang="en-US"/>
-          </a:p>
-        </p:txBody>
-      </p:sp>
-      <p:sp>
-        <p:nvSpPr>
-          <p:cNvPr id="6" name="Footer Placeholder 5"/>
-          <p:cNvSpPr>
-            <a:spLocks noGrp="1"/>
-          </p:cNvSpPr>
-          <p:nvPr>
-            <p:ph type="ftr" sz="quarter" idx="11"/>
-          </p:nvPr>
-        </p:nvSpPr>
-        <p:spPr>
-          <a:xfrm>
-            <a:off x="301752" y="6410848"/>
-            <a:ext cx="3584448" cy="365760"/>
-          </a:xfrm>
-        </p:spPr>
-        <p:txBody>
-          <a:bodyPr/>
-          <a:lstStyle/>
-          <a:p>
+            <a:r>
+              <a:rPr lang="en-US" smtClean="0"/>
+              <a:t>Matt Smith - WebDriver &amp; Selenium</a:t>
+            </a:r>
             <a:endParaRPr lang="en-US"/>
           </a:p>
         </p:txBody>
@@ -5780,11 +6232,10 @@
             </a:lvl1pPr>
           </a:lstStyle>
           <a:p>
-            <a:fld id="{EE625E72-7062-4D8E-BA99-F07B9DD1F028}" type="datetimeFigureOut">
-              <a:rPr lang="en-US" smtClean="0"/>
-              <a:pPr/>
-              <a:t>2/3/14</a:t>
-            </a:fld>
+            <a:r>
+              <a:rPr lang="en-US" smtClean="0"/>
+              <a:t>Feb. 7. 2014</a:t>
+            </a:r>
             <a:endParaRPr lang="en-US"/>
           </a:p>
         </p:txBody>
@@ -5820,6 +6271,10 @@
             </a:lvl1pPr>
           </a:lstStyle>
           <a:p>
+            <a:r>
+              <a:rPr lang="en-US" smtClean="0"/>
+              <a:t>Matt Smith - WebDriver &amp; Selenium</a:t>
+            </a:r>
             <a:endParaRPr lang="en-US"/>
           </a:p>
         </p:txBody>
@@ -6141,16 +6596,18 @@
   <p:sldLayoutIdLst>
     <p:sldLayoutId id="2147483697" r:id="rId1"/>
     <p:sldLayoutId id="2147483698" r:id="rId2"/>
-    <p:sldLayoutId id="2147483699" r:id="rId3"/>
-    <p:sldLayoutId id="2147483700" r:id="rId4"/>
-    <p:sldLayoutId id="2147483701" r:id="rId5"/>
-    <p:sldLayoutId id="2147483702" r:id="rId6"/>
-    <p:sldLayoutId id="2147483703" r:id="rId7"/>
-    <p:sldLayoutId id="2147483704" r:id="rId8"/>
-    <p:sldLayoutId id="2147483705" r:id="rId9"/>
-    <p:sldLayoutId id="2147483706" r:id="rId10"/>
-    <p:sldLayoutId id="2147483707" r:id="rId11"/>
+    <p:sldLayoutId id="2147483708" r:id="rId3"/>
+    <p:sldLayoutId id="2147483699" r:id="rId4"/>
+    <p:sldLayoutId id="2147483700" r:id="rId5"/>
+    <p:sldLayoutId id="2147483701" r:id="rId6"/>
+    <p:sldLayoutId id="2147483702" r:id="rId7"/>
+    <p:sldLayoutId id="2147483703" r:id="rId8"/>
+    <p:sldLayoutId id="2147483704" r:id="rId9"/>
+    <p:sldLayoutId id="2147483705" r:id="rId10"/>
+    <p:sldLayoutId id="2147483706" r:id="rId11"/>
+    <p:sldLayoutId id="2147483707" r:id="rId12"/>
   </p:sldLayoutIdLst>
+  <p:hf hdr="0"/>
   <p:txStyles>
     <p:titleStyle>
       <a:lvl1pPr algn="ctr" rtl="0" eaLnBrk="1" latinLnBrk="0" hangingPunct="1">
@@ -6529,6 +6986,537 @@
   <p:clrMapOvr>
     <a:masterClrMapping/>
   </p:clrMapOvr>
+  <p:timing>
+    <p:tnLst>
+      <p:par>
+        <p:cTn xmlns:p14="http://schemas.microsoft.com/office/powerpoint/2010/main" id="1" dur="indefinite" restart="never" nodeType="tmRoot"/>
+      </p:par>
+    </p:tnLst>
+  </p:timing>
+</p:sld>
+</file>
+
+<file path=ppt/slides/slide10.xml><?xml version="1.0" encoding="utf-8"?>
+<p:sld xmlns:a="http://schemas.openxmlformats.org/drawingml/2006/main" xmlns:r="http://schemas.openxmlformats.org/officeDocument/2006/relationships" xmlns:p="http://schemas.openxmlformats.org/presentationml/2006/main">
+  <p:cSld>
+    <p:spTree>
+      <p:nvGrpSpPr>
+        <p:cNvPr id="1" name=""/>
+        <p:cNvGrpSpPr/>
+        <p:nvPr/>
+      </p:nvGrpSpPr>
+      <p:grpSpPr>
+        <a:xfrm>
+          <a:off x="0" y="0"/>
+          <a:ext cx="0" cy="0"/>
+          <a:chOff x="0" y="0"/>
+          <a:chExt cx="0" cy="0"/>
+        </a:xfrm>
+      </p:grpSpPr>
+      <p:sp>
+        <p:nvSpPr>
+          <p:cNvPr id="2" name="Title 1"/>
+          <p:cNvSpPr>
+            <a:spLocks noGrp="1"/>
+          </p:cNvSpPr>
+          <p:nvPr>
+            <p:ph type="title"/>
+          </p:nvPr>
+        </p:nvSpPr>
+        <p:spPr/>
+        <p:txBody>
+          <a:bodyPr/>
+          <a:lstStyle/>
+          <a:p>
+            <a:r>
+              <a:rPr lang="en-US" dirty="0" smtClean="0"/>
+              <a:t>Element Location</a:t>
+            </a:r>
+            <a:endParaRPr lang="en-US" dirty="0"/>
+          </a:p>
+        </p:txBody>
+      </p:sp>
+      <p:sp>
+        <p:nvSpPr>
+          <p:cNvPr id="3" name="Date Placeholder 2"/>
+          <p:cNvSpPr>
+            <a:spLocks noGrp="1"/>
+          </p:cNvSpPr>
+          <p:nvPr>
+            <p:ph type="dt" sz="half" idx="10"/>
+          </p:nvPr>
+        </p:nvSpPr>
+        <p:spPr/>
+        <p:txBody>
+          <a:bodyPr/>
+          <a:lstStyle/>
+          <a:p>
+            <a:r>
+              <a:rPr lang="en-US" smtClean="0"/>
+              <a:t>Feb. 7. 2014</a:t>
+            </a:r>
+            <a:endParaRPr lang="en-US"/>
+          </a:p>
+        </p:txBody>
+      </p:sp>
+      <p:sp>
+        <p:nvSpPr>
+          <p:cNvPr id="4" name="Footer Placeholder 3"/>
+          <p:cNvSpPr>
+            <a:spLocks noGrp="1"/>
+          </p:cNvSpPr>
+          <p:nvPr>
+            <p:ph type="ftr" sz="quarter" idx="11"/>
+          </p:nvPr>
+        </p:nvSpPr>
+        <p:spPr/>
+        <p:txBody>
+          <a:bodyPr/>
+          <a:lstStyle/>
+          <a:p>
+            <a:r>
+              <a:rPr lang="en-US" smtClean="0"/>
+              <a:t>Matt Smith - WebDriver &amp; Selenium</a:t>
+            </a:r>
+            <a:endParaRPr lang="en-US"/>
+          </a:p>
+        </p:txBody>
+      </p:sp>
+      <p:sp>
+        <p:nvSpPr>
+          <p:cNvPr id="5" name="Slide Number Placeholder 4"/>
+          <p:cNvSpPr>
+            <a:spLocks noGrp="1"/>
+          </p:cNvSpPr>
+          <p:nvPr>
+            <p:ph type="sldNum" sz="quarter" idx="12"/>
+          </p:nvPr>
+        </p:nvSpPr>
+        <p:spPr/>
+        <p:txBody>
+          <a:bodyPr/>
+          <a:lstStyle/>
+          <a:p>
+            <a:fld id="{BE924555-EAFD-4B2F-96F4-A60706EF2138}" type="slidenum">
+              <a:rPr lang="en-US" smtClean="0"/>
+              <a:pPr/>
+              <a:t>10</a:t>
+            </a:fld>
+            <a:endParaRPr lang="en-US"/>
+          </a:p>
+        </p:txBody>
+      </p:sp>
+      <p:sp>
+        <p:nvSpPr>
+          <p:cNvPr id="6" name="Content Placeholder 5"/>
+          <p:cNvSpPr>
+            <a:spLocks noGrp="1"/>
+          </p:cNvSpPr>
+          <p:nvPr>
+            <p:ph sz="quarter" idx="1"/>
+          </p:nvPr>
+        </p:nvSpPr>
+        <p:spPr/>
+        <p:txBody>
+          <a:bodyPr/>
+          <a:lstStyle/>
+          <a:p>
+            <a:endParaRPr lang="en-US" dirty="0"/>
+          </a:p>
+        </p:txBody>
+      </p:sp>
+    </p:spTree>
+    <p:extLst>
+      <p:ext uri="{BB962C8B-B14F-4D97-AF65-F5344CB8AC3E}">
+        <p14:creationId xmlns:p14="http://schemas.microsoft.com/office/powerpoint/2010/main" val="153749461"/>
+      </p:ext>
+    </p:extLst>
+  </p:cSld>
+  <p:clrMapOvr>
+    <a:masterClrMapping/>
+  </p:clrMapOvr>
+</p:sld>
+</file>
+
+<file path=ppt/slides/slide11.xml><?xml version="1.0" encoding="utf-8"?>
+<p:sld xmlns:a="http://schemas.openxmlformats.org/drawingml/2006/main" xmlns:r="http://schemas.openxmlformats.org/officeDocument/2006/relationships" xmlns:p="http://schemas.openxmlformats.org/presentationml/2006/main">
+  <p:cSld>
+    <p:spTree>
+      <p:nvGrpSpPr>
+        <p:cNvPr id="1" name=""/>
+        <p:cNvGrpSpPr/>
+        <p:nvPr/>
+      </p:nvGrpSpPr>
+      <p:grpSpPr>
+        <a:xfrm>
+          <a:off x="0" y="0"/>
+          <a:ext cx="0" cy="0"/>
+          <a:chOff x="0" y="0"/>
+          <a:chExt cx="0" cy="0"/>
+        </a:xfrm>
+      </p:grpSpPr>
+      <p:sp>
+        <p:nvSpPr>
+          <p:cNvPr id="2" name="Title 1"/>
+          <p:cNvSpPr>
+            <a:spLocks noGrp="1"/>
+          </p:cNvSpPr>
+          <p:nvPr>
+            <p:ph type="title"/>
+          </p:nvPr>
+        </p:nvSpPr>
+        <p:spPr/>
+        <p:txBody>
+          <a:bodyPr/>
+          <a:lstStyle/>
+          <a:p>
+            <a:r>
+              <a:rPr lang="en-US" dirty="0" smtClean="0"/>
+              <a:t>Element Location</a:t>
+            </a:r>
+            <a:endParaRPr lang="en-US" dirty="0"/>
+          </a:p>
+        </p:txBody>
+      </p:sp>
+      <p:sp>
+        <p:nvSpPr>
+          <p:cNvPr id="3" name="Date Placeholder 2"/>
+          <p:cNvSpPr>
+            <a:spLocks noGrp="1"/>
+          </p:cNvSpPr>
+          <p:nvPr>
+            <p:ph type="dt" sz="half" idx="10"/>
+          </p:nvPr>
+        </p:nvSpPr>
+        <p:spPr/>
+        <p:txBody>
+          <a:bodyPr/>
+          <a:lstStyle/>
+          <a:p>
+            <a:r>
+              <a:rPr lang="en-US" smtClean="0"/>
+              <a:t>Feb. 7. 2014</a:t>
+            </a:r>
+            <a:endParaRPr lang="en-US"/>
+          </a:p>
+        </p:txBody>
+      </p:sp>
+      <p:sp>
+        <p:nvSpPr>
+          <p:cNvPr id="4" name="Footer Placeholder 3"/>
+          <p:cNvSpPr>
+            <a:spLocks noGrp="1"/>
+          </p:cNvSpPr>
+          <p:nvPr>
+            <p:ph type="ftr" sz="quarter" idx="11"/>
+          </p:nvPr>
+        </p:nvSpPr>
+        <p:spPr/>
+        <p:txBody>
+          <a:bodyPr/>
+          <a:lstStyle/>
+          <a:p>
+            <a:r>
+              <a:rPr lang="en-US" smtClean="0"/>
+              <a:t>Matt Smith - WebDriver &amp; Selenium</a:t>
+            </a:r>
+            <a:endParaRPr lang="en-US"/>
+          </a:p>
+        </p:txBody>
+      </p:sp>
+      <p:sp>
+        <p:nvSpPr>
+          <p:cNvPr id="5" name="Slide Number Placeholder 4"/>
+          <p:cNvSpPr>
+            <a:spLocks noGrp="1"/>
+          </p:cNvSpPr>
+          <p:nvPr>
+            <p:ph type="sldNum" sz="quarter" idx="12"/>
+          </p:nvPr>
+        </p:nvSpPr>
+        <p:spPr/>
+        <p:txBody>
+          <a:bodyPr/>
+          <a:lstStyle/>
+          <a:p>
+            <a:fld id="{BE924555-EAFD-4B2F-96F4-A60706EF2138}" type="slidenum">
+              <a:rPr lang="en-US" smtClean="0"/>
+              <a:pPr/>
+              <a:t>11</a:t>
+            </a:fld>
+            <a:endParaRPr lang="en-US"/>
+          </a:p>
+        </p:txBody>
+      </p:sp>
+      <p:sp>
+        <p:nvSpPr>
+          <p:cNvPr id="6" name="Content Placeholder 5"/>
+          <p:cNvSpPr>
+            <a:spLocks noGrp="1"/>
+          </p:cNvSpPr>
+          <p:nvPr>
+            <p:ph sz="quarter" idx="1"/>
+          </p:nvPr>
+        </p:nvSpPr>
+        <p:spPr/>
+        <p:txBody>
+          <a:bodyPr/>
+          <a:lstStyle/>
+          <a:p>
+            <a:r>
+              <a:rPr lang="en-US" dirty="0"/>
+              <a:t>ID</a:t>
+            </a:r>
+          </a:p>
+          <a:p>
+            <a:r>
+              <a:rPr lang="en-US" dirty="0"/>
+              <a:t>Class Name</a:t>
+            </a:r>
+          </a:p>
+          <a:p>
+            <a:r>
+              <a:rPr lang="en-US" dirty="0"/>
+              <a:t>Tag Name</a:t>
+            </a:r>
+          </a:p>
+          <a:p>
+            <a:r>
+              <a:rPr lang="en-US" dirty="0"/>
+              <a:t>Name</a:t>
+            </a:r>
+          </a:p>
+          <a:p>
+            <a:r>
+              <a:rPr lang="en-US" dirty="0"/>
+              <a:t>Link </a:t>
+            </a:r>
+            <a:r>
+              <a:rPr lang="en-US" dirty="0" smtClean="0"/>
+              <a:t>Text</a:t>
+            </a:r>
+          </a:p>
+          <a:p>
+            <a:r>
+              <a:rPr lang="en-US" dirty="0" smtClean="0"/>
+              <a:t>CSS Selector</a:t>
+            </a:r>
+          </a:p>
+          <a:p>
+            <a:r>
+              <a:rPr lang="en-US" dirty="0" err="1" smtClean="0"/>
+              <a:t>Xpath</a:t>
+            </a:r>
+            <a:r>
+              <a:rPr lang="en-US" dirty="0" smtClean="0"/>
+              <a:t> (ick!)</a:t>
+            </a:r>
+          </a:p>
+          <a:p>
+            <a:r>
+              <a:rPr lang="en-US" dirty="0" smtClean="0"/>
+              <a:t>JavaScript</a:t>
+            </a:r>
+          </a:p>
+          <a:p>
+            <a:pPr lvl="1"/>
+            <a:r>
+              <a:rPr lang="en-US" dirty="0" smtClean="0"/>
+              <a:t>In Serenity there is </a:t>
+            </a:r>
+            <a:r>
+              <a:rPr lang="en-US" dirty="0" err="1" smtClean="0"/>
+              <a:t>By.jQuery</a:t>
+            </a:r>
+            <a:r>
+              <a:rPr lang="en-US" dirty="0" smtClean="0"/>
+              <a:t> now! (As of last week)</a:t>
+            </a:r>
+            <a:endParaRPr lang="en-US" dirty="0"/>
+          </a:p>
+        </p:txBody>
+      </p:sp>
+    </p:spTree>
+    <p:extLst>
+      <p:ext uri="{BB962C8B-B14F-4D97-AF65-F5344CB8AC3E}">
+        <p14:creationId xmlns:p14="http://schemas.microsoft.com/office/powerpoint/2010/main" val="3012859364"/>
+      </p:ext>
+    </p:extLst>
+  </p:cSld>
+  <p:clrMapOvr>
+    <a:masterClrMapping/>
+  </p:clrMapOvr>
+</p:sld>
+</file>
+
+<file path=ppt/slides/slide12.xml><?xml version="1.0" encoding="utf-8"?>
+<p:sld xmlns:a="http://schemas.openxmlformats.org/drawingml/2006/main" xmlns:r="http://schemas.openxmlformats.org/officeDocument/2006/relationships" xmlns:p="http://schemas.openxmlformats.org/presentationml/2006/main">
+  <p:cSld>
+    <p:bg>
+      <p:bgPr>
+        <a:blipFill>
+          <a:blip r:embed="rId2">
+            <a:alphaModFix amt="30000"/>
+          </a:blip>
+          <a:tile tx="0" ty="0" sx="65000" sy="65000" flip="none" algn="tl"/>
+        </a:blipFill>
+        <a:effectLst/>
+      </p:bgPr>
+    </p:bg>
+    <p:spTree>
+      <p:nvGrpSpPr>
+        <p:cNvPr id="1" name=""/>
+        <p:cNvGrpSpPr/>
+        <p:nvPr/>
+      </p:nvGrpSpPr>
+      <p:grpSpPr>
+        <a:xfrm>
+          <a:off x="0" y="0"/>
+          <a:ext cx="0" cy="0"/>
+          <a:chOff x="0" y="0"/>
+          <a:chExt cx="0" cy="0"/>
+        </a:xfrm>
+      </p:grpSpPr>
+      <p:sp>
+        <p:nvSpPr>
+          <p:cNvPr id="2" name="Title 1"/>
+          <p:cNvSpPr>
+            <a:spLocks noGrp="1"/>
+          </p:cNvSpPr>
+          <p:nvPr>
+            <p:ph type="title"/>
+          </p:nvPr>
+        </p:nvSpPr>
+        <p:spPr/>
+        <p:txBody>
+          <a:bodyPr/>
+          <a:lstStyle/>
+          <a:p>
+            <a:r>
+              <a:rPr lang="en-US" dirty="0" smtClean="0"/>
+              <a:t>Where things can go wrong</a:t>
+            </a:r>
+            <a:endParaRPr lang="en-US" dirty="0"/>
+          </a:p>
+        </p:txBody>
+      </p:sp>
+      <p:pic>
+        <p:nvPicPr>
+          <p:cNvPr id="3" name="Picture 2" descr="WebDriver - Bad.png"/>
+          <p:cNvPicPr>
+            <a:picLocks noChangeAspect="1"/>
+          </p:cNvPicPr>
+          <p:nvPr/>
+        </p:nvPicPr>
+        <p:blipFill>
+          <a:blip r:embed="rId3" cstate="print">
+            <a:extLst>
+              <a:ext uri="{28A0092B-C50C-407E-A947-70E740481C1C}">
+                <a14:useLocalDpi xmlns:a14="http://schemas.microsoft.com/office/drawing/2010/main" val="0"/>
+              </a:ext>
+            </a:extLst>
+          </a:blip>
+          <a:stretch>
+            <a:fillRect/>
+          </a:stretch>
+        </p:blipFill>
+        <p:spPr>
+          <a:xfrm>
+            <a:off x="152400" y="1219200"/>
+            <a:ext cx="8839200" cy="5286218"/>
+          </a:xfrm>
+          <a:prstGeom prst="rect">
+            <a:avLst/>
+          </a:prstGeom>
+        </p:spPr>
+      </p:pic>
+      <p:sp>
+        <p:nvSpPr>
+          <p:cNvPr id="4" name="Date Placeholder 3"/>
+          <p:cNvSpPr>
+            <a:spLocks noGrp="1"/>
+          </p:cNvSpPr>
+          <p:nvPr>
+            <p:ph type="dt" sz="half" idx="10"/>
+          </p:nvPr>
+        </p:nvSpPr>
+        <p:spPr/>
+        <p:txBody>
+          <a:bodyPr/>
+          <a:lstStyle/>
+          <a:p>
+            <a:r>
+              <a:rPr lang="en-US" smtClean="0"/>
+              <a:t>Feb. 7. 2014</a:t>
+            </a:r>
+            <a:endParaRPr lang="en-US"/>
+          </a:p>
+        </p:txBody>
+      </p:sp>
+      <p:sp>
+        <p:nvSpPr>
+          <p:cNvPr id="5" name="Footer Placeholder 4"/>
+          <p:cNvSpPr>
+            <a:spLocks noGrp="1"/>
+          </p:cNvSpPr>
+          <p:nvPr>
+            <p:ph type="ftr" sz="quarter" idx="11"/>
+          </p:nvPr>
+        </p:nvSpPr>
+        <p:spPr/>
+        <p:txBody>
+          <a:bodyPr/>
+          <a:lstStyle/>
+          <a:p>
+            <a:r>
+              <a:rPr lang="en-US" smtClean="0"/>
+              <a:t>Matt Smith - WebDriver &amp; Selenium</a:t>
+            </a:r>
+            <a:endParaRPr lang="en-US"/>
+          </a:p>
+        </p:txBody>
+      </p:sp>
+      <p:sp>
+        <p:nvSpPr>
+          <p:cNvPr id="6" name="Slide Number Placeholder 5"/>
+          <p:cNvSpPr>
+            <a:spLocks noGrp="1"/>
+          </p:cNvSpPr>
+          <p:nvPr>
+            <p:ph type="sldNum" sz="quarter" idx="12"/>
+          </p:nvPr>
+        </p:nvSpPr>
+        <p:spPr/>
+        <p:txBody>
+          <a:bodyPr/>
+          <a:lstStyle/>
+          <a:p>
+            <a:fld id="{BE924555-EAFD-4B2F-96F4-A60706EF2138}" type="slidenum">
+              <a:rPr lang="en-US" smtClean="0"/>
+              <a:pPr/>
+              <a:t>12</a:t>
+            </a:fld>
+            <a:endParaRPr lang="en-US"/>
+          </a:p>
+        </p:txBody>
+      </p:sp>
+    </p:spTree>
+    <p:extLst>
+      <p:ext uri="{BB962C8B-B14F-4D97-AF65-F5344CB8AC3E}">
+        <p14:creationId xmlns:p14="http://schemas.microsoft.com/office/powerpoint/2010/main" val="2480672318"/>
+      </p:ext>
+    </p:extLst>
+  </p:cSld>
+  <p:clrMapOvr>
+    <a:masterClrMapping/>
+  </p:clrMapOvr>
+  <p:timing>
+    <p:tnLst>
+      <p:par>
+        <p:cTn xmlns:p14="http://schemas.microsoft.com/office/powerpoint/2010/main" id="1" dur="indefinite" restart="never" nodeType="tmRoot"/>
+      </p:par>
+    </p:tnLst>
+  </p:timing>
 </p:sld>
 </file>
 
@@ -6658,6 +7646,81 @@
           </a:p>
         </p:txBody>
       </p:sp>
+      <p:sp>
+        <p:nvSpPr>
+          <p:cNvPr id="4" name="Date Placeholder 3"/>
+          <p:cNvSpPr>
+            <a:spLocks noGrp="1"/>
+          </p:cNvSpPr>
+          <p:nvPr>
+            <p:ph type="dt" sz="half" idx="10"/>
+          </p:nvPr>
+        </p:nvSpPr>
+        <p:spPr/>
+        <p:txBody>
+          <a:bodyPr/>
+          <a:lstStyle/>
+          <a:p>
+            <a:r>
+              <a:rPr lang="en-US" smtClean="0"/>
+              <a:t>Feb. 7. 2014</a:t>
+            </a:r>
+            <a:endParaRPr lang="en-US"/>
+          </a:p>
+        </p:txBody>
+      </p:sp>
+      <p:sp>
+        <p:nvSpPr>
+          <p:cNvPr id="5" name="Footer Placeholder 4"/>
+          <p:cNvSpPr>
+            <a:spLocks noGrp="1"/>
+          </p:cNvSpPr>
+          <p:nvPr>
+            <p:ph type="ftr" sz="quarter" idx="11"/>
+          </p:nvPr>
+        </p:nvSpPr>
+        <p:spPr/>
+        <p:txBody>
+          <a:bodyPr/>
+          <a:lstStyle/>
+          <a:p>
+            <a:r>
+              <a:rPr lang="en-US" smtClean="0"/>
+              <a:t>Matt Smith - WebDriver &amp; Selenium</a:t>
+            </a:r>
+            <a:endParaRPr lang="en-US"/>
+          </a:p>
+        </p:txBody>
+      </p:sp>
+      <p:sp>
+        <p:nvSpPr>
+          <p:cNvPr id="6" name="Slide Number Placeholder 5"/>
+          <p:cNvSpPr>
+            <a:spLocks noGrp="1"/>
+          </p:cNvSpPr>
+          <p:nvPr>
+            <p:ph type="sldNum" sz="quarter" idx="12"/>
+          </p:nvPr>
+        </p:nvSpPr>
+        <p:spPr>
+          <a:xfrm>
+            <a:off x="4343400" y="1006475"/>
+            <a:ext cx="457200" cy="441325"/>
+          </a:xfrm>
+        </p:spPr>
+        <p:txBody>
+          <a:bodyPr/>
+          <a:lstStyle/>
+          <a:p>
+            <a:fld id="{BE924555-EAFD-4B2F-96F4-A60706EF2138}" type="slidenum">
+              <a:rPr lang="en-US" smtClean="0"/>
+              <a:pPr/>
+              <a:t>2</a:t>
+            </a:fld>
+            <a:endParaRPr lang="en-US" dirty="0"/>
+          </a:p>
+        </p:txBody>
+      </p:sp>
     </p:spTree>
     <p:extLst>
       <p:ext uri="{BB962C8B-B14F-4D97-AF65-F5344CB8AC3E}">
@@ -6668,6 +7731,13 @@
   <p:clrMapOvr>
     <a:masterClrMapping/>
   </p:clrMapOvr>
+  <p:timing>
+    <p:tnLst>
+      <p:par>
+        <p:cTn xmlns:p14="http://schemas.microsoft.com/office/powerpoint/2010/main" id="1" dur="indefinite" restart="never" nodeType="tmRoot"/>
+      </p:par>
+    </p:tnLst>
+  </p:timing>
 </p:sld>
 </file>
 
@@ -6771,8 +7841,102 @@
             <a:pPr lvl="2"/>
             <a:r>
               <a:rPr lang="en-US" dirty="0" smtClean="0"/>
-              <a:t>David Burns – Mozilla</a:t>
-            </a:r>
+              <a:t>David Burns – </a:t>
+            </a:r>
+            <a:r>
+              <a:rPr lang="en-US" dirty="0" smtClean="0"/>
+              <a:t>Mozilla</a:t>
+            </a:r>
+          </a:p>
+          <a:p>
+            <a:pPr lvl="1"/>
+            <a:r>
+              <a:rPr lang="en-US" dirty="0" smtClean="0"/>
+              <a:t>Firefox already does this</a:t>
+            </a:r>
+          </a:p>
+          <a:p>
+            <a:pPr lvl="2"/>
+            <a:r>
+              <a:rPr lang="en-US" dirty="0" smtClean="0"/>
+              <a:t>Notice there is not console window launched when testing with Firefox</a:t>
+            </a:r>
+            <a:endParaRPr lang="en-US" dirty="0" smtClean="0"/>
+          </a:p>
+        </p:txBody>
+      </p:sp>
+      <p:sp>
+        <p:nvSpPr>
+          <p:cNvPr id="4" name="Date Placeholder 3"/>
+          <p:cNvSpPr>
+            <a:spLocks noGrp="1"/>
+          </p:cNvSpPr>
+          <p:nvPr>
+            <p:ph type="dt" sz="half" idx="10"/>
+          </p:nvPr>
+        </p:nvSpPr>
+        <p:spPr/>
+        <p:txBody>
+          <a:bodyPr/>
+          <a:lstStyle/>
+          <a:p>
+            <a:r>
+              <a:rPr lang="en-US" smtClean="0"/>
+              <a:t>Feb. 7. 2014</a:t>
+            </a:r>
+            <a:endParaRPr lang="en-US"/>
+          </a:p>
+        </p:txBody>
+      </p:sp>
+      <p:sp>
+        <p:nvSpPr>
+          <p:cNvPr id="5" name="Footer Placeholder 4"/>
+          <p:cNvSpPr>
+            <a:spLocks noGrp="1"/>
+          </p:cNvSpPr>
+          <p:nvPr>
+            <p:ph type="ftr" sz="quarter" idx="11"/>
+          </p:nvPr>
+        </p:nvSpPr>
+        <p:spPr/>
+        <p:txBody>
+          <a:bodyPr/>
+          <a:lstStyle/>
+          <a:p>
+            <a:r>
+              <a:rPr lang="en-US" smtClean="0"/>
+              <a:t>Matt Smith - WebDriver &amp; Selenium</a:t>
+            </a:r>
+            <a:endParaRPr lang="en-US"/>
+          </a:p>
+        </p:txBody>
+      </p:sp>
+      <p:sp>
+        <p:nvSpPr>
+          <p:cNvPr id="6" name="Slide Number Placeholder 5"/>
+          <p:cNvSpPr>
+            <a:spLocks noGrp="1"/>
+          </p:cNvSpPr>
+          <p:nvPr>
+            <p:ph type="sldNum" sz="quarter" idx="12"/>
+          </p:nvPr>
+        </p:nvSpPr>
+        <p:spPr>
+          <a:xfrm>
+            <a:off x="4343400" y="1006475"/>
+            <a:ext cx="457200" cy="441325"/>
+          </a:xfrm>
+        </p:spPr>
+        <p:txBody>
+          <a:bodyPr/>
+          <a:lstStyle/>
+          <a:p>
+            <a:fld id="{BE924555-EAFD-4B2F-96F4-A60706EF2138}" type="slidenum">
+              <a:rPr lang="en-US" smtClean="0"/>
+              <a:pPr/>
+              <a:t>3</a:t>
+            </a:fld>
+            <a:endParaRPr lang="en-US" dirty="0"/>
           </a:p>
         </p:txBody>
       </p:sp>
@@ -6786,6 +7950,13 @@
   <p:clrMapOvr>
     <a:masterClrMapping/>
   </p:clrMapOvr>
+  <p:timing>
+    <p:tnLst>
+      <p:par>
+        <p:cTn xmlns:p14="http://schemas.microsoft.com/office/powerpoint/2010/main" id="1" dur="indefinite" restart="never" nodeType="tmRoot"/>
+      </p:par>
+    </p:tnLst>
+  </p:timing>
 </p:sld>
 </file>
 
@@ -6823,46 +7994,139 @@
           <a:p>
             <a:r>
               <a:rPr lang="en-US" dirty="0" smtClean="0"/>
-              <a:t>Basic Flow</a:t>
+              <a:t>Broad Community Connections</a:t>
             </a:r>
             <a:endParaRPr lang="en-US" dirty="0"/>
           </a:p>
         </p:txBody>
       </p:sp>
-      <p:pic>
-        <p:nvPicPr>
-          <p:cNvPr id="7" name="Picture 6" descr="WebDriver - Simple Flow.png"/>
-          <p:cNvPicPr>
-            <a:picLocks noChangeAspect="1"/>
-          </p:cNvPicPr>
-          <p:nvPr/>
-        </p:nvPicPr>
-        <p:blipFill>
-          <a:blip r:embed="rId2" cstate="print">
-            <a:extLst>
-              <a:ext uri="{28A0092B-C50C-407E-A947-70E740481C1C}">
-                <a14:useLocalDpi xmlns:a14="http://schemas.microsoft.com/office/drawing/2010/main" val="0"/>
-              </a:ext>
-            </a:extLst>
-          </a:blip>
-          <a:stretch>
-            <a:fillRect/>
-          </a:stretch>
-        </p:blipFill>
-        <p:spPr>
-          <a:xfrm>
-            <a:off x="152400" y="914400"/>
-            <a:ext cx="9144000" cy="5218435"/>
-          </a:xfrm>
-          <a:prstGeom prst="rect">
-            <a:avLst/>
-          </a:prstGeom>
-        </p:spPr>
-      </p:pic>
+      <p:sp>
+        <p:nvSpPr>
+          <p:cNvPr id="3" name="Date Placeholder 2"/>
+          <p:cNvSpPr>
+            <a:spLocks noGrp="1"/>
+          </p:cNvSpPr>
+          <p:nvPr>
+            <p:ph type="dt" sz="half" idx="10"/>
+          </p:nvPr>
+        </p:nvSpPr>
+        <p:spPr/>
+        <p:txBody>
+          <a:bodyPr/>
+          <a:lstStyle/>
+          <a:p>
+            <a:r>
+              <a:rPr lang="en-US" smtClean="0"/>
+              <a:t>Feb. 7. 2014</a:t>
+            </a:r>
+            <a:endParaRPr lang="en-US"/>
+          </a:p>
+        </p:txBody>
+      </p:sp>
+      <p:sp>
+        <p:nvSpPr>
+          <p:cNvPr id="4" name="Footer Placeholder 3"/>
+          <p:cNvSpPr>
+            <a:spLocks noGrp="1"/>
+          </p:cNvSpPr>
+          <p:nvPr>
+            <p:ph type="ftr" sz="quarter" idx="11"/>
+          </p:nvPr>
+        </p:nvSpPr>
+        <p:spPr/>
+        <p:txBody>
+          <a:bodyPr/>
+          <a:lstStyle/>
+          <a:p>
+            <a:r>
+              <a:rPr lang="en-US" smtClean="0"/>
+              <a:t>Matt Smith - WebDriver &amp; Selenium</a:t>
+            </a:r>
+            <a:endParaRPr lang="en-US"/>
+          </a:p>
+        </p:txBody>
+      </p:sp>
+      <p:sp>
+        <p:nvSpPr>
+          <p:cNvPr id="5" name="Slide Number Placeholder 4"/>
+          <p:cNvSpPr>
+            <a:spLocks noGrp="1"/>
+          </p:cNvSpPr>
+          <p:nvPr>
+            <p:ph type="sldNum" sz="quarter" idx="12"/>
+          </p:nvPr>
+        </p:nvSpPr>
+        <p:spPr/>
+        <p:txBody>
+          <a:bodyPr/>
+          <a:lstStyle/>
+          <a:p>
+            <a:fld id="{BE924555-EAFD-4B2F-96F4-A60706EF2138}" type="slidenum">
+              <a:rPr lang="en-US" smtClean="0"/>
+              <a:pPr/>
+              <a:t>4</a:t>
+            </a:fld>
+            <a:endParaRPr lang="en-US"/>
+          </a:p>
+        </p:txBody>
+      </p:sp>
+      <p:sp>
+        <p:nvSpPr>
+          <p:cNvPr id="6" name="Content Placeholder 5"/>
+          <p:cNvSpPr>
+            <a:spLocks noGrp="1"/>
+          </p:cNvSpPr>
+          <p:nvPr>
+            <p:ph sz="quarter" idx="1"/>
+          </p:nvPr>
+        </p:nvSpPr>
+        <p:spPr/>
+        <p:txBody>
+          <a:bodyPr/>
+          <a:lstStyle/>
+          <a:p>
+            <a:r>
+              <a:rPr lang="en-US" dirty="0" smtClean="0"/>
+              <a:t>Java</a:t>
+            </a:r>
+          </a:p>
+          <a:p>
+            <a:r>
+              <a:rPr lang="en-US" dirty="0" smtClean="0"/>
+              <a:t>C#</a:t>
+            </a:r>
+          </a:p>
+          <a:p>
+            <a:r>
+              <a:rPr lang="en-US" dirty="0" smtClean="0"/>
+              <a:t>Python</a:t>
+            </a:r>
+          </a:p>
+          <a:p>
+            <a:r>
+              <a:rPr lang="en-US" dirty="0" smtClean="0"/>
+              <a:t>Ruby</a:t>
+            </a:r>
+          </a:p>
+          <a:p>
+            <a:r>
+              <a:rPr lang="en-US" dirty="0" smtClean="0"/>
+              <a:t>Perl</a:t>
+            </a:r>
+          </a:p>
+          <a:p>
+            <a:r>
+              <a:rPr lang="en-US" dirty="0" smtClean="0"/>
+              <a:t>PHP</a:t>
+            </a:r>
+            <a:endParaRPr lang="en-US" dirty="0"/>
+          </a:p>
+        </p:txBody>
+      </p:sp>
     </p:spTree>
     <p:extLst>
       <p:ext uri="{BB962C8B-B14F-4D97-AF65-F5344CB8AC3E}">
-        <p14:creationId xmlns:p14="http://schemas.microsoft.com/office/powerpoint/2010/main" val="633117598"/>
+        <p14:creationId xmlns:p14="http://schemas.microsoft.com/office/powerpoint/2010/main" val="3741266242"/>
       </p:ext>
     </p:extLst>
   </p:cSld>
@@ -6906,7 +8170,924 @@
           <a:p>
             <a:r>
               <a:rPr lang="en-US" dirty="0" smtClean="0"/>
-              <a:t>Where things can go wrong</a:t>
+              <a:t>Supported Operations</a:t>
+            </a:r>
+            <a:endParaRPr lang="en-US" dirty="0"/>
+          </a:p>
+        </p:txBody>
+      </p:sp>
+      <p:sp>
+        <p:nvSpPr>
+          <p:cNvPr id="3" name="Date Placeholder 2"/>
+          <p:cNvSpPr>
+            <a:spLocks noGrp="1"/>
+          </p:cNvSpPr>
+          <p:nvPr>
+            <p:ph type="dt" sz="half" idx="10"/>
+          </p:nvPr>
+        </p:nvSpPr>
+        <p:spPr/>
+        <p:txBody>
+          <a:bodyPr/>
+          <a:lstStyle/>
+          <a:p>
+            <a:r>
+              <a:rPr lang="en-US" smtClean="0"/>
+              <a:t>Feb. 7. 2014</a:t>
+            </a:r>
+            <a:endParaRPr lang="en-US"/>
+          </a:p>
+        </p:txBody>
+      </p:sp>
+      <p:sp>
+        <p:nvSpPr>
+          <p:cNvPr id="4" name="Footer Placeholder 3"/>
+          <p:cNvSpPr>
+            <a:spLocks noGrp="1"/>
+          </p:cNvSpPr>
+          <p:nvPr>
+            <p:ph type="ftr" sz="quarter" idx="11"/>
+          </p:nvPr>
+        </p:nvSpPr>
+        <p:spPr/>
+        <p:txBody>
+          <a:bodyPr/>
+          <a:lstStyle/>
+          <a:p>
+            <a:r>
+              <a:rPr lang="en-US" smtClean="0"/>
+              <a:t>Matt Smith - WebDriver &amp; Selenium</a:t>
+            </a:r>
+            <a:endParaRPr lang="en-US"/>
+          </a:p>
+        </p:txBody>
+      </p:sp>
+      <p:sp>
+        <p:nvSpPr>
+          <p:cNvPr id="5" name="Slide Number Placeholder 4"/>
+          <p:cNvSpPr>
+            <a:spLocks noGrp="1"/>
+          </p:cNvSpPr>
+          <p:nvPr>
+            <p:ph type="sldNum" sz="quarter" idx="12"/>
+          </p:nvPr>
+        </p:nvSpPr>
+        <p:spPr/>
+        <p:txBody>
+          <a:bodyPr/>
+          <a:lstStyle/>
+          <a:p>
+            <a:fld id="{BE924555-EAFD-4B2F-96F4-A60706EF2138}" type="slidenum">
+              <a:rPr lang="en-US" smtClean="0"/>
+              <a:pPr/>
+              <a:t>5</a:t>
+            </a:fld>
+            <a:endParaRPr lang="en-US"/>
+          </a:p>
+        </p:txBody>
+      </p:sp>
+      <p:sp>
+        <p:nvSpPr>
+          <p:cNvPr id="6" name="Content Placeholder 5"/>
+          <p:cNvSpPr>
+            <a:spLocks noGrp="1"/>
+          </p:cNvSpPr>
+          <p:nvPr>
+            <p:ph sz="quarter" idx="1"/>
+          </p:nvPr>
+        </p:nvSpPr>
+        <p:spPr/>
+        <p:txBody>
+          <a:bodyPr>
+            <a:normAutofit fontScale="92500" lnSpcReduction="10000"/>
+          </a:bodyPr>
+          <a:lstStyle/>
+          <a:p>
+            <a:r>
+              <a:rPr lang="en-US" dirty="0" smtClean="0"/>
+              <a:t>Page Navigation</a:t>
+            </a:r>
+          </a:p>
+          <a:p>
+            <a:r>
+              <a:rPr lang="en-US" dirty="0" smtClean="0"/>
+              <a:t>User Input</a:t>
+            </a:r>
+          </a:p>
+          <a:p>
+            <a:pPr lvl="1"/>
+            <a:r>
+              <a:rPr lang="en-US" dirty="0" smtClean="0"/>
+              <a:t>Keyboard</a:t>
+            </a:r>
+          </a:p>
+          <a:p>
+            <a:pPr lvl="2"/>
+            <a:r>
+              <a:rPr lang="en-US" dirty="0" smtClean="0"/>
+              <a:t>Ctrl</a:t>
+            </a:r>
+          </a:p>
+          <a:p>
+            <a:pPr lvl="2"/>
+            <a:r>
+              <a:rPr lang="en-US" dirty="0" smtClean="0"/>
+              <a:t>Alt</a:t>
+            </a:r>
+          </a:p>
+          <a:p>
+            <a:pPr lvl="2"/>
+            <a:r>
+              <a:rPr lang="en-US" dirty="0" smtClean="0"/>
+              <a:t>Shift</a:t>
+            </a:r>
+          </a:p>
+          <a:p>
+            <a:pPr lvl="2"/>
+            <a:r>
+              <a:rPr lang="en-US" dirty="0" smtClean="0"/>
+              <a:t>Any key you can press on the keyboard, and even some you can’t</a:t>
+            </a:r>
+          </a:p>
+          <a:p>
+            <a:pPr lvl="1"/>
+            <a:r>
+              <a:rPr lang="en-US" dirty="0" smtClean="0"/>
+              <a:t>Mouse</a:t>
+            </a:r>
+          </a:p>
+          <a:p>
+            <a:pPr lvl="2"/>
+            <a:r>
+              <a:rPr lang="en-US" dirty="0" smtClean="0"/>
+              <a:t>Click</a:t>
+            </a:r>
+          </a:p>
+          <a:p>
+            <a:pPr lvl="2"/>
+            <a:r>
+              <a:rPr lang="en-US" dirty="0" smtClean="0"/>
+              <a:t>Double Click</a:t>
+            </a:r>
+          </a:p>
+          <a:p>
+            <a:pPr lvl="2"/>
+            <a:r>
+              <a:rPr lang="en-US" dirty="0" smtClean="0"/>
+              <a:t>Right Click</a:t>
+            </a:r>
+          </a:p>
+          <a:p>
+            <a:pPr lvl="2"/>
+            <a:r>
+              <a:rPr lang="en-US" dirty="0" smtClean="0"/>
+              <a:t>Scroll</a:t>
+            </a:r>
+            <a:endParaRPr lang="en-US" dirty="0"/>
+          </a:p>
+          <a:p>
+            <a:pPr lvl="2"/>
+            <a:r>
+              <a:rPr lang="en-US" dirty="0" smtClean="0"/>
+              <a:t>Drag and Drop</a:t>
+            </a:r>
+          </a:p>
+        </p:txBody>
+      </p:sp>
+    </p:spTree>
+    <p:extLst>
+      <p:ext uri="{BB962C8B-B14F-4D97-AF65-F5344CB8AC3E}">
+        <p14:creationId xmlns:p14="http://schemas.microsoft.com/office/powerpoint/2010/main" val="2272480947"/>
+      </p:ext>
+    </p:extLst>
+  </p:cSld>
+  <p:clrMapOvr>
+    <a:masterClrMapping/>
+  </p:clrMapOvr>
+</p:sld>
+</file>
+
+<file path=ppt/slides/slide6.xml><?xml version="1.0" encoding="utf-8"?>
+<p:sld xmlns:a="http://schemas.openxmlformats.org/drawingml/2006/main" xmlns:r="http://schemas.openxmlformats.org/officeDocument/2006/relationships" xmlns:p="http://schemas.openxmlformats.org/presentationml/2006/main">
+  <p:cSld>
+    <p:spTree>
+      <p:nvGrpSpPr>
+        <p:cNvPr id="1" name=""/>
+        <p:cNvGrpSpPr/>
+        <p:nvPr/>
+      </p:nvGrpSpPr>
+      <p:grpSpPr>
+        <a:xfrm>
+          <a:off x="0" y="0"/>
+          <a:ext cx="0" cy="0"/>
+          <a:chOff x="0" y="0"/>
+          <a:chExt cx="0" cy="0"/>
+        </a:xfrm>
+      </p:grpSpPr>
+      <p:sp>
+        <p:nvSpPr>
+          <p:cNvPr id="2" name="Title 1"/>
+          <p:cNvSpPr>
+            <a:spLocks noGrp="1"/>
+          </p:cNvSpPr>
+          <p:nvPr>
+            <p:ph type="title"/>
+          </p:nvPr>
+        </p:nvSpPr>
+        <p:spPr/>
+        <p:txBody>
+          <a:bodyPr/>
+          <a:lstStyle/>
+          <a:p>
+            <a:r>
+              <a:rPr lang="en-US" dirty="0" smtClean="0"/>
+              <a:t>Supported Operations</a:t>
+            </a:r>
+            <a:endParaRPr lang="en-US" dirty="0"/>
+          </a:p>
+        </p:txBody>
+      </p:sp>
+      <p:sp>
+        <p:nvSpPr>
+          <p:cNvPr id="3" name="Date Placeholder 2"/>
+          <p:cNvSpPr>
+            <a:spLocks noGrp="1"/>
+          </p:cNvSpPr>
+          <p:nvPr>
+            <p:ph type="dt" sz="half" idx="10"/>
+          </p:nvPr>
+        </p:nvSpPr>
+        <p:spPr/>
+        <p:txBody>
+          <a:bodyPr/>
+          <a:lstStyle/>
+          <a:p>
+            <a:r>
+              <a:rPr lang="en-US" smtClean="0"/>
+              <a:t>Feb. 7. 2014</a:t>
+            </a:r>
+            <a:endParaRPr lang="en-US"/>
+          </a:p>
+        </p:txBody>
+      </p:sp>
+      <p:sp>
+        <p:nvSpPr>
+          <p:cNvPr id="4" name="Footer Placeholder 3"/>
+          <p:cNvSpPr>
+            <a:spLocks noGrp="1"/>
+          </p:cNvSpPr>
+          <p:nvPr>
+            <p:ph type="ftr" sz="quarter" idx="11"/>
+          </p:nvPr>
+        </p:nvSpPr>
+        <p:spPr/>
+        <p:txBody>
+          <a:bodyPr/>
+          <a:lstStyle/>
+          <a:p>
+            <a:r>
+              <a:rPr lang="en-US" smtClean="0"/>
+              <a:t>Matt Smith - WebDriver &amp; Selenium</a:t>
+            </a:r>
+            <a:endParaRPr lang="en-US"/>
+          </a:p>
+        </p:txBody>
+      </p:sp>
+      <p:sp>
+        <p:nvSpPr>
+          <p:cNvPr id="5" name="Slide Number Placeholder 4"/>
+          <p:cNvSpPr>
+            <a:spLocks noGrp="1"/>
+          </p:cNvSpPr>
+          <p:nvPr>
+            <p:ph type="sldNum" sz="quarter" idx="12"/>
+          </p:nvPr>
+        </p:nvSpPr>
+        <p:spPr/>
+        <p:txBody>
+          <a:bodyPr/>
+          <a:lstStyle/>
+          <a:p>
+            <a:fld id="{BE924555-EAFD-4B2F-96F4-A60706EF2138}" type="slidenum">
+              <a:rPr lang="en-US" smtClean="0"/>
+              <a:pPr/>
+              <a:t>6</a:t>
+            </a:fld>
+            <a:endParaRPr lang="en-US"/>
+          </a:p>
+        </p:txBody>
+      </p:sp>
+      <p:sp>
+        <p:nvSpPr>
+          <p:cNvPr id="6" name="Content Placeholder 5"/>
+          <p:cNvSpPr>
+            <a:spLocks noGrp="1"/>
+          </p:cNvSpPr>
+          <p:nvPr>
+            <p:ph sz="quarter" idx="1"/>
+          </p:nvPr>
+        </p:nvSpPr>
+        <p:spPr/>
+        <p:txBody>
+          <a:bodyPr/>
+          <a:lstStyle/>
+          <a:p>
+            <a:r>
+              <a:rPr lang="en-US" dirty="0" smtClean="0"/>
+              <a:t>Manage multiple Windows (Tabs) and Frames</a:t>
+            </a:r>
+          </a:p>
+          <a:p>
+            <a:r>
+              <a:rPr lang="en-US" dirty="0" smtClean="0"/>
+              <a:t>Popup Dialogs</a:t>
+            </a:r>
+          </a:p>
+          <a:p>
+            <a:r>
+              <a:rPr lang="en-US" dirty="0" smtClean="0"/>
+              <a:t>Navigation History and Location</a:t>
+            </a:r>
+          </a:p>
+          <a:p>
+            <a:r>
+              <a:rPr lang="en-US" dirty="0" smtClean="0"/>
+              <a:t>Cookies</a:t>
+            </a:r>
+          </a:p>
+          <a:p>
+            <a:pPr lvl="1"/>
+            <a:r>
+              <a:rPr lang="en-US" dirty="0" smtClean="0"/>
+              <a:t>Must be on the domain that the cookie will be valid for</a:t>
+            </a:r>
+          </a:p>
+          <a:p>
+            <a:pPr marL="274320" lvl="1" indent="0">
+              <a:buNone/>
+            </a:pPr>
+            <a:endParaRPr lang="en-US" dirty="0"/>
+          </a:p>
+        </p:txBody>
+      </p:sp>
+    </p:spTree>
+    <p:extLst>
+      <p:ext uri="{BB962C8B-B14F-4D97-AF65-F5344CB8AC3E}">
+        <p14:creationId xmlns:p14="http://schemas.microsoft.com/office/powerpoint/2010/main" val="1262303725"/>
+      </p:ext>
+    </p:extLst>
+  </p:cSld>
+  <p:clrMapOvr>
+    <a:masterClrMapping/>
+  </p:clrMapOvr>
+</p:sld>
+</file>
+
+<file path=ppt/slides/slide7.xml><?xml version="1.0" encoding="utf-8"?>
+<p:sld xmlns:a="http://schemas.openxmlformats.org/drawingml/2006/main" xmlns:r="http://schemas.openxmlformats.org/officeDocument/2006/relationships" xmlns:p="http://schemas.openxmlformats.org/presentationml/2006/main">
+  <p:cSld>
+    <p:spTree>
+      <p:nvGrpSpPr>
+        <p:cNvPr id="1" name=""/>
+        <p:cNvGrpSpPr/>
+        <p:nvPr/>
+      </p:nvGrpSpPr>
+      <p:grpSpPr>
+        <a:xfrm>
+          <a:off x="0" y="0"/>
+          <a:ext cx="0" cy="0"/>
+          <a:chOff x="0" y="0"/>
+          <a:chExt cx="0" cy="0"/>
+        </a:xfrm>
+      </p:grpSpPr>
+      <p:sp>
+        <p:nvSpPr>
+          <p:cNvPr id="2" name="Title 1"/>
+          <p:cNvSpPr>
+            <a:spLocks noGrp="1"/>
+          </p:cNvSpPr>
+          <p:nvPr>
+            <p:ph type="title"/>
+          </p:nvPr>
+        </p:nvSpPr>
+        <p:spPr/>
+        <p:txBody>
+          <a:bodyPr>
+            <a:normAutofit/>
+          </a:bodyPr>
+          <a:lstStyle/>
+          <a:p>
+            <a:r>
+              <a:rPr lang="en-US" dirty="0" smtClean="0"/>
+              <a:t>Supported Browsers</a:t>
+            </a:r>
+            <a:endParaRPr lang="en-US" dirty="0"/>
+          </a:p>
+        </p:txBody>
+      </p:sp>
+      <p:sp>
+        <p:nvSpPr>
+          <p:cNvPr id="3" name="Date Placeholder 2"/>
+          <p:cNvSpPr>
+            <a:spLocks noGrp="1"/>
+          </p:cNvSpPr>
+          <p:nvPr>
+            <p:ph type="dt" sz="half" idx="10"/>
+          </p:nvPr>
+        </p:nvSpPr>
+        <p:spPr/>
+        <p:txBody>
+          <a:bodyPr/>
+          <a:lstStyle/>
+          <a:p>
+            <a:r>
+              <a:rPr lang="en-US" smtClean="0"/>
+              <a:t>Feb. 7. 2014</a:t>
+            </a:r>
+            <a:endParaRPr lang="en-US"/>
+          </a:p>
+        </p:txBody>
+      </p:sp>
+      <p:sp>
+        <p:nvSpPr>
+          <p:cNvPr id="4" name="Footer Placeholder 3"/>
+          <p:cNvSpPr>
+            <a:spLocks noGrp="1"/>
+          </p:cNvSpPr>
+          <p:nvPr>
+            <p:ph type="ftr" sz="quarter" idx="11"/>
+          </p:nvPr>
+        </p:nvSpPr>
+        <p:spPr/>
+        <p:txBody>
+          <a:bodyPr/>
+          <a:lstStyle/>
+          <a:p>
+            <a:r>
+              <a:rPr lang="en-US" smtClean="0"/>
+              <a:t>Matt Smith - WebDriver &amp; Selenium</a:t>
+            </a:r>
+            <a:endParaRPr lang="en-US"/>
+          </a:p>
+        </p:txBody>
+      </p:sp>
+      <p:sp>
+        <p:nvSpPr>
+          <p:cNvPr id="5" name="Slide Number Placeholder 4"/>
+          <p:cNvSpPr>
+            <a:spLocks noGrp="1"/>
+          </p:cNvSpPr>
+          <p:nvPr>
+            <p:ph type="sldNum" sz="quarter" idx="12"/>
+          </p:nvPr>
+        </p:nvSpPr>
+        <p:spPr/>
+        <p:txBody>
+          <a:bodyPr/>
+          <a:lstStyle/>
+          <a:p>
+            <a:fld id="{BE924555-EAFD-4B2F-96F4-A60706EF2138}" type="slidenum">
+              <a:rPr lang="en-US" smtClean="0"/>
+              <a:pPr/>
+              <a:t>7</a:t>
+            </a:fld>
+            <a:endParaRPr lang="en-US"/>
+          </a:p>
+        </p:txBody>
+      </p:sp>
+      <p:sp>
+        <p:nvSpPr>
+          <p:cNvPr id="6" name="Content Placeholder 5"/>
+          <p:cNvSpPr>
+            <a:spLocks noGrp="1"/>
+          </p:cNvSpPr>
+          <p:nvPr>
+            <p:ph sz="quarter" idx="1"/>
+          </p:nvPr>
+        </p:nvSpPr>
+        <p:spPr/>
+        <p:txBody>
+          <a:bodyPr>
+            <a:normAutofit fontScale="70000" lnSpcReduction="20000"/>
+          </a:bodyPr>
+          <a:lstStyle/>
+          <a:p>
+            <a:r>
+              <a:rPr lang="en-US" dirty="0" err="1" smtClean="0"/>
+              <a:t>HtmlUnit</a:t>
+            </a:r>
+            <a:r>
+              <a:rPr lang="en-US" dirty="0" smtClean="0"/>
+              <a:t> </a:t>
+            </a:r>
+            <a:r>
+              <a:rPr lang="en-US" sz="1400" i="1" dirty="0" smtClean="0"/>
+              <a:t>(Headless browser)</a:t>
+            </a:r>
+          </a:p>
+          <a:p>
+            <a:pPr lvl="1"/>
+            <a:r>
+              <a:rPr lang="en-US" dirty="0" smtClean="0"/>
+              <a:t>Fastest and most light weight driver. </a:t>
+            </a:r>
+          </a:p>
+          <a:p>
+            <a:pPr lvl="1"/>
+            <a:r>
+              <a:rPr lang="en-US" dirty="0" smtClean="0"/>
+              <a:t>Does not run JavaScript by default</a:t>
+            </a:r>
+          </a:p>
+          <a:p>
+            <a:r>
+              <a:rPr lang="en-US" dirty="0" smtClean="0"/>
+              <a:t>Firefox</a:t>
+            </a:r>
+          </a:p>
+          <a:p>
+            <a:pPr lvl="1"/>
+            <a:r>
+              <a:rPr lang="en-US" dirty="0" smtClean="0"/>
+              <a:t>Targeted Versions</a:t>
+            </a:r>
+          </a:p>
+          <a:p>
+            <a:pPr lvl="2"/>
+            <a:r>
+              <a:rPr lang="en-US" dirty="0" smtClean="0"/>
+              <a:t>3.6</a:t>
+            </a:r>
+          </a:p>
+          <a:p>
+            <a:pPr lvl="2"/>
+            <a:r>
+              <a:rPr lang="en-US" dirty="0" smtClean="0"/>
+              <a:t>10</a:t>
+            </a:r>
+          </a:p>
+          <a:p>
+            <a:pPr lvl="2"/>
+            <a:r>
+              <a:rPr lang="en-US" dirty="0" smtClean="0"/>
+              <a:t>latest – 1</a:t>
+            </a:r>
+          </a:p>
+          <a:p>
+            <a:pPr lvl="2"/>
+            <a:r>
+              <a:rPr lang="en-US" dirty="0" smtClean="0"/>
+              <a:t>latest</a:t>
+            </a:r>
+          </a:p>
+          <a:p>
+            <a:pPr lvl="1"/>
+            <a:r>
+              <a:rPr lang="en-US" dirty="0" smtClean="0"/>
+              <a:t>Windows, Mac, Linux</a:t>
+            </a:r>
+          </a:p>
+          <a:p>
+            <a:pPr lvl="1"/>
+            <a:r>
+              <a:rPr lang="en-US" dirty="0" smtClean="0"/>
+              <a:t>Runs with no installed plugins</a:t>
+            </a:r>
+          </a:p>
+          <a:p>
+            <a:r>
+              <a:rPr lang="en-US" dirty="0" smtClean="0"/>
+              <a:t>IE</a:t>
+            </a:r>
+          </a:p>
+          <a:p>
+            <a:pPr lvl="1"/>
+            <a:r>
+              <a:rPr lang="en-US" dirty="0" smtClean="0"/>
+              <a:t>Targeted Versions: 6, 7, 8, 9, 10, (Not 11) on appropriate combinations of XP, Vista, and Windows 7</a:t>
+            </a:r>
+          </a:p>
+          <a:p>
+            <a:pPr lvl="1"/>
+            <a:r>
+              <a:rPr lang="en-US" dirty="0" smtClean="0"/>
+              <a:t>Be cautious of 32 </a:t>
+            </a:r>
+            <a:r>
+              <a:rPr lang="en-US" dirty="0" err="1" smtClean="0"/>
+              <a:t>vs</a:t>
+            </a:r>
+            <a:r>
+              <a:rPr lang="en-US" dirty="0" smtClean="0"/>
+              <a:t> 64 bit machines</a:t>
+            </a:r>
+          </a:p>
+          <a:p>
+            <a:pPr lvl="1"/>
+            <a:r>
+              <a:rPr lang="en-US" i="1" dirty="0" smtClean="0"/>
+              <a:t>Some setup required…. read the docs</a:t>
+            </a:r>
+          </a:p>
+          <a:p>
+            <a:pPr lvl="1"/>
+            <a:r>
+              <a:rPr lang="en-US" dirty="0" smtClean="0"/>
+              <a:t>XPath selector does not work</a:t>
+            </a:r>
+          </a:p>
+          <a:p>
+            <a:pPr lvl="1"/>
+            <a:r>
+              <a:rPr lang="en-US" dirty="0" smtClean="0"/>
+              <a:t>CSS Selectors not support in 6 and 7, Sizzle is injected instead</a:t>
+            </a:r>
+          </a:p>
+          <a:p>
+            <a:pPr lvl="1"/>
+            <a:r>
+              <a:rPr lang="en-US" dirty="0" smtClean="0"/>
+              <a:t>CSS Selectors in 8 and 9 are native, but those browsers don’t fully support CSS3</a:t>
+            </a:r>
+          </a:p>
+        </p:txBody>
+      </p:sp>
+    </p:spTree>
+    <p:extLst>
+      <p:ext uri="{BB962C8B-B14F-4D97-AF65-F5344CB8AC3E}">
+        <p14:creationId xmlns:p14="http://schemas.microsoft.com/office/powerpoint/2010/main" val="2474569051"/>
+      </p:ext>
+    </p:extLst>
+  </p:cSld>
+  <p:clrMapOvr>
+    <a:masterClrMapping/>
+  </p:clrMapOvr>
+</p:sld>
+</file>
+
+<file path=ppt/slides/slide8.xml><?xml version="1.0" encoding="utf-8"?>
+<p:sld xmlns:a="http://schemas.openxmlformats.org/drawingml/2006/main" xmlns:r="http://schemas.openxmlformats.org/officeDocument/2006/relationships" xmlns:p="http://schemas.openxmlformats.org/presentationml/2006/main">
+  <p:cSld>
+    <p:spTree>
+      <p:nvGrpSpPr>
+        <p:cNvPr id="1" name=""/>
+        <p:cNvGrpSpPr/>
+        <p:nvPr/>
+      </p:nvGrpSpPr>
+      <p:grpSpPr>
+        <a:xfrm>
+          <a:off x="0" y="0"/>
+          <a:ext cx="0" cy="0"/>
+          <a:chOff x="0" y="0"/>
+          <a:chExt cx="0" cy="0"/>
+        </a:xfrm>
+      </p:grpSpPr>
+      <p:sp>
+        <p:nvSpPr>
+          <p:cNvPr id="2" name="Title 1"/>
+          <p:cNvSpPr>
+            <a:spLocks noGrp="1"/>
+          </p:cNvSpPr>
+          <p:nvPr>
+            <p:ph type="title"/>
+          </p:nvPr>
+        </p:nvSpPr>
+        <p:spPr/>
+        <p:txBody>
+          <a:bodyPr/>
+          <a:lstStyle/>
+          <a:p>
+            <a:r>
+              <a:rPr lang="en-US" dirty="0" smtClean="0"/>
+              <a:t>Supported Browsers</a:t>
+            </a:r>
+            <a:endParaRPr lang="en-US" dirty="0"/>
+          </a:p>
+        </p:txBody>
+      </p:sp>
+      <p:sp>
+        <p:nvSpPr>
+          <p:cNvPr id="3" name="Date Placeholder 2"/>
+          <p:cNvSpPr>
+            <a:spLocks noGrp="1"/>
+          </p:cNvSpPr>
+          <p:nvPr>
+            <p:ph type="dt" sz="half" idx="10"/>
+          </p:nvPr>
+        </p:nvSpPr>
+        <p:spPr/>
+        <p:txBody>
+          <a:bodyPr/>
+          <a:lstStyle/>
+          <a:p>
+            <a:r>
+              <a:rPr lang="en-US" smtClean="0"/>
+              <a:t>Feb. 7. 2014</a:t>
+            </a:r>
+            <a:endParaRPr lang="en-US"/>
+          </a:p>
+        </p:txBody>
+      </p:sp>
+      <p:sp>
+        <p:nvSpPr>
+          <p:cNvPr id="4" name="Footer Placeholder 3"/>
+          <p:cNvSpPr>
+            <a:spLocks noGrp="1"/>
+          </p:cNvSpPr>
+          <p:nvPr>
+            <p:ph type="ftr" sz="quarter" idx="11"/>
+          </p:nvPr>
+        </p:nvSpPr>
+        <p:spPr/>
+        <p:txBody>
+          <a:bodyPr/>
+          <a:lstStyle/>
+          <a:p>
+            <a:r>
+              <a:rPr lang="en-US" smtClean="0"/>
+              <a:t>Matt Smith - WebDriver &amp; Selenium</a:t>
+            </a:r>
+            <a:endParaRPr lang="en-US"/>
+          </a:p>
+        </p:txBody>
+      </p:sp>
+      <p:sp>
+        <p:nvSpPr>
+          <p:cNvPr id="5" name="Slide Number Placeholder 4"/>
+          <p:cNvSpPr>
+            <a:spLocks noGrp="1"/>
+          </p:cNvSpPr>
+          <p:nvPr>
+            <p:ph type="sldNum" sz="quarter" idx="12"/>
+          </p:nvPr>
+        </p:nvSpPr>
+        <p:spPr/>
+        <p:txBody>
+          <a:bodyPr/>
+          <a:lstStyle/>
+          <a:p>
+            <a:fld id="{BE924555-EAFD-4B2F-96F4-A60706EF2138}" type="slidenum">
+              <a:rPr lang="en-US" smtClean="0"/>
+              <a:pPr/>
+              <a:t>8</a:t>
+            </a:fld>
+            <a:endParaRPr lang="en-US"/>
+          </a:p>
+        </p:txBody>
+      </p:sp>
+      <p:sp>
+        <p:nvSpPr>
+          <p:cNvPr id="6" name="Content Placeholder 5"/>
+          <p:cNvSpPr>
+            <a:spLocks noGrp="1"/>
+          </p:cNvSpPr>
+          <p:nvPr>
+            <p:ph sz="quarter" idx="1"/>
+          </p:nvPr>
+        </p:nvSpPr>
+        <p:spPr/>
+        <p:txBody>
+          <a:bodyPr/>
+          <a:lstStyle/>
+          <a:p>
+            <a:r>
+              <a:rPr lang="en-US" dirty="0" smtClean="0"/>
+              <a:t>Chrome</a:t>
+            </a:r>
+          </a:p>
+          <a:p>
+            <a:pPr lvl="1"/>
+            <a:r>
+              <a:rPr lang="en-US" dirty="0" smtClean="0"/>
+              <a:t>Maintained by Chromium</a:t>
+            </a:r>
+          </a:p>
+          <a:p>
+            <a:pPr lvl="1"/>
+            <a:r>
+              <a:rPr lang="en-US" dirty="0" smtClean="0"/>
+              <a:t>Like IE the driver is a process outside the browser</a:t>
+            </a:r>
+          </a:p>
+          <a:p>
+            <a:pPr lvl="1"/>
+            <a:r>
+              <a:rPr lang="en-US" dirty="0" smtClean="0"/>
+              <a:t>Since Chrome is a </a:t>
+            </a:r>
+            <a:r>
+              <a:rPr lang="en-US" dirty="0" err="1" smtClean="0"/>
+              <a:t>Webkit</a:t>
+            </a:r>
+            <a:r>
+              <a:rPr lang="en-US" dirty="0" smtClean="0"/>
+              <a:t>-based browser, the </a:t>
+            </a:r>
+            <a:r>
+              <a:rPr lang="en-US" dirty="0" err="1" smtClean="0"/>
+              <a:t>ChromeDriver</a:t>
+            </a:r>
+            <a:r>
+              <a:rPr lang="en-US" dirty="0" smtClean="0"/>
+              <a:t> may allow you to run Safari, but JavaScript may differ.</a:t>
+            </a:r>
+          </a:p>
+          <a:p>
+            <a:r>
+              <a:rPr lang="en-US" dirty="0" smtClean="0"/>
+              <a:t>Opera – </a:t>
+            </a:r>
+            <a:r>
+              <a:rPr lang="en-US" i="1" dirty="0" smtClean="0"/>
+              <a:t>See the docs</a:t>
+            </a:r>
+          </a:p>
+          <a:p>
+            <a:r>
+              <a:rPr lang="en-US" dirty="0" err="1" smtClean="0"/>
+              <a:t>iOS</a:t>
+            </a:r>
+            <a:r>
+              <a:rPr lang="en-US" dirty="0" smtClean="0"/>
+              <a:t> – </a:t>
+            </a:r>
+            <a:r>
+              <a:rPr lang="en-US" i="1" dirty="0" smtClean="0"/>
+              <a:t>See the docs</a:t>
+            </a:r>
+          </a:p>
+          <a:p>
+            <a:r>
+              <a:rPr lang="en-US" dirty="0" smtClean="0"/>
+              <a:t>Android – </a:t>
+            </a:r>
+            <a:r>
+              <a:rPr lang="en-US" i="1" dirty="0" smtClean="0"/>
+              <a:t>See the docs</a:t>
+            </a:r>
+            <a:endParaRPr lang="en-US" i="1" dirty="0"/>
+          </a:p>
+        </p:txBody>
+      </p:sp>
+    </p:spTree>
+    <p:extLst>
+      <p:ext uri="{BB962C8B-B14F-4D97-AF65-F5344CB8AC3E}">
+        <p14:creationId xmlns:p14="http://schemas.microsoft.com/office/powerpoint/2010/main" val="1520643706"/>
+      </p:ext>
+    </p:extLst>
+  </p:cSld>
+  <p:clrMapOvr>
+    <a:masterClrMapping/>
+  </p:clrMapOvr>
+</p:sld>
+</file>
+
+<file path=ppt/slides/slide9.xml><?xml version="1.0" encoding="utf-8"?>
+<p:sld xmlns:a="http://schemas.openxmlformats.org/drawingml/2006/main" xmlns:r="http://schemas.openxmlformats.org/officeDocument/2006/relationships" xmlns:p="http://schemas.openxmlformats.org/presentationml/2006/main">
+  <p:cSld>
+    <p:bg>
+      <p:bgPr>
+        <a:blipFill>
+          <a:blip r:embed="rId2">
+            <a:alphaModFix amt="30000"/>
+          </a:blip>
+          <a:tile tx="0" ty="0" sx="65000" sy="65000" flip="none" algn="tl"/>
+        </a:blipFill>
+        <a:effectLst/>
+      </p:bgPr>
+    </p:bg>
+    <p:spTree>
+      <p:nvGrpSpPr>
+        <p:cNvPr id="1" name=""/>
+        <p:cNvGrpSpPr/>
+        <p:nvPr/>
+      </p:nvGrpSpPr>
+      <p:grpSpPr>
+        <a:xfrm>
+          <a:off x="0" y="0"/>
+          <a:ext cx="0" cy="0"/>
+          <a:chOff x="0" y="0"/>
+          <a:chExt cx="0" cy="0"/>
+        </a:xfrm>
+      </p:grpSpPr>
+      <p:sp>
+        <p:nvSpPr>
+          <p:cNvPr id="2" name="Title 1"/>
+          <p:cNvSpPr>
+            <a:spLocks noGrp="1"/>
+          </p:cNvSpPr>
+          <p:nvPr>
+            <p:ph type="title"/>
+          </p:nvPr>
+        </p:nvSpPr>
+        <p:spPr/>
+        <p:txBody>
+          <a:bodyPr/>
+          <a:lstStyle/>
+          <a:p>
+            <a:r>
+              <a:rPr lang="en-US" dirty="0" smtClean="0"/>
+              <a:t>Basic Flow</a:t>
             </a:r>
             <a:endParaRPr lang="en-US" dirty="0"/>
           </a:p>
@@ -6914,14 +9095,14 @@
       </p:sp>
       <p:pic>
         <p:nvPicPr>
-          <p:cNvPr id="3" name="Picture 2" descr="WebDriver - Bad.png"/>
+          <p:cNvPr id="7" name="Picture 6" descr="WebDriver - Simple Flow.png"/>
           <p:cNvPicPr>
             <a:picLocks noChangeAspect="1"/>
           </p:cNvPicPr>
           <p:nvPr/>
         </p:nvPicPr>
         <p:blipFill>
-          <a:blip r:embed="rId2" cstate="print">
+          <a:blip r:embed="rId3" cstate="print">
             <a:extLst>
               <a:ext uri="{28A0092B-C50C-407E-A947-70E740481C1C}">
                 <a14:useLocalDpi xmlns:a14="http://schemas.microsoft.com/office/drawing/2010/main" val="0"/>
@@ -6934,24 +9115,164 @@
         </p:blipFill>
         <p:spPr>
           <a:xfrm>
-            <a:off x="152400" y="1219200"/>
-            <a:ext cx="8839200" cy="5286218"/>
+            <a:off x="152400" y="914400"/>
+            <a:ext cx="9144000" cy="5218435"/>
           </a:xfrm>
           <a:prstGeom prst="rect">
             <a:avLst/>
           </a:prstGeom>
         </p:spPr>
       </p:pic>
+      <p:sp>
+        <p:nvSpPr>
+          <p:cNvPr id="3" name="Date Placeholder 2"/>
+          <p:cNvSpPr>
+            <a:spLocks noGrp="1"/>
+          </p:cNvSpPr>
+          <p:nvPr>
+            <p:ph type="dt" sz="half" idx="10"/>
+          </p:nvPr>
+        </p:nvSpPr>
+        <p:spPr/>
+        <p:txBody>
+          <a:bodyPr/>
+          <a:lstStyle/>
+          <a:p>
+            <a:r>
+              <a:rPr lang="en-US" smtClean="0"/>
+              <a:t>Feb. 7. 2014</a:t>
+            </a:r>
+            <a:endParaRPr lang="en-US"/>
+          </a:p>
+        </p:txBody>
+      </p:sp>
+      <p:sp>
+        <p:nvSpPr>
+          <p:cNvPr id="4" name="Footer Placeholder 3"/>
+          <p:cNvSpPr>
+            <a:spLocks noGrp="1"/>
+          </p:cNvSpPr>
+          <p:nvPr>
+            <p:ph type="ftr" sz="quarter" idx="11"/>
+          </p:nvPr>
+        </p:nvSpPr>
+        <p:spPr/>
+        <p:txBody>
+          <a:bodyPr/>
+          <a:lstStyle/>
+          <a:p>
+            <a:r>
+              <a:rPr lang="en-US" smtClean="0"/>
+              <a:t>Matt Smith - WebDriver &amp; Selenium</a:t>
+            </a:r>
+            <a:endParaRPr lang="en-US"/>
+          </a:p>
+        </p:txBody>
+      </p:sp>
+      <p:sp>
+        <p:nvSpPr>
+          <p:cNvPr id="5" name="Slide Number Placeholder 4"/>
+          <p:cNvSpPr>
+            <a:spLocks noGrp="1"/>
+          </p:cNvSpPr>
+          <p:nvPr>
+            <p:ph type="sldNum" sz="quarter" idx="12"/>
+          </p:nvPr>
+        </p:nvSpPr>
+        <p:spPr>
+          <a:xfrm>
+            <a:off x="4343400" y="996950"/>
+            <a:ext cx="457200" cy="441325"/>
+          </a:xfrm>
+        </p:spPr>
+        <p:txBody>
+          <a:bodyPr/>
+          <a:lstStyle/>
+          <a:p>
+            <a:fld id="{BE924555-EAFD-4B2F-96F4-A60706EF2138}" type="slidenum">
+              <a:rPr lang="en-US" smtClean="0"/>
+              <a:pPr/>
+              <a:t>9</a:t>
+            </a:fld>
+            <a:endParaRPr lang="en-US" dirty="0"/>
+          </a:p>
+        </p:txBody>
+      </p:sp>
+      <p:sp>
+        <p:nvSpPr>
+          <p:cNvPr id="6" name="TextBox 5"/>
+          <p:cNvSpPr txBox="1"/>
+          <p:nvPr/>
+        </p:nvSpPr>
+        <p:spPr>
+          <a:xfrm>
+            <a:off x="4672877" y="5334000"/>
+            <a:ext cx="3815806" cy="738664"/>
+          </a:xfrm>
+          <a:prstGeom prst="rect">
+            <a:avLst/>
+          </a:prstGeom>
+          <a:noFill/>
+        </p:spPr>
+        <p:txBody>
+          <a:bodyPr wrap="none" rtlCol="0">
+            <a:spAutoFit/>
+          </a:bodyPr>
+          <a:lstStyle/>
+          <a:p>
+            <a:pPr algn="ctr"/>
+            <a:r>
+              <a:rPr lang="en-US" sz="1400" dirty="0" smtClean="0">
+                <a:solidFill>
+                  <a:srgbClr val="000000"/>
+                </a:solidFill>
+              </a:rPr>
+              <a:t>Firefox runs both of these in the same process</a:t>
+            </a:r>
+          </a:p>
+          <a:p>
+            <a:pPr algn="ctr"/>
+            <a:endParaRPr lang="en-US" sz="1400" dirty="0" smtClean="0">
+              <a:solidFill>
+                <a:srgbClr val="000000"/>
+              </a:solidFill>
+            </a:endParaRPr>
+          </a:p>
+          <a:p>
+            <a:pPr algn="ctr"/>
+            <a:r>
+              <a:rPr lang="en-US" sz="1400" dirty="0" smtClean="0">
+                <a:solidFill>
+                  <a:srgbClr val="000000"/>
+                </a:solidFill>
+              </a:rPr>
+              <a:t>Chrome and IE run in separate processes</a:t>
+            </a:r>
+            <a:endParaRPr lang="en-US" sz="1400" dirty="0">
+              <a:solidFill>
+                <a:srgbClr val="000000"/>
+              </a:solidFill>
+            </a:endParaRPr>
+          </a:p>
+        </p:txBody>
+      </p:sp>
     </p:spTree>
     <p:extLst>
       <p:ext uri="{BB962C8B-B14F-4D97-AF65-F5344CB8AC3E}">
-        <p14:creationId xmlns:p14="http://schemas.microsoft.com/office/powerpoint/2010/main" val="2480672318"/>
+        <p14:creationId xmlns:p14="http://schemas.microsoft.com/office/powerpoint/2010/main" val="633117598"/>
       </p:ext>
     </p:extLst>
   </p:cSld>
   <p:clrMapOvr>
     <a:masterClrMapping/>
   </p:clrMapOvr>
+  <p:timing>
+    <p:tnLst>
+      <p:par>
+        <p:cTn xmlns:p14="http://schemas.microsoft.com/office/powerpoint/2010/main" id="1" dur="indefinite" restart="never" nodeType="tmRoot"/>
+      </p:par>
+    </p:tnLst>
+  </p:timing>
 </p:sld>
 </file>
 
@@ -7485,6 +9806,326 @@
 </a:theme>
 </file>
 
+<file path=ppt/theme/theme3.xml><?xml version="1.0" encoding="utf-8"?>
+<a:theme xmlns:a="http://schemas.openxmlformats.org/drawingml/2006/main" name="Office Theme">
+  <a:themeElements>
+    <a:clrScheme name="Office">
+      <a:dk1>
+        <a:sysClr val="windowText" lastClr="000000"/>
+      </a:dk1>
+      <a:lt1>
+        <a:sysClr val="window" lastClr="FFFFFF"/>
+      </a:lt1>
+      <a:dk2>
+        <a:srgbClr val="1F497D"/>
+      </a:dk2>
+      <a:lt2>
+        <a:srgbClr val="EEECE1"/>
+      </a:lt2>
+      <a:accent1>
+        <a:srgbClr val="4F81BD"/>
+      </a:accent1>
+      <a:accent2>
+        <a:srgbClr val="C0504D"/>
+      </a:accent2>
+      <a:accent3>
+        <a:srgbClr val="9BBB59"/>
+      </a:accent3>
+      <a:accent4>
+        <a:srgbClr val="8064A2"/>
+      </a:accent4>
+      <a:accent5>
+        <a:srgbClr val="4BACC6"/>
+      </a:accent5>
+      <a:accent6>
+        <a:srgbClr val="F79646"/>
+      </a:accent6>
+      <a:hlink>
+        <a:srgbClr val="0000FF"/>
+      </a:hlink>
+      <a:folHlink>
+        <a:srgbClr val="800080"/>
+      </a:folHlink>
+    </a:clrScheme>
+    <a:fontScheme name="Office">
+      <a:majorFont>
+        <a:latin typeface="Calibri"/>
+        <a:ea typeface=""/>
+        <a:cs typeface=""/>
+        <a:font script="Jpan" typeface="ＭＳ Ｐゴシック"/>
+        <a:font script="Hang" typeface="맑은 고딕"/>
+        <a:font script="Hans" typeface="宋体"/>
+        <a:font script="Hant" typeface="新細明體"/>
+        <a:font script="Arab" typeface="Times New Roman"/>
+        <a:font script="Hebr" typeface="Times New Roman"/>
+        <a:font script="Thai" typeface="Angsana New"/>
+        <a:font script="Ethi" typeface="Nyala"/>
+        <a:font script="Beng" typeface="Vrinda"/>
+        <a:font script="Gujr" typeface="Shruti"/>
+        <a:font script="Khmr" typeface="MoolBoran"/>
+        <a:font script="Knda" typeface="Tunga"/>
+        <a:font script="Guru" typeface="Raavi"/>
+        <a:font script="Cans" typeface="Euphemia"/>
+        <a:font script="Cher" typeface="Plantagenet Cherokee"/>
+        <a:font script="Yiii" typeface="Microsoft Yi Baiti"/>
+        <a:font script="Tibt" typeface="Microsoft Himalaya"/>
+        <a:font script="Thaa" typeface="MV Boli"/>
+        <a:font script="Deva" typeface="Mangal"/>
+        <a:font script="Telu" typeface="Gautami"/>
+        <a:font script="Taml" typeface="Latha"/>
+        <a:font script="Syrc" typeface="Estrangelo Edessa"/>
+        <a:font script="Orya" typeface="Kalinga"/>
+        <a:font script="Mlym" typeface="Kartika"/>
+        <a:font script="Laoo" typeface="DokChampa"/>
+        <a:font script="Sinh" typeface="Iskoola Pota"/>
+        <a:font script="Mong" typeface="Mongolian Baiti"/>
+        <a:font script="Viet" typeface="Times New Roman"/>
+        <a:font script="Uigh" typeface="Microsoft Uighur"/>
+        <a:font script="Geor" typeface="Sylfaen"/>
+      </a:majorFont>
+      <a:minorFont>
+        <a:latin typeface="Calibri"/>
+        <a:ea typeface=""/>
+        <a:cs typeface=""/>
+        <a:font script="Jpan" typeface="ＭＳ Ｐゴシック"/>
+        <a:font script="Hang" typeface="맑은 고딕"/>
+        <a:font script="Hans" typeface="宋体"/>
+        <a:font script="Hant" typeface="新細明體"/>
+        <a:font script="Arab" typeface="Arial"/>
+        <a:font script="Hebr" typeface="Arial"/>
+        <a:font script="Thai" typeface="Cordia New"/>
+        <a:font script="Ethi" typeface="Nyala"/>
+        <a:font script="Beng" typeface="Vrinda"/>
+        <a:font script="Gujr" typeface="Shruti"/>
+        <a:font script="Khmr" typeface="DaunPenh"/>
+        <a:font script="Knda" typeface="Tunga"/>
+        <a:font script="Guru" typeface="Raavi"/>
+        <a:font script="Cans" typeface="Euphemia"/>
+        <a:font script="Cher" typeface="Plantagenet Cherokee"/>
+        <a:font script="Yiii" typeface="Microsoft Yi Baiti"/>
+        <a:font script="Tibt" typeface="Microsoft Himalaya"/>
+        <a:font script="Thaa" typeface="MV Boli"/>
+        <a:font script="Deva" typeface="Mangal"/>
+        <a:font script="Telu" typeface="Gautami"/>
+        <a:font script="Taml" typeface="Latha"/>
+        <a:font script="Syrc" typeface="Estrangelo Edessa"/>
+        <a:font script="Orya" typeface="Kalinga"/>
+        <a:font script="Mlym" typeface="Kartika"/>
+        <a:font script="Laoo" typeface="DokChampa"/>
+        <a:font script="Sinh" typeface="Iskoola Pota"/>
+        <a:font script="Mong" typeface="Mongolian Baiti"/>
+        <a:font script="Viet" typeface="Arial"/>
+        <a:font script="Uigh" typeface="Microsoft Uighur"/>
+        <a:font script="Geor" typeface="Sylfaen"/>
+      </a:minorFont>
+    </a:fontScheme>
+    <a:fmtScheme name="Office">
+      <a:fillStyleLst>
+        <a:solidFill>
+          <a:schemeClr val="phClr"/>
+        </a:solidFill>
+        <a:gradFill rotWithShape="1">
+          <a:gsLst>
+            <a:gs pos="0">
+              <a:schemeClr val="phClr">
+                <a:tint val="50000"/>
+                <a:satMod val="300000"/>
+              </a:schemeClr>
+            </a:gs>
+            <a:gs pos="35000">
+              <a:schemeClr val="phClr">
+                <a:tint val="37000"/>
+                <a:satMod val="300000"/>
+              </a:schemeClr>
+            </a:gs>
+            <a:gs pos="100000">
+              <a:schemeClr val="phClr">
+                <a:tint val="15000"/>
+                <a:satMod val="350000"/>
+              </a:schemeClr>
+            </a:gs>
+          </a:gsLst>
+          <a:lin ang="16200000" scaled="1"/>
+        </a:gradFill>
+        <a:gradFill rotWithShape="1">
+          <a:gsLst>
+            <a:gs pos="0">
+              <a:schemeClr val="phClr">
+                <a:tint val="100000"/>
+                <a:shade val="100000"/>
+                <a:satMod val="130000"/>
+              </a:schemeClr>
+            </a:gs>
+            <a:gs pos="100000">
+              <a:schemeClr val="phClr">
+                <a:tint val="50000"/>
+                <a:shade val="100000"/>
+                <a:satMod val="350000"/>
+              </a:schemeClr>
+            </a:gs>
+          </a:gsLst>
+          <a:lin ang="16200000" scaled="0"/>
+        </a:gradFill>
+      </a:fillStyleLst>
+      <a:lnStyleLst>
+        <a:ln w="9525" cap="flat" cmpd="sng" algn="ctr">
+          <a:solidFill>
+            <a:schemeClr val="phClr">
+              <a:shade val="95000"/>
+              <a:satMod val="105000"/>
+            </a:schemeClr>
+          </a:solidFill>
+          <a:prstDash val="solid"/>
+        </a:ln>
+        <a:ln w="25400" cap="flat" cmpd="sng" algn="ctr">
+          <a:solidFill>
+            <a:schemeClr val="phClr"/>
+          </a:solidFill>
+          <a:prstDash val="solid"/>
+        </a:ln>
+        <a:ln w="38100" cap="flat" cmpd="sng" algn="ctr">
+          <a:solidFill>
+            <a:schemeClr val="phClr"/>
+          </a:solidFill>
+          <a:prstDash val="solid"/>
+        </a:ln>
+      </a:lnStyleLst>
+      <a:effectStyleLst>
+        <a:effectStyle>
+          <a:effectLst>
+            <a:outerShdw blurRad="40000" dist="20000" dir="5400000" rotWithShape="0">
+              <a:srgbClr val="000000">
+                <a:alpha val="38000"/>
+              </a:srgbClr>
+            </a:outerShdw>
+          </a:effectLst>
+        </a:effectStyle>
+        <a:effectStyle>
+          <a:effectLst>
+            <a:outerShdw blurRad="40000" dist="23000" dir="5400000" rotWithShape="0">
+              <a:srgbClr val="000000">
+                <a:alpha val="35000"/>
+              </a:srgbClr>
+            </a:outerShdw>
+          </a:effectLst>
+        </a:effectStyle>
+        <a:effectStyle>
+          <a:effectLst>
+            <a:outerShdw blurRad="40000" dist="23000" dir="5400000" rotWithShape="0">
+              <a:srgbClr val="000000">
+                <a:alpha val="35000"/>
+              </a:srgbClr>
+            </a:outerShdw>
+          </a:effectLst>
+          <a:scene3d>
+            <a:camera prst="orthographicFront">
+              <a:rot lat="0" lon="0" rev="0"/>
+            </a:camera>
+            <a:lightRig rig="threePt" dir="t">
+              <a:rot lat="0" lon="0" rev="1200000"/>
+            </a:lightRig>
+          </a:scene3d>
+          <a:sp3d>
+            <a:bevelT w="63500" h="25400"/>
+          </a:sp3d>
+        </a:effectStyle>
+      </a:effectStyleLst>
+      <a:bgFillStyleLst>
+        <a:solidFill>
+          <a:schemeClr val="phClr"/>
+        </a:solidFill>
+        <a:gradFill rotWithShape="1">
+          <a:gsLst>
+            <a:gs pos="0">
+              <a:schemeClr val="phClr">
+                <a:tint val="40000"/>
+                <a:satMod val="350000"/>
+              </a:schemeClr>
+            </a:gs>
+            <a:gs pos="40000">
+              <a:schemeClr val="phClr">
+                <a:tint val="45000"/>
+                <a:shade val="99000"/>
+                <a:satMod val="350000"/>
+              </a:schemeClr>
+            </a:gs>
+            <a:gs pos="100000">
+              <a:schemeClr val="phClr">
+                <a:shade val="20000"/>
+                <a:satMod val="255000"/>
+              </a:schemeClr>
+            </a:gs>
+          </a:gsLst>
+          <a:path path="circle">
+            <a:fillToRect l="50000" t="-80000" r="50000" b="180000"/>
+          </a:path>
+        </a:gradFill>
+        <a:gradFill rotWithShape="1">
+          <a:gsLst>
+            <a:gs pos="0">
+              <a:schemeClr val="phClr">
+                <a:tint val="80000"/>
+                <a:satMod val="300000"/>
+              </a:schemeClr>
+            </a:gs>
+            <a:gs pos="100000">
+              <a:schemeClr val="phClr">
+                <a:shade val="30000"/>
+                <a:satMod val="200000"/>
+              </a:schemeClr>
+            </a:gs>
+          </a:gsLst>
+          <a:path path="circle">
+            <a:fillToRect l="50000" t="50000" r="50000" b="50000"/>
+          </a:path>
+        </a:gradFill>
+      </a:bgFillStyleLst>
+    </a:fmtScheme>
+  </a:themeElements>
+  <a:objectDefaults>
+    <a:spDef>
+      <a:spPr/>
+      <a:bodyPr/>
+      <a:lstStyle/>
+      <a:style>
+        <a:lnRef idx="1">
+          <a:schemeClr val="accent1"/>
+        </a:lnRef>
+        <a:fillRef idx="3">
+          <a:schemeClr val="accent1"/>
+        </a:fillRef>
+        <a:effectRef idx="2">
+          <a:schemeClr val="accent1"/>
+        </a:effectRef>
+        <a:fontRef idx="minor">
+          <a:schemeClr val="lt1"/>
+        </a:fontRef>
+      </a:style>
+    </a:spDef>
+    <a:lnDef>
+      <a:spPr/>
+      <a:bodyPr/>
+      <a:lstStyle/>
+      <a:style>
+        <a:lnRef idx="2">
+          <a:schemeClr val="accent1"/>
+        </a:lnRef>
+        <a:fillRef idx="0">
+          <a:schemeClr val="accent1"/>
+        </a:fillRef>
+        <a:effectRef idx="1">
+          <a:schemeClr val="accent1"/>
+        </a:effectRef>
+        <a:fontRef idx="minor">
+          <a:schemeClr val="tx1"/>
+        </a:fontRef>
+      </a:style>
+    </a:lnDef>
+  </a:objectDefaults>
+  <a:extraClrSchemeLst/>
+</a:theme>
+</file>
+
 <file path=customXml/item1.xml><?xml version="1.0" encoding="utf-8"?>
 <?mso-contentType ?>
 <FormTemplates xmlns="http://schemas.microsoft.com/sharepoint/v3/contenttype/forms">

</xml_diff>

<commit_message>
Added more slides for WebDriver presentation
</commit_message>
<xml_diff>
--- a/WebDriver/Slides.pptx
+++ b/WebDriver/Slides.pptx
@@ -5,10 +5,10 @@
     <p:sldMasterId id="2147483696" r:id="rId2"/>
   </p:sldMasterIdLst>
   <p:notesMasterIdLst>
-    <p:notesMasterId r:id="rId15"/>
+    <p:notesMasterId r:id="rId19"/>
   </p:notesMasterIdLst>
   <p:handoutMasterIdLst>
-    <p:handoutMasterId r:id="rId16"/>
+    <p:handoutMasterId r:id="rId20"/>
   </p:handoutMasterIdLst>
   <p:sldIdLst>
     <p:sldId id="256" r:id="rId3"/>
@@ -19,10 +19,14 @@
     <p:sldId id="264" r:id="rId8"/>
     <p:sldId id="265" r:id="rId9"/>
     <p:sldId id="266" r:id="rId10"/>
-    <p:sldId id="259" r:id="rId11"/>
+    <p:sldId id="269" r:id="rId11"/>
     <p:sldId id="267" r:id="rId12"/>
-    <p:sldId id="263" r:id="rId13"/>
-    <p:sldId id="260" r:id="rId14"/>
+    <p:sldId id="270" r:id="rId13"/>
+    <p:sldId id="263" r:id="rId14"/>
+    <p:sldId id="272" r:id="rId15"/>
+    <p:sldId id="260" r:id="rId16"/>
+    <p:sldId id="271" r:id="rId17"/>
+    <p:sldId id="273" r:id="rId18"/>
   </p:sldIdLst>
   <p:sldSz cx="9144000" cy="6858000" type="screen4x3"/>
   <p:notesSz cx="6858000" cy="9144000"/>
@@ -206,7 +210,7 @@
           <a:p>
             <a:fld id="{B40A9E6F-6737-0744-A10B-6F064135DB2B}" type="datetimeFigureOut">
               <a:rPr lang="en-US" smtClean="0"/>
-              <a:t>2/4/14</a:t>
+              <a:t>2/5/14</a:t>
             </a:fld>
             <a:endParaRPr lang="en-US"/>
           </a:p>
@@ -372,7 +376,7 @@
           <a:p>
             <a:fld id="{3618A891-9467-4CC7-A491-0A34A0A97538}" type="datetimeFigureOut">
               <a:rPr lang="en-US" smtClean="0"/>
-              <a:t>2/4/14</a:t>
+              <a:t>2/5/14</a:t>
             </a:fld>
             <a:endParaRPr lang="en-US"/>
           </a:p>
@@ -7025,12 +7029,18 @@
         </p:nvSpPr>
         <p:spPr/>
         <p:txBody>
-          <a:bodyPr/>
-          <a:lstStyle/>
-          <a:p>
-            <a:r>
-              <a:rPr lang="en-US" dirty="0" smtClean="0"/>
-              <a:t>Element Location</a:t>
+          <a:bodyPr>
+            <a:normAutofit/>
+          </a:bodyPr>
+          <a:lstStyle/>
+          <a:p>
+            <a:r>
+              <a:rPr lang="en-US" dirty="0" smtClean="0"/>
+              <a:t>Element </a:t>
+            </a:r>
+            <a:r>
+              <a:rPr lang="en-US" dirty="0" smtClean="0"/>
+              <a:t>Location</a:t>
             </a:r>
             <a:endParaRPr lang="en-US" dirty="0"/>
           </a:p>
@@ -7121,10 +7131,75 @@
           <a:bodyPr/>
           <a:lstStyle/>
           <a:p>
+            <a:pPr marL="0" indent="0" algn="ctr">
+              <a:buNone/>
+            </a:pPr>
+            <a:r>
+              <a:rPr lang="en-US" dirty="0" err="1" smtClean="0"/>
+              <a:t>WebDriver</a:t>
+            </a:r>
+            <a:r>
+              <a:rPr lang="en-US" dirty="0" smtClean="0"/>
+              <a:t> will retriev</a:t>
+            </a:r>
+            <a:r>
+              <a:rPr lang="en-US" dirty="0" smtClean="0"/>
+              <a:t>e any DOM element you want</a:t>
+            </a:r>
+          </a:p>
+          <a:p>
+            <a:pPr marL="0" indent="0" algn="ctr">
+              <a:buNone/>
+            </a:pPr>
+            <a:endParaRPr lang="en-US" sz="1200" dirty="0"/>
+          </a:p>
+          <a:p>
+            <a:pPr marL="0" indent="0" algn="ctr">
+              <a:buNone/>
+            </a:pPr>
+            <a:r>
+              <a:rPr lang="en-US" dirty="0" smtClean="0"/>
+              <a:t>The elements are marshaled from the browser </a:t>
+            </a:r>
+          </a:p>
+          <a:p>
+            <a:pPr marL="0" indent="0">
+              <a:buNone/>
+            </a:pPr>
             <a:endParaRPr lang="en-US" dirty="0"/>
           </a:p>
         </p:txBody>
       </p:sp>
+      <p:pic>
+        <p:nvPicPr>
+          <p:cNvPr id="7" name="Picture 6" descr="Railyard.jpg"/>
+          <p:cNvPicPr>
+            <a:picLocks noChangeAspect="1"/>
+          </p:cNvPicPr>
+          <p:nvPr/>
+        </p:nvPicPr>
+        <p:blipFill>
+          <a:blip r:embed="rId2">
+            <a:extLst>
+              <a:ext uri="{28A0092B-C50C-407E-A947-70E740481C1C}">
+                <a14:useLocalDpi xmlns:a14="http://schemas.microsoft.com/office/drawing/2010/main" val="0"/>
+              </a:ext>
+            </a:extLst>
+          </a:blip>
+          <a:stretch>
+            <a:fillRect/>
+          </a:stretch>
+        </p:blipFill>
+        <p:spPr>
+          <a:xfrm>
+            <a:off x="2209800" y="3048000"/>
+            <a:ext cx="4724400" cy="3209636"/>
+          </a:xfrm>
+          <a:prstGeom prst="rect">
+            <a:avLst/>
+          </a:prstGeom>
+        </p:spPr>
+      </p:pic>
     </p:spTree>
     <p:extLst>
       <p:ext uri="{BB962C8B-B14F-4D97-AF65-F5344CB8AC3E}">
@@ -7135,6 +7210,182 @@
   <p:clrMapOvr>
     <a:masterClrMapping/>
   </p:clrMapOvr>
+  <p:timing>
+    <p:tnLst>
+      <p:par>
+        <p:cTn xmlns:p14="http://schemas.microsoft.com/office/powerpoint/2010/main" id="1" dur="indefinite" restart="never" nodeType="tmRoot">
+          <p:childTnLst>
+            <p:seq concurrent="1" nextAc="seek">
+              <p:cTn id="2" dur="indefinite" nodeType="mainSeq">
+                <p:childTnLst>
+                  <p:par>
+                    <p:cTn id="3" fill="hold">
+                      <p:stCondLst>
+                        <p:cond delay="indefinite"/>
+                      </p:stCondLst>
+                      <p:childTnLst>
+                        <p:par>
+                          <p:cTn id="4" fill="hold">
+                            <p:stCondLst>
+                              <p:cond delay="0"/>
+                            </p:stCondLst>
+                            <p:childTnLst>
+                              <p:par>
+                                <p:cTn id="5" presetID="1" presetClass="entr" presetSubtype="0" fill="hold" grpId="0" nodeType="clickEffect">
+                                  <p:stCondLst>
+                                    <p:cond delay="0"/>
+                                  </p:stCondLst>
+                                  <p:childTnLst>
+                                    <p:set>
+                                      <p:cBhvr>
+                                        <p:cTn id="6" dur="1" fill="hold">
+                                          <p:stCondLst>
+                                            <p:cond delay="0"/>
+                                          </p:stCondLst>
+                                        </p:cTn>
+                                        <p:tgtEl>
+                                          <p:spTgt spid="6">
+                                            <p:txEl>
+                                              <p:pRg st="0" end="0"/>
+                                            </p:txEl>
+                                          </p:spTgt>
+                                        </p:tgtEl>
+                                        <p:attrNameLst>
+                                          <p:attrName>style.visibility</p:attrName>
+                                        </p:attrNameLst>
+                                      </p:cBhvr>
+                                      <p:to>
+                                        <p:strVal val="visible"/>
+                                      </p:to>
+                                    </p:set>
+                                  </p:childTnLst>
+                                </p:cTn>
+                              </p:par>
+                            </p:childTnLst>
+                          </p:cTn>
+                        </p:par>
+                      </p:childTnLst>
+                    </p:cTn>
+                  </p:par>
+                  <p:par>
+                    <p:cTn id="7" fill="hold">
+                      <p:stCondLst>
+                        <p:cond delay="indefinite"/>
+                      </p:stCondLst>
+                      <p:childTnLst>
+                        <p:par>
+                          <p:cTn id="8" fill="hold">
+                            <p:stCondLst>
+                              <p:cond delay="0"/>
+                            </p:stCondLst>
+                            <p:childTnLst>
+                              <p:par>
+                                <p:cTn id="9" presetID="1" presetClass="entr" presetSubtype="0" fill="hold" grpId="0" nodeType="clickEffect">
+                                  <p:stCondLst>
+                                    <p:cond delay="0"/>
+                                  </p:stCondLst>
+                                  <p:childTnLst>
+                                    <p:set>
+                                      <p:cBhvr>
+                                        <p:cTn id="10" dur="1" fill="hold">
+                                          <p:stCondLst>
+                                            <p:cond delay="0"/>
+                                          </p:stCondLst>
+                                        </p:cTn>
+                                        <p:tgtEl>
+                                          <p:spTgt spid="6">
+                                            <p:txEl>
+                                              <p:pRg st="2" end="2"/>
+                                            </p:txEl>
+                                          </p:spTgt>
+                                        </p:tgtEl>
+                                        <p:attrNameLst>
+                                          <p:attrName>style.visibility</p:attrName>
+                                        </p:attrNameLst>
+                                      </p:cBhvr>
+                                      <p:to>
+                                        <p:strVal val="visible"/>
+                                      </p:to>
+                                    </p:set>
+                                  </p:childTnLst>
+                                </p:cTn>
+                              </p:par>
+                            </p:childTnLst>
+                          </p:cTn>
+                        </p:par>
+                      </p:childTnLst>
+                    </p:cTn>
+                  </p:par>
+                  <p:par>
+                    <p:cTn id="11" fill="hold">
+                      <p:stCondLst>
+                        <p:cond delay="indefinite"/>
+                      </p:stCondLst>
+                      <p:childTnLst>
+                        <p:par>
+                          <p:cTn id="12" fill="hold">
+                            <p:stCondLst>
+                              <p:cond delay="0"/>
+                            </p:stCondLst>
+                            <p:childTnLst>
+                              <p:par>
+                                <p:cTn id="13" presetID="1" presetClass="entr" presetSubtype="0" fill="hold" nodeType="clickEffect">
+                                  <p:stCondLst>
+                                    <p:cond delay="0"/>
+                                  </p:stCondLst>
+                                  <p:childTnLst>
+                                    <p:set>
+                                      <p:cBhvr>
+                                        <p:cTn id="14" dur="1" fill="hold">
+                                          <p:stCondLst>
+                                            <p:cond delay="0"/>
+                                          </p:stCondLst>
+                                        </p:cTn>
+                                        <p:tgtEl>
+                                          <p:spTgt spid="7"/>
+                                        </p:tgtEl>
+                                        <p:attrNameLst>
+                                          <p:attrName>style.visibility</p:attrName>
+                                        </p:attrNameLst>
+                                      </p:cBhvr>
+                                      <p:to>
+                                        <p:strVal val="visible"/>
+                                      </p:to>
+                                    </p:set>
+                                  </p:childTnLst>
+                                </p:cTn>
+                              </p:par>
+                            </p:childTnLst>
+                          </p:cTn>
+                        </p:par>
+                      </p:childTnLst>
+                    </p:cTn>
+                  </p:par>
+                </p:childTnLst>
+              </p:cTn>
+              <p:prevCondLst>
+                <p:cond evt="onPrev" delay="0">
+                  <p:tgtEl>
+                    <p:sldTgt/>
+                  </p:tgtEl>
+                </p:cond>
+              </p:prevCondLst>
+              <p:nextCondLst>
+                <p:cond evt="onNext" delay="0">
+                  <p:tgtEl>
+                    <p:sldTgt/>
+                  </p:tgtEl>
+                </p:cond>
+              </p:nextCondLst>
+            </p:seq>
+          </p:childTnLst>
+        </p:cTn>
+      </p:par>
+    </p:tnLst>
+    <p:bldLst>
+      <p:bldP spid="6" grpId="0" build="p"/>
+    </p:bldLst>
+  </p:timing>
 </p:sld>
 </file>
 
@@ -7172,7 +7423,7 @@
           <a:p>
             <a:r>
               <a:rPr lang="en-US" dirty="0" smtClean="0"/>
-              <a:t>Element Location</a:t>
+              <a:t>Basic Flow</a:t>
             </a:r>
             <a:endParaRPr lang="en-US" dirty="0"/>
           </a:p>
@@ -7243,6 +7494,217 @@
               <a:rPr lang="en-US" smtClean="0"/>
               <a:pPr/>
               <a:t>11</a:t>
+            </a:fld>
+            <a:endParaRPr lang="en-US"/>
+          </a:p>
+        </p:txBody>
+      </p:sp>
+      <p:pic>
+        <p:nvPicPr>
+          <p:cNvPr id="8" name="Picture 7" descr="WebDriver - Simple Flow.png"/>
+          <p:cNvPicPr>
+            <a:picLocks noChangeAspect="1"/>
+          </p:cNvPicPr>
+          <p:nvPr/>
+        </p:nvPicPr>
+        <p:blipFill>
+          <a:blip r:embed="rId2" cstate="print">
+            <a:extLst>
+              <a:ext uri="{28A0092B-C50C-407E-A947-70E740481C1C}">
+                <a14:useLocalDpi xmlns:a14="http://schemas.microsoft.com/office/drawing/2010/main" val="0"/>
+              </a:ext>
+            </a:extLst>
+          </a:blip>
+          <a:stretch>
+            <a:fillRect/>
+          </a:stretch>
+        </p:blipFill>
+        <p:spPr>
+          <a:xfrm>
+            <a:off x="152400" y="914400"/>
+            <a:ext cx="9144000" cy="5218435"/>
+          </a:xfrm>
+          <a:prstGeom prst="rect">
+            <a:avLst/>
+          </a:prstGeom>
+        </p:spPr>
+      </p:pic>
+      <p:sp>
+        <p:nvSpPr>
+          <p:cNvPr id="9" name="TextBox 8"/>
+          <p:cNvSpPr txBox="1"/>
+          <p:nvPr/>
+        </p:nvSpPr>
+        <p:spPr>
+          <a:xfrm>
+            <a:off x="4672877" y="5334000"/>
+            <a:ext cx="3815806" cy="738664"/>
+          </a:xfrm>
+          <a:prstGeom prst="rect">
+            <a:avLst/>
+          </a:prstGeom>
+          <a:noFill/>
+        </p:spPr>
+        <p:txBody>
+          <a:bodyPr wrap="none" rtlCol="0">
+            <a:spAutoFit/>
+          </a:bodyPr>
+          <a:lstStyle/>
+          <a:p>
+            <a:pPr algn="ctr"/>
+            <a:r>
+              <a:rPr lang="en-US" sz="1400" dirty="0" smtClean="0">
+                <a:solidFill>
+                  <a:srgbClr val="000000"/>
+                </a:solidFill>
+              </a:rPr>
+              <a:t>Firefox runs both of these in the same process</a:t>
+            </a:r>
+          </a:p>
+          <a:p>
+            <a:pPr algn="ctr"/>
+            <a:endParaRPr lang="en-US" sz="1400" dirty="0" smtClean="0">
+              <a:solidFill>
+                <a:srgbClr val="000000"/>
+              </a:solidFill>
+            </a:endParaRPr>
+          </a:p>
+          <a:p>
+            <a:pPr algn="ctr"/>
+            <a:r>
+              <a:rPr lang="en-US" sz="1400" dirty="0" smtClean="0">
+                <a:solidFill>
+                  <a:srgbClr val="000000"/>
+                </a:solidFill>
+              </a:rPr>
+              <a:t>Chrome and IE run in separate processes</a:t>
+            </a:r>
+            <a:endParaRPr lang="en-US" sz="1400" dirty="0">
+              <a:solidFill>
+                <a:srgbClr val="000000"/>
+              </a:solidFill>
+            </a:endParaRPr>
+          </a:p>
+        </p:txBody>
+      </p:sp>
+    </p:spTree>
+    <p:extLst>
+      <p:ext uri="{BB962C8B-B14F-4D97-AF65-F5344CB8AC3E}">
+        <p14:creationId xmlns:p14="http://schemas.microsoft.com/office/powerpoint/2010/main" val="3627990777"/>
+      </p:ext>
+    </p:extLst>
+  </p:cSld>
+  <p:clrMapOvr>
+    <a:masterClrMapping/>
+  </p:clrMapOvr>
+</p:sld>
+</file>
+
+<file path=ppt/slides/slide12.xml><?xml version="1.0" encoding="utf-8"?>
+<p:sld xmlns:a="http://schemas.openxmlformats.org/drawingml/2006/main" xmlns:r="http://schemas.openxmlformats.org/officeDocument/2006/relationships" xmlns:p="http://schemas.openxmlformats.org/presentationml/2006/main">
+  <p:cSld>
+    <p:spTree>
+      <p:nvGrpSpPr>
+        <p:cNvPr id="1" name=""/>
+        <p:cNvGrpSpPr/>
+        <p:nvPr/>
+      </p:nvGrpSpPr>
+      <p:grpSpPr>
+        <a:xfrm>
+          <a:off x="0" y="0"/>
+          <a:ext cx="0" cy="0"/>
+          <a:chOff x="0" y="0"/>
+          <a:chExt cx="0" cy="0"/>
+        </a:xfrm>
+      </p:grpSpPr>
+      <p:sp>
+        <p:nvSpPr>
+          <p:cNvPr id="2" name="Title 1"/>
+          <p:cNvSpPr>
+            <a:spLocks noGrp="1"/>
+          </p:cNvSpPr>
+          <p:nvPr>
+            <p:ph type="title"/>
+          </p:nvPr>
+        </p:nvSpPr>
+        <p:spPr/>
+        <p:txBody>
+          <a:bodyPr/>
+          <a:lstStyle/>
+          <a:p>
+            <a:r>
+              <a:rPr lang="en-US" dirty="0" smtClean="0"/>
+              <a:t>Element Location</a:t>
+            </a:r>
+            <a:endParaRPr lang="en-US" dirty="0"/>
+          </a:p>
+        </p:txBody>
+      </p:sp>
+      <p:sp>
+        <p:nvSpPr>
+          <p:cNvPr id="3" name="Date Placeholder 2"/>
+          <p:cNvSpPr>
+            <a:spLocks noGrp="1"/>
+          </p:cNvSpPr>
+          <p:nvPr>
+            <p:ph type="dt" sz="half" idx="10"/>
+          </p:nvPr>
+        </p:nvSpPr>
+        <p:spPr/>
+        <p:txBody>
+          <a:bodyPr/>
+          <a:lstStyle/>
+          <a:p>
+            <a:r>
+              <a:rPr lang="en-US" smtClean="0"/>
+              <a:t>Feb. 7. 2014</a:t>
+            </a:r>
+            <a:endParaRPr lang="en-US"/>
+          </a:p>
+        </p:txBody>
+      </p:sp>
+      <p:sp>
+        <p:nvSpPr>
+          <p:cNvPr id="4" name="Footer Placeholder 3"/>
+          <p:cNvSpPr>
+            <a:spLocks noGrp="1"/>
+          </p:cNvSpPr>
+          <p:nvPr>
+            <p:ph type="ftr" sz="quarter" idx="11"/>
+          </p:nvPr>
+        </p:nvSpPr>
+        <p:spPr/>
+        <p:txBody>
+          <a:bodyPr/>
+          <a:lstStyle/>
+          <a:p>
+            <a:r>
+              <a:rPr lang="en-US" smtClean="0"/>
+              <a:t>Matt Smith - WebDriver &amp; Selenium</a:t>
+            </a:r>
+            <a:endParaRPr lang="en-US"/>
+          </a:p>
+        </p:txBody>
+      </p:sp>
+      <p:sp>
+        <p:nvSpPr>
+          <p:cNvPr id="5" name="Slide Number Placeholder 4"/>
+          <p:cNvSpPr>
+            <a:spLocks noGrp="1"/>
+          </p:cNvSpPr>
+          <p:nvPr>
+            <p:ph type="sldNum" sz="quarter" idx="12"/>
+          </p:nvPr>
+        </p:nvSpPr>
+        <p:spPr/>
+        <p:txBody>
+          <a:bodyPr/>
+          <a:lstStyle/>
+          <a:p>
+            <a:fld id="{BE924555-EAFD-4B2F-96F4-A60706EF2138}" type="slidenum">
+              <a:rPr lang="en-US" smtClean="0"/>
+              <a:pPr/>
+              <a:t>12</a:t>
             </a:fld>
             <a:endParaRPr lang="en-US"/>
           </a:p>
@@ -7346,10 +7808,596 @@
   <p:clrMapOvr>
     <a:masterClrMapping/>
   </p:clrMapOvr>
+  <p:timing>
+    <p:tnLst>
+      <p:par>
+        <p:cTn xmlns:p14="http://schemas.microsoft.com/office/powerpoint/2010/main" id="1" dur="indefinite" restart="never" nodeType="tmRoot"/>
+      </p:par>
+    </p:tnLst>
+  </p:timing>
 </p:sld>
 </file>
 
-<file path=ppt/slides/slide12.xml><?xml version="1.0" encoding="utf-8"?>
+<file path=ppt/slides/slide13.xml><?xml version="1.0" encoding="utf-8"?>
+<p:sld xmlns:a="http://schemas.openxmlformats.org/drawingml/2006/main" xmlns:r="http://schemas.openxmlformats.org/officeDocument/2006/relationships" xmlns:p="http://schemas.openxmlformats.org/presentationml/2006/main">
+  <p:cSld>
+    <p:spTree>
+      <p:nvGrpSpPr>
+        <p:cNvPr id="1" name=""/>
+        <p:cNvGrpSpPr/>
+        <p:nvPr/>
+      </p:nvGrpSpPr>
+      <p:grpSpPr>
+        <a:xfrm>
+          <a:off x="0" y="0"/>
+          <a:ext cx="0" cy="0"/>
+          <a:chOff x="0" y="0"/>
+          <a:chExt cx="0" cy="0"/>
+        </a:xfrm>
+      </p:grpSpPr>
+      <p:sp>
+        <p:nvSpPr>
+          <p:cNvPr id="2" name="Title 1"/>
+          <p:cNvSpPr>
+            <a:spLocks noGrp="1"/>
+          </p:cNvSpPr>
+          <p:nvPr>
+            <p:ph type="title"/>
+          </p:nvPr>
+        </p:nvSpPr>
+        <p:spPr/>
+        <p:txBody>
+          <a:bodyPr/>
+          <a:lstStyle/>
+          <a:p>
+            <a:r>
+              <a:rPr lang="en-US" dirty="0" smtClean="0"/>
+              <a:t>What’s wrong here</a:t>
+            </a:r>
+            <a:endParaRPr lang="en-US" dirty="0"/>
+          </a:p>
+        </p:txBody>
+      </p:sp>
+      <p:sp>
+        <p:nvSpPr>
+          <p:cNvPr id="3" name="Date Placeholder 2"/>
+          <p:cNvSpPr>
+            <a:spLocks noGrp="1"/>
+          </p:cNvSpPr>
+          <p:nvPr>
+            <p:ph type="dt" sz="half" idx="10"/>
+          </p:nvPr>
+        </p:nvSpPr>
+        <p:spPr/>
+        <p:txBody>
+          <a:bodyPr/>
+          <a:lstStyle/>
+          <a:p>
+            <a:r>
+              <a:rPr lang="en-US" smtClean="0"/>
+              <a:t>Feb. 7. 2014</a:t>
+            </a:r>
+            <a:endParaRPr lang="en-US"/>
+          </a:p>
+        </p:txBody>
+      </p:sp>
+      <p:sp>
+        <p:nvSpPr>
+          <p:cNvPr id="4" name="Footer Placeholder 3"/>
+          <p:cNvSpPr>
+            <a:spLocks noGrp="1"/>
+          </p:cNvSpPr>
+          <p:nvPr>
+            <p:ph type="ftr" sz="quarter" idx="11"/>
+          </p:nvPr>
+        </p:nvSpPr>
+        <p:spPr/>
+        <p:txBody>
+          <a:bodyPr/>
+          <a:lstStyle/>
+          <a:p>
+            <a:r>
+              <a:rPr lang="en-US" smtClean="0"/>
+              <a:t>Matt Smith - WebDriver &amp; Selenium</a:t>
+            </a:r>
+            <a:endParaRPr lang="en-US"/>
+          </a:p>
+        </p:txBody>
+      </p:sp>
+      <p:sp>
+        <p:nvSpPr>
+          <p:cNvPr id="5" name="Slide Number Placeholder 4"/>
+          <p:cNvSpPr>
+            <a:spLocks noGrp="1"/>
+          </p:cNvSpPr>
+          <p:nvPr>
+            <p:ph type="sldNum" sz="quarter" idx="12"/>
+          </p:nvPr>
+        </p:nvSpPr>
+        <p:spPr/>
+        <p:txBody>
+          <a:bodyPr/>
+          <a:lstStyle/>
+          <a:p>
+            <a:fld id="{BE924555-EAFD-4B2F-96F4-A60706EF2138}" type="slidenum">
+              <a:rPr lang="en-US" smtClean="0"/>
+              <a:pPr/>
+              <a:t>13</a:t>
+            </a:fld>
+            <a:endParaRPr lang="en-US"/>
+          </a:p>
+        </p:txBody>
+      </p:sp>
+      <p:sp>
+        <p:nvSpPr>
+          <p:cNvPr id="8" name="Rectangle 7"/>
+          <p:cNvSpPr/>
+          <p:nvPr/>
+        </p:nvSpPr>
+        <p:spPr>
+          <a:xfrm>
+            <a:off x="381000" y="1600200"/>
+            <a:ext cx="6324600" cy="685800"/>
+          </a:xfrm>
+          <a:prstGeom prst="rect">
+            <a:avLst/>
+          </a:prstGeom>
+          <a:solidFill>
+            <a:schemeClr val="accent6">
+              <a:lumMod val="60000"/>
+              <a:lumOff val="40000"/>
+            </a:schemeClr>
+          </a:solidFill>
+          <a:ln>
+            <a:noFill/>
+          </a:ln>
+          <a:effectLst/>
+        </p:spPr>
+        <p:style>
+          <a:lnRef idx="1">
+            <a:schemeClr val="accent1"/>
+          </a:lnRef>
+          <a:fillRef idx="3">
+            <a:schemeClr val="accent1"/>
+          </a:fillRef>
+          <a:effectRef idx="2">
+            <a:schemeClr val="accent1"/>
+          </a:effectRef>
+          <a:fontRef idx="minor">
+            <a:schemeClr val="lt1"/>
+          </a:fontRef>
+        </p:style>
+        <p:txBody>
+          <a:bodyPr rtlCol="0" anchor="ctr"/>
+          <a:lstStyle/>
+          <a:p>
+            <a:pPr algn="ctr"/>
+            <a:endParaRPr lang="en-US"/>
+          </a:p>
+        </p:txBody>
+      </p:sp>
+      <p:sp>
+        <p:nvSpPr>
+          <p:cNvPr id="6" name="Content Placeholder 5"/>
+          <p:cNvSpPr>
+            <a:spLocks noGrp="1"/>
+          </p:cNvSpPr>
+          <p:nvPr>
+            <p:ph sz="quarter" idx="1"/>
+          </p:nvPr>
+        </p:nvSpPr>
+        <p:spPr/>
+        <p:txBody>
+          <a:bodyPr>
+            <a:normAutofit/>
+          </a:bodyPr>
+          <a:lstStyle/>
+          <a:p>
+            <a:pPr marL="0" indent="0">
+              <a:buNone/>
+            </a:pPr>
+            <a:r>
+              <a:rPr lang="en-US" sz="2000" dirty="0"/>
+              <a:t> </a:t>
+            </a:r>
+            <a:r>
+              <a:rPr lang="en-US" sz="2000" dirty="0" err="1"/>
+              <a:t>Driver.FindElements</a:t>
+            </a:r>
+            <a:r>
+              <a:rPr lang="en-US" sz="2000" dirty="0"/>
+              <a:t>(</a:t>
+            </a:r>
+            <a:r>
+              <a:rPr lang="en-US" sz="2000" dirty="0" err="1"/>
+              <a:t>By.CssSelector</a:t>
+            </a:r>
+            <a:r>
+              <a:rPr lang="en-US" sz="2000" dirty="0"/>
+              <a:t>(".class-name"))</a:t>
+            </a:r>
+          </a:p>
+          <a:p>
+            <a:pPr marL="0" indent="0">
+              <a:buNone/>
+            </a:pPr>
+            <a:r>
+              <a:rPr lang="en-US" sz="2000" dirty="0"/>
+              <a:t>      .Select(x =&gt; </a:t>
+            </a:r>
+            <a:r>
+              <a:rPr lang="en-US" sz="2000" dirty="0" err="1"/>
+              <a:t>x.FindElement</a:t>
+            </a:r>
+            <a:r>
+              <a:rPr lang="en-US" sz="2000" dirty="0"/>
+              <a:t>(</a:t>
+            </a:r>
+            <a:r>
+              <a:rPr lang="en-US" sz="2000" dirty="0" err="1"/>
+              <a:t>By.TagName</a:t>
+            </a:r>
+            <a:r>
+              <a:rPr lang="en-US" sz="2000" dirty="0"/>
+              <a:t>("input")))</a:t>
+            </a:r>
+          </a:p>
+          <a:p>
+            <a:pPr marL="0" indent="0">
+              <a:buNone/>
+            </a:pPr>
+            <a:r>
+              <a:rPr lang="en-US" sz="2000" dirty="0"/>
+              <a:t>      .</a:t>
+            </a:r>
+            <a:r>
+              <a:rPr lang="en-US" sz="2000" dirty="0" err="1"/>
+              <a:t>ToArray</a:t>
+            </a:r>
+            <a:r>
+              <a:rPr lang="en-US" sz="2000" dirty="0"/>
+              <a:t>()</a:t>
+            </a:r>
+          </a:p>
+          <a:p>
+            <a:pPr marL="0" indent="0">
+              <a:buNone/>
+            </a:pPr>
+            <a:r>
+              <a:rPr lang="en-US" sz="2000" dirty="0"/>
+              <a:t>      .Select(x =&gt; </a:t>
+            </a:r>
+            <a:r>
+              <a:rPr lang="en-US" sz="2000" dirty="0" err="1"/>
+              <a:t>x.GetAttribute</a:t>
+            </a:r>
+            <a:r>
+              <a:rPr lang="en-US" sz="2000" dirty="0"/>
+              <a:t>("name"))</a:t>
+            </a:r>
+          </a:p>
+          <a:p>
+            <a:pPr marL="0" indent="0">
+              <a:buNone/>
+            </a:pPr>
+            <a:r>
+              <a:rPr lang="en-US" sz="2000" dirty="0"/>
+              <a:t>      .</a:t>
+            </a:r>
+            <a:r>
+              <a:rPr lang="en-US" sz="2000" dirty="0" err="1"/>
+              <a:t>ToList</a:t>
+            </a:r>
+            <a:r>
+              <a:rPr lang="en-US" sz="2000" dirty="0"/>
+              <a:t>()</a:t>
+            </a:r>
+          </a:p>
+        </p:txBody>
+      </p:sp>
+      <p:sp>
+        <p:nvSpPr>
+          <p:cNvPr id="9" name="TextBox 8"/>
+          <p:cNvSpPr txBox="1"/>
+          <p:nvPr/>
+        </p:nvSpPr>
+        <p:spPr>
+          <a:xfrm>
+            <a:off x="381000" y="3733800"/>
+            <a:ext cx="6232295" cy="923330"/>
+          </a:xfrm>
+          <a:prstGeom prst="rect">
+            <a:avLst/>
+          </a:prstGeom>
+          <a:noFill/>
+        </p:spPr>
+        <p:txBody>
+          <a:bodyPr wrap="none" rtlCol="0">
+            <a:spAutoFit/>
+          </a:bodyPr>
+          <a:lstStyle/>
+          <a:p>
+            <a:r>
+              <a:rPr lang="en-US" dirty="0" err="1" smtClean="0"/>
+              <a:t>Driver.FindElements</a:t>
+            </a:r>
+            <a:r>
+              <a:rPr lang="en-US" dirty="0"/>
+              <a:t>(</a:t>
+            </a:r>
+            <a:r>
+              <a:rPr lang="en-US" dirty="0" err="1"/>
+              <a:t>By.CssSelector</a:t>
+            </a:r>
+            <a:r>
+              <a:rPr lang="en-US" dirty="0"/>
+              <a:t>(".class-</a:t>
+            </a:r>
+            <a:r>
+              <a:rPr lang="en-US" dirty="0" smtClean="0"/>
+              <a:t>name input"</a:t>
+            </a:r>
+            <a:r>
+              <a:rPr lang="en-US" dirty="0"/>
+              <a:t>)</a:t>
+            </a:r>
+            <a:r>
+              <a:rPr lang="en-US" dirty="0" smtClean="0"/>
+              <a:t>)</a:t>
+            </a:r>
+          </a:p>
+          <a:p>
+            <a:r>
+              <a:rPr lang="en-US" dirty="0" smtClean="0"/>
+              <a:t>     </a:t>
+            </a:r>
+            <a:r>
+              <a:rPr lang="en-US" dirty="0"/>
+              <a:t>.Select(x =&gt; </a:t>
+            </a:r>
+            <a:r>
+              <a:rPr lang="en-US" dirty="0" err="1"/>
+              <a:t>x.GetAttribute</a:t>
+            </a:r>
+            <a:r>
+              <a:rPr lang="en-US" dirty="0"/>
+              <a:t>("name"))</a:t>
+            </a:r>
+          </a:p>
+          <a:p>
+            <a:r>
+              <a:rPr lang="en-US" dirty="0" smtClean="0"/>
+              <a:t>     </a:t>
+            </a:r>
+            <a:r>
+              <a:rPr lang="en-US" dirty="0"/>
+              <a:t>.</a:t>
+            </a:r>
+            <a:r>
+              <a:rPr lang="en-US" dirty="0" err="1"/>
+              <a:t>ToList</a:t>
+            </a:r>
+            <a:r>
+              <a:rPr lang="en-US" dirty="0"/>
+              <a:t>()</a:t>
+            </a:r>
+          </a:p>
+        </p:txBody>
+      </p:sp>
+      <p:sp>
+        <p:nvSpPr>
+          <p:cNvPr id="10" name="TextBox 9"/>
+          <p:cNvSpPr txBox="1"/>
+          <p:nvPr/>
+        </p:nvSpPr>
+        <p:spPr>
+          <a:xfrm>
+            <a:off x="381001" y="5105400"/>
+            <a:ext cx="8305800" cy="646331"/>
+          </a:xfrm>
+          <a:prstGeom prst="rect">
+            <a:avLst/>
+          </a:prstGeom>
+          <a:noFill/>
+        </p:spPr>
+        <p:txBody>
+          <a:bodyPr wrap="square" rtlCol="0">
+            <a:spAutoFit/>
+          </a:bodyPr>
+          <a:lstStyle/>
+          <a:p>
+            <a:r>
+              <a:rPr lang="en-US" dirty="0" smtClean="0"/>
+              <a:t>Filter the elements you want before you marshal them, as much as you reasonably can</a:t>
+            </a:r>
+            <a:endParaRPr lang="en-US" dirty="0"/>
+          </a:p>
+        </p:txBody>
+      </p:sp>
+    </p:spTree>
+    <p:extLst>
+      <p:ext uri="{BB962C8B-B14F-4D97-AF65-F5344CB8AC3E}">
+        <p14:creationId xmlns:p14="http://schemas.microsoft.com/office/powerpoint/2010/main" val="2037530634"/>
+      </p:ext>
+    </p:extLst>
+  </p:cSld>
+  <p:clrMapOvr>
+    <a:masterClrMapping/>
+  </p:clrMapOvr>
+  <p:timing>
+    <p:tnLst>
+      <p:par>
+        <p:cTn xmlns:p14="http://schemas.microsoft.com/office/powerpoint/2010/main" id="1" dur="indefinite" restart="never" nodeType="tmRoot">
+          <p:childTnLst>
+            <p:seq concurrent="1" nextAc="seek">
+              <p:cTn id="2" dur="indefinite" nodeType="mainSeq">
+                <p:childTnLst>
+                  <p:par>
+                    <p:cTn id="3" fill="hold">
+                      <p:stCondLst>
+                        <p:cond delay="indefinite"/>
+                      </p:stCondLst>
+                      <p:childTnLst>
+                        <p:par>
+                          <p:cTn id="4" fill="hold">
+                            <p:stCondLst>
+                              <p:cond delay="0"/>
+                            </p:stCondLst>
+                            <p:childTnLst>
+                              <p:par>
+                                <p:cTn id="5" presetID="1" presetClass="entr" presetSubtype="0" fill="hold" grpId="0" nodeType="clickEffect">
+                                  <p:stCondLst>
+                                    <p:cond delay="0"/>
+                                  </p:stCondLst>
+                                  <p:childTnLst>
+                                    <p:set>
+                                      <p:cBhvr>
+                                        <p:cTn id="6" dur="1" fill="hold">
+                                          <p:stCondLst>
+                                            <p:cond delay="0"/>
+                                          </p:stCondLst>
+                                        </p:cTn>
+                                        <p:tgtEl>
+                                          <p:spTgt spid="8"/>
+                                        </p:tgtEl>
+                                        <p:attrNameLst>
+                                          <p:attrName>style.visibility</p:attrName>
+                                        </p:attrNameLst>
+                                      </p:cBhvr>
+                                      <p:to>
+                                        <p:strVal val="visible"/>
+                                      </p:to>
+                                    </p:set>
+                                  </p:childTnLst>
+                                </p:cTn>
+                              </p:par>
+                            </p:childTnLst>
+                          </p:cTn>
+                        </p:par>
+                      </p:childTnLst>
+                    </p:cTn>
+                  </p:par>
+                  <p:par>
+                    <p:cTn id="7" fill="hold">
+                      <p:stCondLst>
+                        <p:cond delay="indefinite"/>
+                      </p:stCondLst>
+                      <p:childTnLst>
+                        <p:par>
+                          <p:cTn id="8" fill="hold">
+                            <p:stCondLst>
+                              <p:cond delay="0"/>
+                            </p:stCondLst>
+                            <p:childTnLst>
+                              <p:par>
+                                <p:cTn id="9" presetID="1" presetClass="entr" presetSubtype="0" fill="hold" grpId="0" nodeType="clickEffect">
+                                  <p:stCondLst>
+                                    <p:cond delay="0"/>
+                                  </p:stCondLst>
+                                  <p:childTnLst>
+                                    <p:set>
+                                      <p:cBhvr>
+                                        <p:cTn id="10" dur="1" fill="hold">
+                                          <p:stCondLst>
+                                            <p:cond delay="0"/>
+                                          </p:stCondLst>
+                                        </p:cTn>
+                                        <p:tgtEl>
+                                          <p:spTgt spid="9"/>
+                                        </p:tgtEl>
+                                        <p:attrNameLst>
+                                          <p:attrName>style.visibility</p:attrName>
+                                        </p:attrNameLst>
+                                      </p:cBhvr>
+                                      <p:to>
+                                        <p:strVal val="visible"/>
+                                      </p:to>
+                                    </p:set>
+                                  </p:childTnLst>
+                                </p:cTn>
+                              </p:par>
+                            </p:childTnLst>
+                          </p:cTn>
+                        </p:par>
+                      </p:childTnLst>
+                    </p:cTn>
+                  </p:par>
+                  <p:par>
+                    <p:cTn id="11" fill="hold">
+                      <p:stCondLst>
+                        <p:cond delay="indefinite"/>
+                      </p:stCondLst>
+                      <p:childTnLst>
+                        <p:par>
+                          <p:cTn id="12" fill="hold">
+                            <p:stCondLst>
+                              <p:cond delay="0"/>
+                            </p:stCondLst>
+                            <p:childTnLst>
+                              <p:par>
+                                <p:cTn id="13" presetID="1" presetClass="entr" presetSubtype="0" fill="hold" grpId="0" nodeType="clickEffect">
+                                  <p:stCondLst>
+                                    <p:cond delay="0"/>
+                                  </p:stCondLst>
+                                  <p:childTnLst>
+                                    <p:set>
+                                      <p:cBhvr>
+                                        <p:cTn id="14" dur="1" fill="hold">
+                                          <p:stCondLst>
+                                            <p:cond delay="0"/>
+                                          </p:stCondLst>
+                                        </p:cTn>
+                                        <p:tgtEl>
+                                          <p:spTgt spid="10"/>
+                                        </p:tgtEl>
+                                        <p:attrNameLst>
+                                          <p:attrName>style.visibility</p:attrName>
+                                        </p:attrNameLst>
+                                      </p:cBhvr>
+                                      <p:to>
+                                        <p:strVal val="visible"/>
+                                      </p:to>
+                                    </p:set>
+                                  </p:childTnLst>
+                                </p:cTn>
+                              </p:par>
+                            </p:childTnLst>
+                          </p:cTn>
+                        </p:par>
+                      </p:childTnLst>
+                    </p:cTn>
+                  </p:par>
+                </p:childTnLst>
+              </p:cTn>
+              <p:prevCondLst>
+                <p:cond evt="onPrev" delay="0">
+                  <p:tgtEl>
+                    <p:sldTgt/>
+                  </p:tgtEl>
+                </p:cond>
+              </p:prevCondLst>
+              <p:nextCondLst>
+                <p:cond evt="onNext" delay="0">
+                  <p:tgtEl>
+                    <p:sldTgt/>
+                  </p:tgtEl>
+                </p:cond>
+              </p:nextCondLst>
+            </p:seq>
+          </p:childTnLst>
+        </p:cTn>
+      </p:par>
+    </p:tnLst>
+    <p:bldLst>
+      <p:bldP spid="8" grpId="0" animBg="1"/>
+      <p:bldP spid="9" grpId="0"/>
+      <p:bldP spid="10" grpId="0"/>
+    </p:bldLst>
+  </p:timing>
+</p:sld>
+</file>
+
+<file path=ppt/slides/slide14.xml><?xml version="1.0" encoding="utf-8"?>
 <p:sld xmlns:a="http://schemas.openxmlformats.org/drawingml/2006/main" xmlns:r="http://schemas.openxmlformats.org/officeDocument/2006/relationships" xmlns:p="http://schemas.openxmlformats.org/presentationml/2006/main">
   <p:cSld>
     <p:bg>
@@ -7400,6 +8448,76 @@
           </a:p>
         </p:txBody>
       </p:sp>
+      <p:sp>
+        <p:nvSpPr>
+          <p:cNvPr id="4" name="Date Placeholder 3"/>
+          <p:cNvSpPr>
+            <a:spLocks noGrp="1"/>
+          </p:cNvSpPr>
+          <p:nvPr>
+            <p:ph type="dt" sz="half" idx="10"/>
+          </p:nvPr>
+        </p:nvSpPr>
+        <p:spPr/>
+        <p:txBody>
+          <a:bodyPr/>
+          <a:lstStyle/>
+          <a:p>
+            <a:r>
+              <a:rPr lang="en-US" smtClean="0"/>
+              <a:t>Feb. 7. 2014</a:t>
+            </a:r>
+            <a:endParaRPr lang="en-US"/>
+          </a:p>
+        </p:txBody>
+      </p:sp>
+      <p:sp>
+        <p:nvSpPr>
+          <p:cNvPr id="5" name="Footer Placeholder 4"/>
+          <p:cNvSpPr>
+            <a:spLocks noGrp="1"/>
+          </p:cNvSpPr>
+          <p:nvPr>
+            <p:ph type="ftr" sz="quarter" idx="11"/>
+          </p:nvPr>
+        </p:nvSpPr>
+        <p:spPr/>
+        <p:txBody>
+          <a:bodyPr/>
+          <a:lstStyle/>
+          <a:p>
+            <a:r>
+              <a:rPr lang="en-US" smtClean="0"/>
+              <a:t>Matt Smith - WebDriver &amp; Selenium</a:t>
+            </a:r>
+            <a:endParaRPr lang="en-US"/>
+          </a:p>
+        </p:txBody>
+      </p:sp>
+      <p:sp>
+        <p:nvSpPr>
+          <p:cNvPr id="6" name="Slide Number Placeholder 5"/>
+          <p:cNvSpPr>
+            <a:spLocks noGrp="1"/>
+          </p:cNvSpPr>
+          <p:nvPr>
+            <p:ph type="sldNum" sz="quarter" idx="12"/>
+          </p:nvPr>
+        </p:nvSpPr>
+        <p:spPr/>
+        <p:txBody>
+          <a:bodyPr/>
+          <a:lstStyle/>
+          <a:p>
+            <a:fld id="{BE924555-EAFD-4B2F-96F4-A60706EF2138}" type="slidenum">
+              <a:rPr lang="en-US" smtClean="0"/>
+              <a:pPr/>
+              <a:t>14</a:t>
+            </a:fld>
+            <a:endParaRPr lang="en-US"/>
+          </a:p>
+        </p:txBody>
+      </p:sp>
       <p:pic>
         <p:nvPicPr>
           <p:cNvPr id="3" name="Picture 2" descr="WebDriver - Bad.png"/>
@@ -7430,76 +8548,6 @@
           </a:prstGeom>
         </p:spPr>
       </p:pic>
-      <p:sp>
-        <p:nvSpPr>
-          <p:cNvPr id="4" name="Date Placeholder 3"/>
-          <p:cNvSpPr>
-            <a:spLocks noGrp="1"/>
-          </p:cNvSpPr>
-          <p:nvPr>
-            <p:ph type="dt" sz="half" idx="10"/>
-          </p:nvPr>
-        </p:nvSpPr>
-        <p:spPr/>
-        <p:txBody>
-          <a:bodyPr/>
-          <a:lstStyle/>
-          <a:p>
-            <a:r>
-              <a:rPr lang="en-US" smtClean="0"/>
-              <a:t>Feb. 7. 2014</a:t>
-            </a:r>
-            <a:endParaRPr lang="en-US"/>
-          </a:p>
-        </p:txBody>
-      </p:sp>
-      <p:sp>
-        <p:nvSpPr>
-          <p:cNvPr id="5" name="Footer Placeholder 4"/>
-          <p:cNvSpPr>
-            <a:spLocks noGrp="1"/>
-          </p:cNvSpPr>
-          <p:nvPr>
-            <p:ph type="ftr" sz="quarter" idx="11"/>
-          </p:nvPr>
-        </p:nvSpPr>
-        <p:spPr/>
-        <p:txBody>
-          <a:bodyPr/>
-          <a:lstStyle/>
-          <a:p>
-            <a:r>
-              <a:rPr lang="en-US" smtClean="0"/>
-              <a:t>Matt Smith - WebDriver &amp; Selenium</a:t>
-            </a:r>
-            <a:endParaRPr lang="en-US"/>
-          </a:p>
-        </p:txBody>
-      </p:sp>
-      <p:sp>
-        <p:nvSpPr>
-          <p:cNvPr id="6" name="Slide Number Placeholder 5"/>
-          <p:cNvSpPr>
-            <a:spLocks noGrp="1"/>
-          </p:cNvSpPr>
-          <p:nvPr>
-            <p:ph type="sldNum" sz="quarter" idx="12"/>
-          </p:nvPr>
-        </p:nvSpPr>
-        <p:spPr/>
-        <p:txBody>
-          <a:bodyPr/>
-          <a:lstStyle/>
-          <a:p>
-            <a:fld id="{BE924555-EAFD-4B2F-96F4-A60706EF2138}" type="slidenum">
-              <a:rPr lang="en-US" smtClean="0"/>
-              <a:pPr/>
-              <a:t>12</a:t>
-            </a:fld>
-            <a:endParaRPr lang="en-US"/>
-          </a:p>
-        </p:txBody>
-      </p:sp>
     </p:spTree>
     <p:extLst>
       <p:ext uri="{BB962C8B-B14F-4D97-AF65-F5344CB8AC3E}">
@@ -7520,6 +8568,480 @@
 </p:sld>
 </file>
 
+<file path=ppt/slides/slide15.xml><?xml version="1.0" encoding="utf-8"?>
+<p:sld xmlns:a="http://schemas.openxmlformats.org/drawingml/2006/main" xmlns:r="http://schemas.openxmlformats.org/officeDocument/2006/relationships" xmlns:p="http://schemas.openxmlformats.org/presentationml/2006/main">
+  <p:cSld>
+    <p:spTree>
+      <p:nvGrpSpPr>
+        <p:cNvPr id="1" name=""/>
+        <p:cNvGrpSpPr/>
+        <p:nvPr/>
+      </p:nvGrpSpPr>
+      <p:grpSpPr>
+        <a:xfrm>
+          <a:off x="0" y="0"/>
+          <a:ext cx="0" cy="0"/>
+          <a:chOff x="0" y="0"/>
+          <a:chExt cx="0" cy="0"/>
+        </a:xfrm>
+      </p:grpSpPr>
+      <p:sp>
+        <p:nvSpPr>
+          <p:cNvPr id="2" name="Title 1"/>
+          <p:cNvSpPr>
+            <a:spLocks noGrp="1"/>
+          </p:cNvSpPr>
+          <p:nvPr>
+            <p:ph type="title"/>
+          </p:nvPr>
+        </p:nvSpPr>
+        <p:spPr/>
+        <p:txBody>
+          <a:bodyPr/>
+          <a:lstStyle/>
+          <a:p>
+            <a:r>
+              <a:rPr lang="en-US" dirty="0" err="1" smtClean="0"/>
+              <a:t>WebDriver</a:t>
+            </a:r>
+            <a:r>
+              <a:rPr lang="en-US" dirty="0" smtClean="0"/>
+              <a:t> tries to help</a:t>
+            </a:r>
+            <a:endParaRPr lang="en-US" dirty="0"/>
+          </a:p>
+        </p:txBody>
+      </p:sp>
+      <p:sp>
+        <p:nvSpPr>
+          <p:cNvPr id="3" name="Date Placeholder 2"/>
+          <p:cNvSpPr>
+            <a:spLocks noGrp="1"/>
+          </p:cNvSpPr>
+          <p:nvPr>
+            <p:ph type="dt" sz="half" idx="10"/>
+          </p:nvPr>
+        </p:nvSpPr>
+        <p:spPr/>
+        <p:txBody>
+          <a:bodyPr/>
+          <a:lstStyle/>
+          <a:p>
+            <a:r>
+              <a:rPr lang="en-US" smtClean="0"/>
+              <a:t>Feb. 7. 2014</a:t>
+            </a:r>
+            <a:endParaRPr lang="en-US"/>
+          </a:p>
+        </p:txBody>
+      </p:sp>
+      <p:sp>
+        <p:nvSpPr>
+          <p:cNvPr id="4" name="Footer Placeholder 3"/>
+          <p:cNvSpPr>
+            <a:spLocks noGrp="1"/>
+          </p:cNvSpPr>
+          <p:nvPr>
+            <p:ph type="ftr" sz="quarter" idx="11"/>
+          </p:nvPr>
+        </p:nvSpPr>
+        <p:spPr/>
+        <p:txBody>
+          <a:bodyPr/>
+          <a:lstStyle/>
+          <a:p>
+            <a:r>
+              <a:rPr lang="en-US" smtClean="0"/>
+              <a:t>Matt Smith - WebDriver &amp; Selenium</a:t>
+            </a:r>
+            <a:endParaRPr lang="en-US"/>
+          </a:p>
+        </p:txBody>
+      </p:sp>
+      <p:sp>
+        <p:nvSpPr>
+          <p:cNvPr id="5" name="Slide Number Placeholder 4"/>
+          <p:cNvSpPr>
+            <a:spLocks noGrp="1"/>
+          </p:cNvSpPr>
+          <p:nvPr>
+            <p:ph type="sldNum" sz="quarter" idx="12"/>
+          </p:nvPr>
+        </p:nvSpPr>
+        <p:spPr/>
+        <p:txBody>
+          <a:bodyPr/>
+          <a:lstStyle/>
+          <a:p>
+            <a:fld id="{BE924555-EAFD-4B2F-96F4-A60706EF2138}" type="slidenum">
+              <a:rPr lang="en-US" smtClean="0"/>
+              <a:pPr/>
+              <a:t>15</a:t>
+            </a:fld>
+            <a:endParaRPr lang="en-US"/>
+          </a:p>
+        </p:txBody>
+      </p:sp>
+      <p:sp>
+        <p:nvSpPr>
+          <p:cNvPr id="6" name="Content Placeholder 5"/>
+          <p:cNvSpPr>
+            <a:spLocks noGrp="1"/>
+          </p:cNvSpPr>
+          <p:nvPr>
+            <p:ph sz="quarter" idx="1"/>
+          </p:nvPr>
+        </p:nvSpPr>
+        <p:spPr/>
+        <p:txBody>
+          <a:bodyPr>
+            <a:normAutofit fontScale="85000" lnSpcReduction="10000"/>
+          </a:bodyPr>
+          <a:lstStyle/>
+          <a:p>
+            <a:r>
+              <a:rPr lang="en-US" dirty="0" smtClean="0"/>
+              <a:t>Navigation – Page loading strategies</a:t>
+            </a:r>
+          </a:p>
+          <a:p>
+            <a:pPr lvl="1"/>
+            <a:r>
+              <a:rPr lang="en-US" dirty="0" smtClean="0"/>
+              <a:t>Conservative</a:t>
+            </a:r>
+          </a:p>
+          <a:p>
+            <a:pPr lvl="2"/>
+            <a:r>
+              <a:rPr lang="en-US" dirty="0" smtClean="0"/>
+              <a:t>The remote end must wait until all </a:t>
+            </a:r>
+            <a:r>
+              <a:rPr lang="en-US" dirty="0" err="1" smtClean="0"/>
+              <a:t>i</a:t>
+            </a:r>
+            <a:r>
+              <a:rPr lang="en-US" dirty="0" err="1"/>
+              <a:t>f</a:t>
+            </a:r>
+            <a:r>
+              <a:rPr lang="en-US" dirty="0" err="1" smtClean="0"/>
+              <a:t>rames</a:t>
+            </a:r>
+            <a:r>
+              <a:rPr lang="en-US" dirty="0" smtClean="0"/>
+              <a:t> in the current window are in a </a:t>
+            </a:r>
+            <a:r>
+              <a:rPr lang="en-US" dirty="0" err="1" smtClean="0"/>
+              <a:t>document.readyState</a:t>
+            </a:r>
+            <a:r>
+              <a:rPr lang="en-US" dirty="0" smtClean="0"/>
+              <a:t> equal to ‘complete’. There are no outstanding HTTP requests, other than those caused by </a:t>
+            </a:r>
+            <a:r>
+              <a:rPr lang="en-US" dirty="0" err="1" smtClean="0"/>
+              <a:t>XMLHttpRequests</a:t>
+            </a:r>
+            <a:r>
+              <a:rPr lang="en-US" dirty="0" smtClean="0"/>
+              <a:t>.</a:t>
+            </a:r>
+          </a:p>
+          <a:p>
+            <a:pPr lvl="1"/>
+            <a:r>
+              <a:rPr lang="en-US" dirty="0" smtClean="0"/>
+              <a:t>Normal (default)</a:t>
+            </a:r>
+          </a:p>
+          <a:p>
+            <a:pPr lvl="2"/>
+            <a:r>
+              <a:rPr lang="en-US" dirty="0" smtClean="0"/>
+              <a:t>Remote end must wait until the </a:t>
+            </a:r>
+            <a:r>
+              <a:rPr lang="en-US" dirty="0" err="1" smtClean="0"/>
+              <a:t>document.readyState</a:t>
+            </a:r>
+            <a:r>
+              <a:rPr lang="en-US" dirty="0" smtClean="0"/>
+              <a:t> of the frame currently being handled equals ‘complete’, or there are not more outstanding network requests other than </a:t>
+            </a:r>
+            <a:r>
+              <a:rPr lang="en-US" dirty="0" err="1" smtClean="0"/>
+              <a:t>XMLHttpRequests</a:t>
+            </a:r>
+            <a:r>
+              <a:rPr lang="en-US" dirty="0" smtClean="0"/>
+              <a:t>.</a:t>
+            </a:r>
+          </a:p>
+          <a:p>
+            <a:pPr lvl="1"/>
+            <a:r>
+              <a:rPr lang="en-US" dirty="0" smtClean="0"/>
+              <a:t>Eager</a:t>
+            </a:r>
+          </a:p>
+          <a:p>
+            <a:pPr lvl="2"/>
+            <a:r>
+              <a:rPr lang="en-US" dirty="0" smtClean="0"/>
+              <a:t>Remote end must wait until the </a:t>
+            </a:r>
+            <a:r>
+              <a:rPr lang="en-US" dirty="0" err="1" smtClean="0"/>
+              <a:t>document.readyState</a:t>
+            </a:r>
+            <a:r>
+              <a:rPr lang="en-US" dirty="0" smtClean="0"/>
+              <a:t> of the frame currently being handled equals ‘interactive’ or ‘complete’, or there are no more outstanding network requests other than </a:t>
+            </a:r>
+            <a:r>
+              <a:rPr lang="en-US" dirty="0" err="1" smtClean="0"/>
+              <a:t>XMLHttpRequests</a:t>
+            </a:r>
+            <a:r>
+              <a:rPr lang="en-US" dirty="0" smtClean="0"/>
+              <a:t>.</a:t>
+            </a:r>
+          </a:p>
+          <a:p>
+            <a:pPr lvl="1"/>
+            <a:r>
+              <a:rPr lang="en-US" dirty="0" smtClean="0"/>
+              <a:t>None</a:t>
+            </a:r>
+          </a:p>
+          <a:p>
+            <a:pPr lvl="2"/>
+            <a:r>
+              <a:rPr lang="en-US" dirty="0" smtClean="0"/>
+              <a:t>The remote end does not do any checks to see if the page load is currently active.</a:t>
+            </a:r>
+          </a:p>
+          <a:p>
+            <a:pPr lvl="1"/>
+            <a:endParaRPr lang="en-US" dirty="0"/>
+          </a:p>
+        </p:txBody>
+      </p:sp>
+    </p:spTree>
+    <p:extLst>
+      <p:ext uri="{BB962C8B-B14F-4D97-AF65-F5344CB8AC3E}">
+        <p14:creationId xmlns:p14="http://schemas.microsoft.com/office/powerpoint/2010/main" val="1863852360"/>
+      </p:ext>
+    </p:extLst>
+  </p:cSld>
+  <p:clrMapOvr>
+    <a:masterClrMapping/>
+  </p:clrMapOvr>
+  <p:timing>
+    <p:tnLst>
+      <p:par>
+        <p:cTn xmlns:p14="http://schemas.microsoft.com/office/powerpoint/2010/main" id="1" dur="indefinite" restart="never" nodeType="tmRoot"/>
+      </p:par>
+    </p:tnLst>
+  </p:timing>
+</p:sld>
+</file>
+
+<file path=ppt/slides/slide16.xml><?xml version="1.0" encoding="utf-8"?>
+<p:sld xmlns:a="http://schemas.openxmlformats.org/drawingml/2006/main" xmlns:r="http://schemas.openxmlformats.org/officeDocument/2006/relationships" xmlns:p="http://schemas.openxmlformats.org/presentationml/2006/main">
+  <p:cSld>
+    <p:spTree>
+      <p:nvGrpSpPr>
+        <p:cNvPr id="1" name=""/>
+        <p:cNvGrpSpPr/>
+        <p:nvPr/>
+      </p:nvGrpSpPr>
+      <p:grpSpPr>
+        <a:xfrm>
+          <a:off x="0" y="0"/>
+          <a:ext cx="0" cy="0"/>
+          <a:chOff x="0" y="0"/>
+          <a:chExt cx="0" cy="0"/>
+        </a:xfrm>
+      </p:grpSpPr>
+      <p:sp>
+        <p:nvSpPr>
+          <p:cNvPr id="2" name="Title 1"/>
+          <p:cNvSpPr>
+            <a:spLocks noGrp="1"/>
+          </p:cNvSpPr>
+          <p:nvPr>
+            <p:ph type="title"/>
+          </p:nvPr>
+        </p:nvSpPr>
+        <p:spPr/>
+        <p:txBody>
+          <a:bodyPr/>
+          <a:lstStyle/>
+          <a:p>
+            <a:r>
+              <a:rPr lang="en-US" dirty="0" err="1" smtClean="0"/>
+              <a:t>WebDriver</a:t>
+            </a:r>
+            <a:r>
+              <a:rPr lang="en-US" dirty="0" smtClean="0"/>
+              <a:t> tries to help</a:t>
+            </a:r>
+            <a:endParaRPr lang="en-US" dirty="0"/>
+          </a:p>
+        </p:txBody>
+      </p:sp>
+      <p:sp>
+        <p:nvSpPr>
+          <p:cNvPr id="3" name="Date Placeholder 2"/>
+          <p:cNvSpPr>
+            <a:spLocks noGrp="1"/>
+          </p:cNvSpPr>
+          <p:nvPr>
+            <p:ph type="dt" sz="half" idx="10"/>
+          </p:nvPr>
+        </p:nvSpPr>
+        <p:spPr/>
+        <p:txBody>
+          <a:bodyPr/>
+          <a:lstStyle/>
+          <a:p>
+            <a:r>
+              <a:rPr lang="en-US" smtClean="0"/>
+              <a:t>Feb. 7. 2014</a:t>
+            </a:r>
+            <a:endParaRPr lang="en-US"/>
+          </a:p>
+        </p:txBody>
+      </p:sp>
+      <p:sp>
+        <p:nvSpPr>
+          <p:cNvPr id="4" name="Footer Placeholder 3"/>
+          <p:cNvSpPr>
+            <a:spLocks noGrp="1"/>
+          </p:cNvSpPr>
+          <p:nvPr>
+            <p:ph type="ftr" sz="quarter" idx="11"/>
+          </p:nvPr>
+        </p:nvSpPr>
+        <p:spPr/>
+        <p:txBody>
+          <a:bodyPr/>
+          <a:lstStyle/>
+          <a:p>
+            <a:r>
+              <a:rPr lang="en-US" smtClean="0"/>
+              <a:t>Matt Smith - WebDriver &amp; Selenium</a:t>
+            </a:r>
+            <a:endParaRPr lang="en-US"/>
+          </a:p>
+        </p:txBody>
+      </p:sp>
+      <p:sp>
+        <p:nvSpPr>
+          <p:cNvPr id="5" name="Slide Number Placeholder 4"/>
+          <p:cNvSpPr>
+            <a:spLocks noGrp="1"/>
+          </p:cNvSpPr>
+          <p:nvPr>
+            <p:ph type="sldNum" sz="quarter" idx="12"/>
+          </p:nvPr>
+        </p:nvSpPr>
+        <p:spPr/>
+        <p:txBody>
+          <a:bodyPr/>
+          <a:lstStyle/>
+          <a:p>
+            <a:fld id="{BE924555-EAFD-4B2F-96F4-A60706EF2138}" type="slidenum">
+              <a:rPr lang="en-US" smtClean="0"/>
+              <a:pPr/>
+              <a:t>16</a:t>
+            </a:fld>
+            <a:endParaRPr lang="en-US"/>
+          </a:p>
+        </p:txBody>
+      </p:sp>
+      <p:sp>
+        <p:nvSpPr>
+          <p:cNvPr id="6" name="Content Placeholder 5"/>
+          <p:cNvSpPr>
+            <a:spLocks noGrp="1"/>
+          </p:cNvSpPr>
+          <p:nvPr>
+            <p:ph sz="quarter" idx="1"/>
+          </p:nvPr>
+        </p:nvSpPr>
+        <p:spPr/>
+        <p:txBody>
+          <a:bodyPr/>
+          <a:lstStyle/>
+          <a:p>
+            <a:r>
+              <a:rPr lang="en-US" dirty="0" smtClean="0"/>
+              <a:t>Mouse Click</a:t>
+            </a:r>
+          </a:p>
+          <a:p>
+            <a:pPr lvl="1"/>
+            <a:r>
+              <a:rPr lang="en-US" dirty="0" smtClean="0"/>
+              <a:t>Will attempt to scroll the element into view if it is not within the viewport.</a:t>
+            </a:r>
+          </a:p>
+          <a:p>
+            <a:pPr lvl="1"/>
+            <a:r>
+              <a:rPr lang="en-US" dirty="0" smtClean="0"/>
+              <a:t>Does not always work, you’ll have to scroll it yourself.</a:t>
+            </a:r>
+          </a:p>
+          <a:p>
+            <a:r>
+              <a:rPr lang="en-US" dirty="0" smtClean="0"/>
+              <a:t>Keyboard</a:t>
+            </a:r>
+          </a:p>
+          <a:p>
+            <a:pPr lvl="1"/>
+            <a:r>
+              <a:rPr lang="en-US" dirty="0" smtClean="0"/>
+              <a:t>Will set focus on the element you send text to</a:t>
+            </a:r>
+          </a:p>
+          <a:p>
+            <a:pPr lvl="1"/>
+            <a:r>
+              <a:rPr lang="en-US" dirty="0" smtClean="0"/>
+              <a:t>Will not leave focus; other then the result of the interaction itself, </a:t>
+            </a:r>
+            <a:r>
+              <a:rPr lang="en-US" dirty="0" err="1" smtClean="0"/>
+              <a:t>ie</a:t>
+            </a:r>
+            <a:r>
+              <a:rPr lang="en-US" dirty="0" smtClean="0"/>
+              <a:t>. Tab</a:t>
+            </a:r>
+            <a:endParaRPr lang="en-US" dirty="0"/>
+          </a:p>
+        </p:txBody>
+      </p:sp>
+    </p:spTree>
+    <p:extLst>
+      <p:ext uri="{BB962C8B-B14F-4D97-AF65-F5344CB8AC3E}">
+        <p14:creationId xmlns:p14="http://schemas.microsoft.com/office/powerpoint/2010/main" val="570814133"/>
+      </p:ext>
+    </p:extLst>
+  </p:cSld>
+  <p:clrMapOvr>
+    <a:masterClrMapping/>
+  </p:clrMapOvr>
+</p:sld>
+</file>
+
 <file path=ppt/slides/slide2.xml><?xml version="1.0" encoding="utf-8"?>
 <p:sld xmlns:a="http://schemas.openxmlformats.org/drawingml/2006/main" xmlns:r="http://schemas.openxmlformats.org/officeDocument/2006/relationships" xmlns:p="http://schemas.openxmlformats.org/presentationml/2006/main">
   <p:cSld>
@@ -7562,6 +9084,81 @@
       </p:sp>
       <p:sp>
         <p:nvSpPr>
+          <p:cNvPr id="4" name="Date Placeholder 3"/>
+          <p:cNvSpPr>
+            <a:spLocks noGrp="1"/>
+          </p:cNvSpPr>
+          <p:nvPr>
+            <p:ph type="dt" sz="half" idx="10"/>
+          </p:nvPr>
+        </p:nvSpPr>
+        <p:spPr/>
+        <p:txBody>
+          <a:bodyPr/>
+          <a:lstStyle/>
+          <a:p>
+            <a:r>
+              <a:rPr lang="en-US" smtClean="0"/>
+              <a:t>Feb. 7. 2014</a:t>
+            </a:r>
+            <a:endParaRPr lang="en-US"/>
+          </a:p>
+        </p:txBody>
+      </p:sp>
+      <p:sp>
+        <p:nvSpPr>
+          <p:cNvPr id="5" name="Footer Placeholder 4"/>
+          <p:cNvSpPr>
+            <a:spLocks noGrp="1"/>
+          </p:cNvSpPr>
+          <p:nvPr>
+            <p:ph type="ftr" sz="quarter" idx="11"/>
+          </p:nvPr>
+        </p:nvSpPr>
+        <p:spPr/>
+        <p:txBody>
+          <a:bodyPr/>
+          <a:lstStyle/>
+          <a:p>
+            <a:r>
+              <a:rPr lang="en-US" smtClean="0"/>
+              <a:t>Matt Smith - WebDriver &amp; Selenium</a:t>
+            </a:r>
+            <a:endParaRPr lang="en-US"/>
+          </a:p>
+        </p:txBody>
+      </p:sp>
+      <p:sp>
+        <p:nvSpPr>
+          <p:cNvPr id="6" name="Slide Number Placeholder 5"/>
+          <p:cNvSpPr>
+            <a:spLocks noGrp="1"/>
+          </p:cNvSpPr>
+          <p:nvPr>
+            <p:ph type="sldNum" sz="quarter" idx="12"/>
+          </p:nvPr>
+        </p:nvSpPr>
+        <p:spPr>
+          <a:xfrm>
+            <a:off x="4343400" y="1006475"/>
+            <a:ext cx="457200" cy="441325"/>
+          </a:xfrm>
+        </p:spPr>
+        <p:txBody>
+          <a:bodyPr/>
+          <a:lstStyle/>
+          <a:p>
+            <a:fld id="{BE924555-EAFD-4B2F-96F4-A60706EF2138}" type="slidenum">
+              <a:rPr lang="en-US" smtClean="0"/>
+              <a:pPr/>
+              <a:t>2</a:t>
+            </a:fld>
+            <a:endParaRPr lang="en-US" dirty="0"/>
+          </a:p>
+        </p:txBody>
+      </p:sp>
+      <p:sp>
+        <p:nvSpPr>
           <p:cNvPr id="3" name="Content Placeholder 2"/>
           <p:cNvSpPr>
             <a:spLocks noGrp="1"/>
@@ -7642,81 +9239,6 @@
             <a:endParaRPr lang="en-US" dirty="0" smtClean="0"/>
           </a:p>
           <a:p>
-            <a:endParaRPr lang="en-US" dirty="0"/>
-          </a:p>
-        </p:txBody>
-      </p:sp>
-      <p:sp>
-        <p:nvSpPr>
-          <p:cNvPr id="4" name="Date Placeholder 3"/>
-          <p:cNvSpPr>
-            <a:spLocks noGrp="1"/>
-          </p:cNvSpPr>
-          <p:nvPr>
-            <p:ph type="dt" sz="half" idx="10"/>
-          </p:nvPr>
-        </p:nvSpPr>
-        <p:spPr/>
-        <p:txBody>
-          <a:bodyPr/>
-          <a:lstStyle/>
-          <a:p>
-            <a:r>
-              <a:rPr lang="en-US" smtClean="0"/>
-              <a:t>Feb. 7. 2014</a:t>
-            </a:r>
-            <a:endParaRPr lang="en-US"/>
-          </a:p>
-        </p:txBody>
-      </p:sp>
-      <p:sp>
-        <p:nvSpPr>
-          <p:cNvPr id="5" name="Footer Placeholder 4"/>
-          <p:cNvSpPr>
-            <a:spLocks noGrp="1"/>
-          </p:cNvSpPr>
-          <p:nvPr>
-            <p:ph type="ftr" sz="quarter" idx="11"/>
-          </p:nvPr>
-        </p:nvSpPr>
-        <p:spPr/>
-        <p:txBody>
-          <a:bodyPr/>
-          <a:lstStyle/>
-          <a:p>
-            <a:r>
-              <a:rPr lang="en-US" smtClean="0"/>
-              <a:t>Matt Smith - WebDriver &amp; Selenium</a:t>
-            </a:r>
-            <a:endParaRPr lang="en-US"/>
-          </a:p>
-        </p:txBody>
-      </p:sp>
-      <p:sp>
-        <p:nvSpPr>
-          <p:cNvPr id="6" name="Slide Number Placeholder 5"/>
-          <p:cNvSpPr>
-            <a:spLocks noGrp="1"/>
-          </p:cNvSpPr>
-          <p:nvPr>
-            <p:ph type="sldNum" sz="quarter" idx="12"/>
-          </p:nvPr>
-        </p:nvSpPr>
-        <p:spPr>
-          <a:xfrm>
-            <a:off x="4343400" y="1006475"/>
-            <a:ext cx="457200" cy="441325"/>
-          </a:xfrm>
-        </p:spPr>
-        <p:txBody>
-          <a:bodyPr/>
-          <a:lstStyle/>
-          <a:p>
-            <a:fld id="{BE924555-EAFD-4B2F-96F4-A60706EF2138}" type="slidenum">
-              <a:rPr lang="en-US" smtClean="0"/>
-              <a:pPr/>
-              <a:t>2</a:t>
-            </a:fld>
             <a:endParaRPr lang="en-US" dirty="0"/>
           </a:p>
         </p:txBody>
@@ -7783,90 +9305,6 @@
       </p:sp>
       <p:sp>
         <p:nvSpPr>
-          <p:cNvPr id="3" name="Content Placeholder 2"/>
-          <p:cNvSpPr>
-            <a:spLocks noGrp="1"/>
-          </p:cNvSpPr>
-          <p:nvPr>
-            <p:ph sz="quarter" idx="1"/>
-          </p:nvPr>
-        </p:nvSpPr>
-        <p:spPr/>
-        <p:txBody>
-          <a:bodyPr/>
-          <a:lstStyle/>
-          <a:p>
-            <a:r>
-              <a:rPr lang="en-US" dirty="0" smtClean="0"/>
-              <a:t>2013 Started submissions to the W3C for a </a:t>
-            </a:r>
-            <a:r>
-              <a:rPr lang="en-US" dirty="0" err="1" smtClean="0"/>
-              <a:t>WebDriver</a:t>
-            </a:r>
-            <a:r>
-              <a:rPr lang="en-US" dirty="0" smtClean="0"/>
-              <a:t> API standard</a:t>
-            </a:r>
-          </a:p>
-          <a:p>
-            <a:pPr lvl="1"/>
-            <a:r>
-              <a:rPr lang="en-US" dirty="0" smtClean="0"/>
-              <a:t>Attempting to offload the native communication work to the browser’s original authors following a standard API</a:t>
-            </a:r>
-          </a:p>
-          <a:p>
-            <a:pPr lvl="1"/>
-            <a:r>
-              <a:rPr lang="en-US" dirty="0" smtClean="0"/>
-              <a:t>Authors:</a:t>
-            </a:r>
-          </a:p>
-          <a:p>
-            <a:pPr lvl="2"/>
-            <a:r>
-              <a:rPr lang="en-US" dirty="0" smtClean="0"/>
-              <a:t>Simon Stewart – Google</a:t>
-            </a:r>
-          </a:p>
-          <a:p>
-            <a:pPr lvl="2"/>
-            <a:r>
-              <a:rPr lang="en-US" dirty="0" smtClean="0"/>
-              <a:t>Facebook</a:t>
-            </a:r>
-          </a:p>
-          <a:p>
-            <a:pPr lvl="2"/>
-            <a:r>
-              <a:rPr lang="en-US" dirty="0" smtClean="0"/>
-              <a:t>David Burns – </a:t>
-            </a:r>
-            <a:r>
-              <a:rPr lang="en-US" dirty="0" smtClean="0"/>
-              <a:t>Mozilla</a:t>
-            </a:r>
-          </a:p>
-          <a:p>
-            <a:pPr lvl="1"/>
-            <a:r>
-              <a:rPr lang="en-US" dirty="0" smtClean="0"/>
-              <a:t>Firefox already does this</a:t>
-            </a:r>
-          </a:p>
-          <a:p>
-            <a:pPr lvl="2"/>
-            <a:r>
-              <a:rPr lang="en-US" dirty="0" smtClean="0"/>
-              <a:t>Notice there is not console window launched when testing with Firefox</a:t>
-            </a:r>
-            <a:endParaRPr lang="en-US" dirty="0" smtClean="0"/>
-          </a:p>
-        </p:txBody>
-      </p:sp>
-      <p:sp>
-        <p:nvSpPr>
           <p:cNvPr id="4" name="Date Placeholder 3"/>
           <p:cNvSpPr>
             <a:spLocks noGrp="1"/>
@@ -7937,6 +9375,85 @@
               <a:t>3</a:t>
             </a:fld>
             <a:endParaRPr lang="en-US" dirty="0"/>
+          </a:p>
+        </p:txBody>
+      </p:sp>
+      <p:sp>
+        <p:nvSpPr>
+          <p:cNvPr id="3" name="Content Placeholder 2"/>
+          <p:cNvSpPr>
+            <a:spLocks noGrp="1"/>
+          </p:cNvSpPr>
+          <p:nvPr>
+            <p:ph sz="quarter" idx="1"/>
+          </p:nvPr>
+        </p:nvSpPr>
+        <p:spPr/>
+        <p:txBody>
+          <a:bodyPr/>
+          <a:lstStyle/>
+          <a:p>
+            <a:r>
+              <a:rPr lang="en-US" dirty="0" smtClean="0"/>
+              <a:t>2013 Started submissions to the W3C for a </a:t>
+            </a:r>
+            <a:r>
+              <a:rPr lang="en-US" dirty="0" err="1" smtClean="0"/>
+              <a:t>WebDriver</a:t>
+            </a:r>
+            <a:r>
+              <a:rPr lang="en-US" dirty="0" smtClean="0"/>
+              <a:t> API standard</a:t>
+            </a:r>
+          </a:p>
+          <a:p>
+            <a:pPr lvl="1"/>
+            <a:r>
+              <a:rPr lang="en-US" dirty="0" smtClean="0"/>
+              <a:t>Attempting to offload the native communication work to the browser’s original authors following a standard API</a:t>
+            </a:r>
+          </a:p>
+          <a:p>
+            <a:pPr lvl="1"/>
+            <a:r>
+              <a:rPr lang="en-US" dirty="0" smtClean="0"/>
+              <a:t>Authors:</a:t>
+            </a:r>
+          </a:p>
+          <a:p>
+            <a:pPr lvl="2"/>
+            <a:r>
+              <a:rPr lang="en-US" dirty="0" smtClean="0"/>
+              <a:t>Simon Stewart – Google</a:t>
+            </a:r>
+          </a:p>
+          <a:p>
+            <a:pPr lvl="2"/>
+            <a:r>
+              <a:rPr lang="en-US" dirty="0" smtClean="0"/>
+              <a:t>Facebook</a:t>
+            </a:r>
+          </a:p>
+          <a:p>
+            <a:pPr lvl="2"/>
+            <a:r>
+              <a:rPr lang="en-US" dirty="0" smtClean="0"/>
+              <a:t>David Burns – Mozilla</a:t>
+            </a:r>
+          </a:p>
+          <a:p>
+            <a:pPr lvl="1"/>
+            <a:r>
+              <a:rPr lang="en-US" dirty="0" smtClean="0"/>
+              <a:t>Firefox already does this</a:t>
+            </a:r>
+          </a:p>
+          <a:p>
+            <a:pPr lvl="2"/>
+            <a:r>
+              <a:rPr lang="en-US" dirty="0" smtClean="0"/>
+              <a:t>Notice there is not console window launched when testing with Firefox</a:t>
+            </a:r>
           </a:p>
         </p:txBody>
       </p:sp>
@@ -8519,14 +10036,19 @@
             <a:pPr lvl="1"/>
             <a:r>
               <a:rPr lang="en-US" dirty="0" smtClean="0"/>
-              <a:t>Must be on the domain that the cookie will be valid for</a:t>
-            </a:r>
-          </a:p>
-          <a:p>
-            <a:pPr marL="274320" lvl="1" indent="0">
-              <a:buNone/>
-            </a:pPr>
-            <a:endParaRPr lang="en-US" dirty="0"/>
+              <a:t>Must be on the domain that the cookie will be valid </a:t>
+            </a:r>
+            <a:r>
+              <a:rPr lang="en-US" dirty="0" smtClean="0"/>
+              <a:t>for</a:t>
+            </a:r>
+          </a:p>
+          <a:p>
+            <a:r>
+              <a:rPr lang="en-US" dirty="0" smtClean="0"/>
+              <a:t>Screenshots</a:t>
+            </a:r>
+            <a:endParaRPr lang="en-US" dirty="0" smtClean="0"/>
           </a:p>
         </p:txBody>
       </p:sp>
@@ -8764,7 +10286,15 @@
             <a:pPr lvl="1"/>
             <a:r>
               <a:rPr lang="en-US" dirty="0" smtClean="0"/>
-              <a:t>Targeted Versions: 6, 7, 8, 9, 10, (Not 11) on appropriate combinations of XP, Vista, and Windows 7</a:t>
+              <a:t>Targeted Versions: 6, 7, 8, 9, 10, (Not </a:t>
+            </a:r>
+            <a:r>
+              <a:rPr lang="en-US" dirty="0" smtClean="0"/>
+              <a:t>11 yet) </a:t>
+            </a:r>
+            <a:r>
+              <a:rPr lang="en-US" dirty="0" smtClean="0"/>
+              <a:t>on appropriate combinations of XP, Vista, and Windows 7</a:t>
             </a:r>
           </a:p>
           <a:p>
@@ -9045,17 +10575,6 @@
 <file path=ppt/slides/slide9.xml><?xml version="1.0" encoding="utf-8"?>
 <p:sld xmlns:a="http://schemas.openxmlformats.org/drawingml/2006/main" xmlns:r="http://schemas.openxmlformats.org/officeDocument/2006/relationships" xmlns:p="http://schemas.openxmlformats.org/presentationml/2006/main">
   <p:cSld>
-    <p:bg>
-      <p:bgPr>
-        <a:blipFill>
-          <a:blip r:embed="rId2">
-            <a:alphaModFix amt="30000"/>
-          </a:blip>
-          <a:tile tx="0" ty="0" sx="65000" sy="65000" flip="none" algn="tl"/>
-        </a:blipFill>
-        <a:effectLst/>
-      </p:bgPr>
-    </p:bg>
     <p:spTree>
       <p:nvGrpSpPr>
         <p:cNvPr id="1" name=""/>
@@ -9093,16 +10612,86 @@
           </a:p>
         </p:txBody>
       </p:sp>
+      <p:sp>
+        <p:nvSpPr>
+          <p:cNvPr id="3" name="Date Placeholder 2"/>
+          <p:cNvSpPr>
+            <a:spLocks noGrp="1"/>
+          </p:cNvSpPr>
+          <p:nvPr>
+            <p:ph type="dt" sz="half" idx="10"/>
+          </p:nvPr>
+        </p:nvSpPr>
+        <p:spPr/>
+        <p:txBody>
+          <a:bodyPr/>
+          <a:lstStyle/>
+          <a:p>
+            <a:r>
+              <a:rPr lang="en-US" smtClean="0"/>
+              <a:t>Feb. 7. 2014</a:t>
+            </a:r>
+            <a:endParaRPr lang="en-US"/>
+          </a:p>
+        </p:txBody>
+      </p:sp>
+      <p:sp>
+        <p:nvSpPr>
+          <p:cNvPr id="4" name="Footer Placeholder 3"/>
+          <p:cNvSpPr>
+            <a:spLocks noGrp="1"/>
+          </p:cNvSpPr>
+          <p:nvPr>
+            <p:ph type="ftr" sz="quarter" idx="11"/>
+          </p:nvPr>
+        </p:nvSpPr>
+        <p:spPr/>
+        <p:txBody>
+          <a:bodyPr/>
+          <a:lstStyle/>
+          <a:p>
+            <a:r>
+              <a:rPr lang="en-US" smtClean="0"/>
+              <a:t>Matt Smith - WebDriver &amp; Selenium</a:t>
+            </a:r>
+            <a:endParaRPr lang="en-US"/>
+          </a:p>
+        </p:txBody>
+      </p:sp>
+      <p:sp>
+        <p:nvSpPr>
+          <p:cNvPr id="5" name="Slide Number Placeholder 4"/>
+          <p:cNvSpPr>
+            <a:spLocks noGrp="1"/>
+          </p:cNvSpPr>
+          <p:nvPr>
+            <p:ph type="sldNum" sz="quarter" idx="12"/>
+          </p:nvPr>
+        </p:nvSpPr>
+        <p:spPr/>
+        <p:txBody>
+          <a:bodyPr/>
+          <a:lstStyle/>
+          <a:p>
+            <a:fld id="{BE924555-EAFD-4B2F-96F4-A60706EF2138}" type="slidenum">
+              <a:rPr lang="en-US" smtClean="0"/>
+              <a:pPr/>
+              <a:t>9</a:t>
+            </a:fld>
+            <a:endParaRPr lang="en-US"/>
+          </a:p>
+        </p:txBody>
+      </p:sp>
       <p:pic>
         <p:nvPicPr>
-          <p:cNvPr id="7" name="Picture 6" descr="WebDriver - Simple Flow.png"/>
+          <p:cNvPr id="8" name="Picture 7" descr="WebDriver - Simple Flow.png"/>
           <p:cNvPicPr>
             <a:picLocks noChangeAspect="1"/>
           </p:cNvPicPr>
           <p:nvPr/>
         </p:nvPicPr>
         <p:blipFill>
-          <a:blip r:embed="rId3" cstate="print">
+          <a:blip r:embed="rId2" cstate="print">
             <a:extLst>
               <a:ext uri="{28A0092B-C50C-407E-A947-70E740481C1C}">
                 <a14:useLocalDpi xmlns:a14="http://schemas.microsoft.com/office/drawing/2010/main" val="0"/>
@@ -9125,82 +10714,7 @@
       </p:pic>
       <p:sp>
         <p:nvSpPr>
-          <p:cNvPr id="3" name="Date Placeholder 2"/>
-          <p:cNvSpPr>
-            <a:spLocks noGrp="1"/>
-          </p:cNvSpPr>
-          <p:nvPr>
-            <p:ph type="dt" sz="half" idx="10"/>
-          </p:nvPr>
-        </p:nvSpPr>
-        <p:spPr/>
-        <p:txBody>
-          <a:bodyPr/>
-          <a:lstStyle/>
-          <a:p>
-            <a:r>
-              <a:rPr lang="en-US" smtClean="0"/>
-              <a:t>Feb. 7. 2014</a:t>
-            </a:r>
-            <a:endParaRPr lang="en-US"/>
-          </a:p>
-        </p:txBody>
-      </p:sp>
-      <p:sp>
-        <p:nvSpPr>
-          <p:cNvPr id="4" name="Footer Placeholder 3"/>
-          <p:cNvSpPr>
-            <a:spLocks noGrp="1"/>
-          </p:cNvSpPr>
-          <p:nvPr>
-            <p:ph type="ftr" sz="quarter" idx="11"/>
-          </p:nvPr>
-        </p:nvSpPr>
-        <p:spPr/>
-        <p:txBody>
-          <a:bodyPr/>
-          <a:lstStyle/>
-          <a:p>
-            <a:r>
-              <a:rPr lang="en-US" smtClean="0"/>
-              <a:t>Matt Smith - WebDriver &amp; Selenium</a:t>
-            </a:r>
-            <a:endParaRPr lang="en-US"/>
-          </a:p>
-        </p:txBody>
-      </p:sp>
-      <p:sp>
-        <p:nvSpPr>
-          <p:cNvPr id="5" name="Slide Number Placeholder 4"/>
-          <p:cNvSpPr>
-            <a:spLocks noGrp="1"/>
-          </p:cNvSpPr>
-          <p:nvPr>
-            <p:ph type="sldNum" sz="quarter" idx="12"/>
-          </p:nvPr>
-        </p:nvSpPr>
-        <p:spPr>
-          <a:xfrm>
-            <a:off x="4343400" y="996950"/>
-            <a:ext cx="457200" cy="441325"/>
-          </a:xfrm>
-        </p:spPr>
-        <p:txBody>
-          <a:bodyPr/>
-          <a:lstStyle/>
-          <a:p>
-            <a:fld id="{BE924555-EAFD-4B2F-96F4-A60706EF2138}" type="slidenum">
-              <a:rPr lang="en-US" smtClean="0"/>
-              <a:pPr/>
-              <a:t>9</a:t>
-            </a:fld>
-            <a:endParaRPr lang="en-US" dirty="0"/>
-          </a:p>
-        </p:txBody>
-      </p:sp>
-      <p:sp>
-        <p:nvSpPr>
-          <p:cNvPr id="6" name="TextBox 5"/>
+          <p:cNvPr id="9" name="TextBox 8"/>
           <p:cNvSpPr txBox="1"/>
           <p:nvPr/>
         </p:nvSpPr>
@@ -9259,20 +10773,13 @@
     </p:spTree>
     <p:extLst>
       <p:ext uri="{BB962C8B-B14F-4D97-AF65-F5344CB8AC3E}">
-        <p14:creationId xmlns:p14="http://schemas.microsoft.com/office/powerpoint/2010/main" val="633117598"/>
+        <p14:creationId xmlns:p14="http://schemas.microsoft.com/office/powerpoint/2010/main" val="2722481276"/>
       </p:ext>
     </p:extLst>
   </p:cSld>
   <p:clrMapOvr>
     <a:masterClrMapping/>
   </p:clrMapOvr>
-  <p:timing>
-    <p:tnLst>
-      <p:par>
-        <p:cTn xmlns:p14="http://schemas.microsoft.com/office/powerpoint/2010/main" id="1" dur="indefinite" restart="never" nodeType="tmRoot"/>
-      </p:par>
-    </p:tnLst>
-  </p:timing>
 </p:sld>
 </file>
 

</xml_diff>

<commit_message>
Updated slides for WebDriver presentation
</commit_message>
<xml_diff>
--- a/WebDriver/Slides.pptx
+++ b/WebDriver/Slides.pptx
@@ -219,7 +219,7 @@
           <a:p>
             <a:fld id="{B40A9E6F-6737-0744-A10B-6F064135DB2B}" type="datetimeFigureOut">
               <a:rPr lang="en-US" smtClean="0"/>
-              <a:t>2/6/14</a:t>
+              <a:t>2/7/14</a:t>
             </a:fld>
             <a:endParaRPr lang="en-US"/>
           </a:p>
@@ -385,7 +385,7 @@
           <a:p>
             <a:fld id="{3618A891-9467-4CC7-A491-0A34A0A97538}" type="datetimeFigureOut">
               <a:rPr lang="en-US" smtClean="0"/>
-              <a:t>2/6/14</a:t>
+              <a:t>2/7/14</a:t>
             </a:fld>
             <a:endParaRPr lang="en-US"/>
           </a:p>
@@ -8350,12 +8350,8 @@
               <a:t>How much does </a:t>
             </a:r>
             <a:r>
-              <a:rPr lang="en-US" sz="4000" i="1" dirty="0" smtClean="0"/>
-              <a:t>n</a:t>
-            </a:r>
-            <a:r>
               <a:rPr lang="en-US" sz="4000" dirty="0" smtClean="0"/>
-              <a:t> cost?</a:t>
+              <a:t>this really cost us?</a:t>
             </a:r>
             <a:endParaRPr lang="en-US" sz="4000" dirty="0"/>
           </a:p>
@@ -9334,15 +9330,7 @@
           <a:p>
             <a:r>
               <a:rPr lang="en-US" sz="2800" dirty="0" smtClean="0"/>
-              <a:t>Filter the elements you want before you marshal </a:t>
-            </a:r>
-            <a:r>
-              <a:rPr lang="en-US" sz="2800" dirty="0" smtClean="0"/>
-              <a:t>them; </a:t>
-            </a:r>
-            <a:r>
-              <a:rPr lang="en-US" sz="2800" dirty="0" smtClean="0"/>
-              <a:t>as much as you reasonably can</a:t>
+              <a:t>Filter the elements you want before you marshal them; as much as you reasonably can</a:t>
             </a:r>
             <a:endParaRPr lang="en-US" sz="2800" dirty="0"/>
           </a:p>
@@ -10258,11 +10246,11 @@
           <a:p>
             <a:r>
               <a:rPr lang="en-US" dirty="0"/>
-              <a:t>For 5 Elements at about 300ms per </a:t>
-            </a:r>
-            <a:r>
-              <a:rPr lang="en-US" dirty="0" smtClean="0"/>
-              <a:t>call</a:t>
+              <a:t>For 5 </a:t>
+            </a:r>
+            <a:r>
+              <a:rPr lang="en-US" dirty="0" smtClean="0"/>
+              <a:t>Elements</a:t>
             </a:r>
             <a:endParaRPr lang="en-US" dirty="0"/>
           </a:p>
@@ -10353,7 +10341,14 @@
           <a:bodyPr/>
           <a:lstStyle/>
           <a:p>
-            <a:endParaRPr lang="en-US" i="1" dirty="0"/>
+            <a:pPr marL="0" indent="0">
+              <a:buNone/>
+            </a:pPr>
+            <a:r>
+              <a:rPr lang="en-US" dirty="0" smtClean="0"/>
+              <a:t>			Chrome	Firefox	Phantom</a:t>
+            </a:r>
+            <a:endParaRPr lang="en-US" dirty="0"/>
           </a:p>
           <a:p>
             <a:r>
@@ -10370,87 +10365,174 @@
             </a:r>
             <a:r>
               <a:rPr lang="en-US" dirty="0" smtClean="0"/>
-              <a:t>+ 1)		3300 </a:t>
+              <a:t>+ 1)		</a:t>
+            </a:r>
+            <a:r>
+              <a:rPr lang="en-US" dirty="0" smtClean="0"/>
+              <a:t>55</a:t>
+            </a:r>
+            <a:r>
+              <a:rPr lang="en-US" dirty="0" smtClean="0"/>
+              <a:t> </a:t>
             </a:r>
             <a:r>
               <a:rPr lang="en-US" dirty="0" err="1" smtClean="0"/>
               <a:t>ms</a:t>
             </a:r>
             <a:r>
+              <a:rPr lang="en-US" dirty="0" smtClean="0"/>
+              <a:t>		176 </a:t>
+            </a:r>
+            <a:r>
+              <a:rPr lang="en-US" dirty="0" err="1" smtClean="0"/>
+              <a:t>ms</a:t>
+            </a:r>
+            <a:r>
+              <a:rPr lang="en-US" dirty="0" smtClean="0"/>
+              <a:t>	71.5 </a:t>
+            </a:r>
+            <a:r>
+              <a:rPr lang="en-US" dirty="0" err="1" smtClean="0"/>
+              <a:t>ms</a:t>
+            </a:r>
+            <a:endParaRPr lang="en-US" dirty="0" smtClean="0"/>
+          </a:p>
+          <a:p>
+            <a:r>
+              <a:rPr lang="en-US" i="1" dirty="0"/>
+              <a:t>O</a:t>
+            </a:r>
+            <a:r>
+              <a:rPr lang="en-US" dirty="0" smtClean="0"/>
+              <a:t>(</a:t>
+            </a:r>
+            <a:r>
+              <a:rPr lang="en-US" i="1" dirty="0" smtClean="0"/>
+              <a:t>n </a:t>
+            </a:r>
+            <a:r>
+              <a:rPr lang="en-US" dirty="0"/>
+              <a:t>+ 1</a:t>
+            </a:r>
+            <a:r>
+              <a:rPr lang="en-US" dirty="0" smtClean="0"/>
+              <a:t>)		</a:t>
+            </a:r>
+            <a:r>
+              <a:rPr lang="en-US" dirty="0" smtClean="0"/>
+              <a:t>30 </a:t>
+            </a:r>
+            <a:r>
+              <a:rPr lang="en-US" dirty="0" err="1" smtClean="0"/>
+              <a:t>ms</a:t>
+            </a:r>
+            <a:r>
+              <a:rPr lang="en-US" dirty="0" smtClean="0"/>
+              <a:t>	96 </a:t>
+            </a:r>
+            <a:r>
+              <a:rPr lang="en-US" dirty="0" err="1" smtClean="0"/>
+              <a:t>ms</a:t>
+            </a:r>
+            <a:r>
+              <a:rPr lang="en-US" dirty="0" smtClean="0"/>
+              <a:t>	39 </a:t>
+            </a:r>
+            <a:r>
+              <a:rPr lang="en-US" dirty="0" err="1" smtClean="0"/>
+              <a:t>ms</a:t>
+            </a:r>
+            <a:endParaRPr lang="en-US" dirty="0"/>
+          </a:p>
+          <a:p>
+            <a:r>
+              <a:rPr lang="en-US" i="1" dirty="0" smtClean="0"/>
+              <a:t>O</a:t>
+            </a:r>
+            <a:r>
+              <a:rPr lang="en-US" dirty="0" smtClean="0"/>
+              <a:t>(1)  		6 </a:t>
+            </a:r>
+            <a:r>
+              <a:rPr lang="en-US" dirty="0" err="1" smtClean="0"/>
+              <a:t>ms</a:t>
+            </a:r>
+            <a:r>
+              <a:rPr lang="en-US" dirty="0" smtClean="0"/>
+              <a:t>		16 </a:t>
+            </a:r>
+            <a:r>
+              <a:rPr lang="en-US" dirty="0" err="1" smtClean="0"/>
+              <a:t>ms</a:t>
+            </a:r>
+            <a:r>
               <a:rPr lang="en-US" dirty="0"/>
               <a:t>	</a:t>
             </a:r>
             <a:r>
               <a:rPr lang="en-US" dirty="0" smtClean="0"/>
-              <a:t>	3.3 seconds</a:t>
-            </a:r>
-          </a:p>
-          <a:p>
-            <a:r>
-              <a:rPr lang="en-US" i="1" dirty="0"/>
-              <a:t>O</a:t>
-            </a:r>
-            <a:r>
-              <a:rPr lang="en-US" dirty="0" smtClean="0"/>
-              <a:t>(</a:t>
-            </a:r>
-            <a:r>
-              <a:rPr lang="en-US" i="1" dirty="0" smtClean="0"/>
-              <a:t>n </a:t>
-            </a:r>
-            <a:r>
-              <a:rPr lang="en-US" dirty="0"/>
-              <a:t>+ 1</a:t>
-            </a:r>
-            <a:r>
-              <a:rPr lang="en-US" dirty="0" smtClean="0"/>
-              <a:t>)		1800 </a:t>
+              <a:t>	6.5 </a:t>
             </a:r>
             <a:r>
               <a:rPr lang="en-US" dirty="0" err="1" smtClean="0"/>
               <a:t>ms</a:t>
             </a:r>
-            <a:r>
-              <a:rPr lang="en-US" dirty="0" smtClean="0"/>
-              <a:t>		1.8 </a:t>
-            </a:r>
-            <a:r>
-              <a:rPr lang="en-US" dirty="0"/>
-              <a:t>seconds</a:t>
-            </a:r>
-          </a:p>
-          <a:p>
-            <a:r>
-              <a:rPr lang="en-US" i="1" dirty="0"/>
-              <a:t>O</a:t>
-            </a:r>
-            <a:r>
-              <a:rPr lang="en-US" dirty="0" smtClean="0"/>
-              <a:t>(1</a:t>
-            </a:r>
-            <a:r>
-              <a:rPr lang="en-US" dirty="0"/>
-              <a:t>) </a:t>
-            </a:r>
-            <a:r>
-              <a:rPr lang="en-US" dirty="0" smtClean="0"/>
-              <a:t> 		300 </a:t>
-            </a:r>
-            <a:r>
-              <a:rPr lang="en-US" dirty="0" err="1" smtClean="0"/>
-              <a:t>ms</a:t>
-            </a:r>
-            <a:r>
-              <a:rPr lang="en-US" dirty="0" smtClean="0"/>
-              <a:t>		0.3 </a:t>
-            </a:r>
-            <a:r>
-              <a:rPr lang="en-US" dirty="0"/>
-              <a:t>seconds</a:t>
-            </a:r>
-          </a:p>
-          <a:p>
-            <a:endParaRPr lang="en-US" i="1" dirty="0" smtClean="0"/>
+            <a:endParaRPr lang="en-US" dirty="0" smtClean="0"/>
+          </a:p>
+          <a:p>
+            <a:endParaRPr lang="en-US" dirty="0"/>
+          </a:p>
+          <a:p>
+            <a:pPr marL="0" indent="0" algn="ctr">
+              <a:buNone/>
+            </a:pPr>
+            <a:r>
+              <a:rPr lang="en-US" sz="2400" dirty="0" smtClean="0"/>
+              <a:t>For an inactive browser with only 5 elements on the DOM</a:t>
+            </a:r>
+            <a:endParaRPr lang="en-US" sz="2400" dirty="0" smtClean="0"/>
+          </a:p>
+        </p:txBody>
+      </p:sp>
+      <p:sp>
+        <p:nvSpPr>
+          <p:cNvPr id="7" name="TextBox 6"/>
+          <p:cNvSpPr txBox="1"/>
+          <p:nvPr/>
+        </p:nvSpPr>
+        <p:spPr>
+          <a:xfrm>
+            <a:off x="8311238" y="6096000"/>
+            <a:ext cx="756562" cy="369332"/>
+          </a:xfrm>
+          <a:prstGeom prst="rect">
+            <a:avLst/>
+          </a:prstGeom>
+          <a:noFill/>
+        </p:spPr>
+        <p:txBody>
+          <a:bodyPr wrap="none" rtlCol="0">
+            <a:spAutoFit/>
+          </a:bodyPr>
+          <a:lstStyle/>
+          <a:p>
+            <a:r>
+              <a:rPr lang="en-US" dirty="0" smtClean="0">
+                <a:solidFill>
+                  <a:schemeClr val="tx1">
+                    <a:alpha val="10000"/>
+                  </a:schemeClr>
+                </a:solidFill>
+              </a:rPr>
+              <a:t>demo</a:t>
+            </a:r>
+            <a:endParaRPr lang="en-US" dirty="0">
+              <a:solidFill>
+                <a:schemeClr val="tx1">
+                  <a:alpha val="10000"/>
+                </a:schemeClr>
+              </a:solidFill>
+            </a:endParaRPr>
           </a:p>
         </p:txBody>
       </p:sp>
@@ -10500,7 +10582,7 @@
                                         <p:tgtEl>
                                           <p:spTgt spid="6">
                                             <p:txEl>
-                                              <p:pRg st="1" end="1"/>
+                                              <p:pRg st="2" end="2"/>
                                             </p:txEl>
                                           </p:spTgt>
                                         </p:tgtEl>
@@ -10549,7 +10631,7 @@
                                         <p:tgtEl>
                                           <p:spTgt spid="6">
                                             <p:txEl>
-                                              <p:pRg st="2" end="2"/>
+                                              <p:pRg st="3" end="3"/>
                                             </p:txEl>
                                           </p:spTgt>
                                         </p:tgtEl>
@@ -10598,7 +10680,7 @@
                                         <p:tgtEl>
                                           <p:spTgt spid="6">
                                             <p:txEl>
-                                              <p:pRg st="3" end="3"/>
+                                              <p:pRg st="5" end="5"/>
                                             </p:txEl>
                                           </p:spTgt>
                                         </p:tgtEl>
@@ -12326,7 +12408,6 @@
               <a:rPr lang="en-US" dirty="0" smtClean="0"/>
               <a:t>Plus more…</a:t>
             </a:r>
-            <a:endParaRPr lang="en-US" dirty="0" smtClean="0"/>
           </a:p>
         </p:txBody>
       </p:sp>
@@ -13080,6 +13161,13 @@
   <p:clrMapOvr>
     <a:masterClrMapping/>
   </p:clrMapOvr>
+  <p:timing>
+    <p:tnLst>
+      <p:par>
+        <p:cTn xmlns:p14="http://schemas.microsoft.com/office/powerpoint/2010/main" id="1" dur="indefinite" restart="never" nodeType="tmRoot"/>
+      </p:par>
+    </p:tnLst>
+  </p:timing>
 </p:sld>
 </file>
 
@@ -13272,15 +13360,7 @@
             <a:pPr lvl="2"/>
             <a:r>
               <a:rPr lang="en-US" dirty="0" smtClean="0"/>
-              <a:t>Notice there is </a:t>
-            </a:r>
-            <a:r>
-              <a:rPr lang="en-US" dirty="0" smtClean="0"/>
-              <a:t>no </a:t>
-            </a:r>
-            <a:r>
-              <a:rPr lang="en-US" dirty="0" smtClean="0"/>
-              <a:t>console window launched when testing with Firefox</a:t>
+              <a:t>Notice there is no console window launched when testing with Firefox</a:t>
             </a:r>
           </a:p>
         </p:txBody>
@@ -13892,7 +13972,6 @@
               <a:rPr lang="en-US" dirty="0" smtClean="0"/>
               <a:t>Manage browsers on remote machines</a:t>
             </a:r>
-            <a:endParaRPr lang="en-US" dirty="0" smtClean="0"/>
           </a:p>
         </p:txBody>
       </p:sp>
@@ -14124,13 +14203,8 @@
             <a:pPr lvl="1"/>
             <a:r>
               <a:rPr lang="en-US" dirty="0" smtClean="0"/>
-              <a:t>Runs with no installed </a:t>
-            </a:r>
-            <a:r>
-              <a:rPr lang="en-US" dirty="0" smtClean="0"/>
-              <a:t>plugins by default</a:t>
-            </a:r>
-            <a:endParaRPr lang="en-US" dirty="0" smtClean="0"/>
+              <a:t>Runs with no installed plugins by default</a:t>
+            </a:r>
           </a:p>
           <a:p>
             <a:r>
@@ -14149,15 +14223,7 @@
             <a:pPr lvl="1"/>
             <a:r>
               <a:rPr lang="en-US" dirty="0" smtClean="0"/>
-              <a:t>Be cautious of 32 </a:t>
-            </a:r>
-            <a:r>
-              <a:rPr lang="en-US" dirty="0" smtClean="0"/>
-              <a:t>vs. </a:t>
-            </a:r>
-            <a:r>
-              <a:rPr lang="en-US" dirty="0" smtClean="0"/>
-              <a:t>64 bit machines</a:t>
+              <a:t>Be cautious of 32 vs. 64 bit machines</a:t>
             </a:r>
           </a:p>
           <a:p>
@@ -14935,11 +15001,7 @@
             </a:r>
             <a:r>
               <a:rPr lang="en-US" i="1" dirty="0" smtClean="0"/>
-              <a:t>See the </a:t>
-            </a:r>
-            <a:r>
-              <a:rPr lang="en-US" i="1" dirty="0" smtClean="0"/>
-              <a:t>docs</a:t>
+              <a:t>See the docs</a:t>
             </a:r>
           </a:p>
           <a:p>

</xml_diff>